<commit_message>
feat: update 1_introduce/ ppt
</commit_message>
<xml_diff>
--- a/lessons/1_introduce/ppt/课程介绍.pptx
+++ b/lessons/1_introduce/ppt/课程介绍.pptx
@@ -5,33 +5,33 @@
     <p:sldMasterId id="2147483648" r:id="rId1"/>
   </p:sldMasterIdLst>
   <p:notesMasterIdLst>
-    <p:notesMasterId r:id="rId18"/>
+    <p:notesMasterId r:id="rId4"/>
   </p:notesMasterIdLst>
   <p:handoutMasterIdLst>
-    <p:handoutMasterId r:id="rId19"/>
+    <p:handoutMasterId r:id="rId20"/>
   </p:handoutMasterIdLst>
   <p:sldIdLst>
-    <p:sldId id="307" r:id="rId2"/>
-    <p:sldId id="308" r:id="rId3"/>
-    <p:sldId id="284" r:id="rId4"/>
-    <p:sldId id="961" r:id="rId5"/>
-    <p:sldId id="999" r:id="rId6"/>
-    <p:sldId id="564" r:id="rId7"/>
-    <p:sldId id="962" r:id="rId8"/>
-    <p:sldId id="988" r:id="rId9"/>
-    <p:sldId id="963" r:id="rId10"/>
-    <p:sldId id="964" r:id="rId11"/>
-    <p:sldId id="1000" r:id="rId12"/>
-    <p:sldId id="995" r:id="rId13"/>
-    <p:sldId id="996" r:id="rId14"/>
-    <p:sldId id="997" r:id="rId15"/>
-    <p:sldId id="998" r:id="rId16"/>
-    <p:sldId id="653" r:id="rId17"/>
+    <p:sldId id="307" r:id="rId3"/>
+    <p:sldId id="308" r:id="rId5"/>
+    <p:sldId id="284" r:id="rId6"/>
+    <p:sldId id="961" r:id="rId7"/>
+    <p:sldId id="999" r:id="rId8"/>
+    <p:sldId id="564" r:id="rId9"/>
+    <p:sldId id="962" r:id="rId10"/>
+    <p:sldId id="988" r:id="rId11"/>
+    <p:sldId id="963" r:id="rId12"/>
+    <p:sldId id="964" r:id="rId13"/>
+    <p:sldId id="1000" r:id="rId14"/>
+    <p:sldId id="995" r:id="rId15"/>
+    <p:sldId id="996" r:id="rId16"/>
+    <p:sldId id="997" r:id="rId17"/>
+    <p:sldId id="998" r:id="rId18"/>
+    <p:sldId id="653" r:id="rId19"/>
   </p:sldIdLst>
   <p:sldSz cx="12192000" cy="6858000"/>
   <p:notesSz cx="6858000" cy="9144000"/>
   <p:custDataLst>
-    <p:tags r:id="rId20"/>
+    <p:tags r:id="rId24"/>
   </p:custDataLst>
   <p:defaultTextStyle>
     <a:defPPr>
@@ -128,11 +128,6 @@
       </a:defRPr>
     </a:lvl9pPr>
   </p:defaultTextStyle>
-  <p:extLst>
-    <p:ext uri="{EFAFB233-063F-42B5-8137-9DF3F51BA10A}">
-      <p15:sldGuideLst xmlns:p15="http://schemas.microsoft.com/office/powerpoint/2012/main"/>
-    </p:ext>
-  </p:extLst>
 </p:presentation>
 </file>
 
@@ -224,7 +219,6 @@
                 <a:latin typeface="微软雅黑" panose="020B0503020204020204" charset="-122"/>
                 <a:ea typeface="微软雅黑" panose="020B0503020204020204" charset="-122"/>
               </a:rPr>
-              <a:t>2022/8/15</a:t>
             </a:fld>
             <a:endParaRPr lang="zh-CN" altLang="en-US">
               <a:latin typeface="微软雅黑" panose="020B0503020204020204" charset="-122"/>
@@ -299,7 +293,6 @@
                 <a:latin typeface="微软雅黑" panose="020B0503020204020204" charset="-122"/>
                 <a:ea typeface="微软雅黑" panose="020B0503020204020204" charset="-122"/>
               </a:rPr>
-              <a:t>‹#›</a:t>
             </a:fld>
             <a:endParaRPr lang="zh-CN" altLang="en-US">
               <a:latin typeface="微软雅黑" panose="020B0503020204020204" charset="-122"/>
@@ -309,11 +302,6 @@
         </p:txBody>
       </p:sp>
     </p:spTree>
-    <p:extLst>
-      <p:ext uri="{BB962C8B-B14F-4D97-AF65-F5344CB8AC3E}">
-        <p14:creationId xmlns:p14="http://schemas.microsoft.com/office/powerpoint/2010/main" val="1"/>
-      </p:ext>
-    </p:extLst>
   </p:cSld>
   <p:clrMap bg1="lt1" tx1="dk1" bg2="lt2" tx2="dk2" accent1="accent1" accent2="accent2" accent3="accent3" accent4="accent4" accent5="accent5" accent6="accent6" hlink="hlink" folHlink="folHlink"/>
 </p:handoutMaster>
@@ -407,7 +395,6 @@
           <a:p>
             <a:fld id="{1AC49D05-6128-4D0D-A32A-06A5E73B386C}" type="datetimeFigureOut">
               <a:rPr lang="zh-CN" altLang="en-US" smtClean="0"/>
-              <a:t>2022/8/15</a:t>
             </a:fld>
             <a:endParaRPr lang="zh-CN" altLang="en-US"/>
           </a:p>
@@ -474,6 +461,7 @@
               <a:rPr lang="zh-CN" altLang="en-US"/>
               <a:t>单击此处编辑母版文本样式</a:t>
             </a:r>
+            <a:endParaRPr lang="zh-CN" altLang="en-US"/>
           </a:p>
           <a:p>
             <a:pPr lvl="1"/>
@@ -481,6 +469,7 @@
               <a:rPr lang="zh-CN" altLang="en-US"/>
               <a:t>第二级</a:t>
             </a:r>
+            <a:endParaRPr lang="zh-CN" altLang="en-US"/>
           </a:p>
           <a:p>
             <a:pPr lvl="2"/>
@@ -488,6 +477,7 @@
               <a:rPr lang="zh-CN" altLang="en-US"/>
               <a:t>第三级</a:t>
             </a:r>
+            <a:endParaRPr lang="zh-CN" altLang="en-US"/>
           </a:p>
           <a:p>
             <a:pPr lvl="3"/>
@@ -495,6 +485,7 @@
               <a:rPr lang="zh-CN" altLang="en-US"/>
               <a:t>第四级</a:t>
             </a:r>
+            <a:endParaRPr lang="zh-CN" altLang="en-US"/>
           </a:p>
           <a:p>
             <a:pPr lvl="4"/>
@@ -502,6 +493,7 @@
               <a:rPr lang="zh-CN" altLang="en-US"/>
               <a:t>第五级</a:t>
             </a:r>
+            <a:endParaRPr lang="zh-CN" altLang="en-US"/>
           </a:p>
         </p:txBody>
       </p:sp>
@@ -571,7 +563,6 @@
           <a:p>
             <a:fld id="{5849F42C-2DAE-424C-A4B8-3140182C3E9F}" type="slidenum">
               <a:rPr lang="zh-CN" altLang="en-US" smtClean="0"/>
-              <a:t>‹#›</a:t>
             </a:fld>
             <a:endParaRPr lang="zh-CN" altLang="en-US"/>
           </a:p>
@@ -723,6 +714,7 @@
               <a:rPr lang="zh-CN" altLang="en-US"/>
               <a:t>ss</a:t>
             </a:r>
+            <a:endParaRPr lang="zh-CN" altLang="en-US"/>
           </a:p>
         </p:txBody>
       </p:sp>
@@ -743,7 +735,6 @@
           <a:p>
             <a:fld id="{85D0DACE-38E0-42D2-9336-2B707D34BC6D}" type="slidenum">
               <a:rPr lang="zh-CN" altLang="en-US" smtClean="0"/>
-              <a:t>1</a:t>
             </a:fld>
             <a:endParaRPr lang="zh-CN" altLang="en-US"/>
           </a:p>
@@ -862,11 +853,6 @@
         </p:txBody>
       </p:sp>
     </p:spTree>
-    <p:extLst>
-      <p:ext uri="{BB962C8B-B14F-4D97-AF65-F5344CB8AC3E}">
-        <p14:creationId xmlns:p14="http://schemas.microsoft.com/office/powerpoint/2010/main" val="687258962"/>
-      </p:ext>
-    </p:extLst>
   </p:cSld>
   <p:clrMapOvr>
     <a:masterClrMapping/>
@@ -948,6 +934,11 @@
               </a:rPr>
               <a:t>群报名：</a:t>
             </a:r>
+            <a:endParaRPr lang="zh-CN" altLang="en-US" sz="3600">
+              <a:latin typeface="+mj-ea"/>
+              <a:ea typeface="+mj-ea"/>
+              <a:cs typeface="+mj-ea"/>
+            </a:endParaRPr>
           </a:p>
         </p:txBody>
       </p:sp>
@@ -985,7 +976,7 @@
           <p:nvPr>
             <p:ph type="body" idx="1"/>
             <p:custDataLst>
-              <p:tags r:id="rId1"/>
+              <p:tags r:id="rId2"/>
             </p:custDataLst>
           </p:nvPr>
         </p:nvSpPr>
@@ -1100,6 +1091,7 @@
               <a:rPr lang="zh-CN" altLang="en-US" dirty="0"/>
               <a:t>单击此处编辑母版文本样式</a:t>
             </a:r>
+            <a:endParaRPr lang="zh-CN" altLang="en-US" dirty="0"/>
           </a:p>
         </p:txBody>
       </p:sp>
@@ -1133,6 +1125,10 @@
               </a:rPr>
               <a:t>扩展阅读</a:t>
             </a:r>
+            <a:endParaRPr lang="zh-CN" altLang="en-US" sz="2800" b="1">
+              <a:latin typeface="+mj-ea"/>
+              <a:ea typeface="+mj-ea"/>
+            </a:endParaRPr>
           </a:p>
         </p:txBody>
       </p:sp>
@@ -1170,7 +1166,7 @@
           <p:nvPr>
             <p:ph type="dt" sz="half" idx="10"/>
             <p:custDataLst>
-              <p:tags r:id="rId1"/>
+              <p:tags r:id="rId2"/>
             </p:custDataLst>
           </p:nvPr>
         </p:nvSpPr>
@@ -1186,7 +1182,6 @@
           <a:p>
             <a:fld id="{9EFD9D74-47D9-4702-A33C-335B63B48DBF}" type="datetimeFigureOut">
               <a:rPr lang="zh-CN" altLang="en-US" smtClean="0"/>
-              <a:t>2022/8/15</a:t>
             </a:fld>
             <a:endParaRPr lang="zh-CN" altLang="en-US" dirty="0"/>
           </a:p>
@@ -1201,7 +1196,7 @@
           <p:nvPr>
             <p:ph type="ftr" sz="quarter" idx="11"/>
             <p:custDataLst>
-              <p:tags r:id="rId2"/>
+              <p:tags r:id="rId3"/>
             </p:custDataLst>
           </p:nvPr>
         </p:nvSpPr>
@@ -1228,7 +1223,7 @@
           <p:nvPr>
             <p:ph type="sldNum" sz="quarter" idx="12"/>
             <p:custDataLst>
-              <p:tags r:id="rId3"/>
+              <p:tags r:id="rId4"/>
             </p:custDataLst>
           </p:nvPr>
         </p:nvSpPr>
@@ -1244,7 +1239,6 @@
           <a:p>
             <a:fld id="{FABC47A4-756D-490B-A52F-7D9E2C9FC05F}" type="slidenum">
               <a:rPr lang="zh-CN" altLang="en-US" smtClean="0"/>
-              <a:t>‹#›</a:t>
             </a:fld>
             <a:endParaRPr lang="zh-CN" altLang="en-US"/>
           </a:p>
@@ -1281,6 +1275,11 @@
               </a:rPr>
               <a:t>问答</a:t>
             </a:r>
+            <a:endParaRPr lang="zh-CN" altLang="en-US" sz="5400">
+              <a:latin typeface="+mj-ea"/>
+              <a:ea typeface="+mj-ea"/>
+              <a:cs typeface="+mj-ea"/>
+            </a:endParaRPr>
           </a:p>
         </p:txBody>
       </p:sp>
@@ -1318,7 +1317,7 @@
           <p:nvPr>
             <p:ph type="body" idx="1"/>
             <p:custDataLst>
-              <p:tags r:id="rId1"/>
+              <p:tags r:id="rId2"/>
             </p:custDataLst>
           </p:nvPr>
         </p:nvSpPr>
@@ -1433,6 +1432,7 @@
               <a:rPr lang="zh-CN" altLang="en-US" dirty="0"/>
               <a:t>单击此处编辑母版文本样式</a:t>
             </a:r>
+            <a:endParaRPr lang="zh-CN" altLang="en-US" dirty="0"/>
           </a:p>
         </p:txBody>
       </p:sp>
@@ -1466,6 +1466,10 @@
               </a:rPr>
               <a:t>下节课预告</a:t>
             </a:r>
+            <a:endParaRPr lang="zh-CN" altLang="en-US" sz="2800" b="1">
+              <a:latin typeface="+mj-ea"/>
+              <a:ea typeface="+mj-ea"/>
+            </a:endParaRPr>
           </a:p>
         </p:txBody>
       </p:sp>
@@ -1503,7 +1507,7 @@
           <p:nvPr>
             <p:ph type="dt" sz="half" idx="10"/>
             <p:custDataLst>
-              <p:tags r:id="rId1"/>
+              <p:tags r:id="rId2"/>
             </p:custDataLst>
           </p:nvPr>
         </p:nvSpPr>
@@ -1519,7 +1523,6 @@
           <a:p>
             <a:fld id="{760FBDFE-C587-4B4C-A407-44438C67B59E}" type="datetimeFigureOut">
               <a:rPr lang="zh-CN" altLang="en-US" smtClean="0"/>
-              <a:t>2022/8/15</a:t>
             </a:fld>
             <a:endParaRPr lang="zh-CN" altLang="en-US"/>
           </a:p>
@@ -1534,7 +1537,7 @@
           <p:nvPr>
             <p:ph type="ftr" sz="quarter" idx="11"/>
             <p:custDataLst>
-              <p:tags r:id="rId2"/>
+              <p:tags r:id="rId3"/>
             </p:custDataLst>
           </p:nvPr>
         </p:nvSpPr>
@@ -1561,7 +1564,7 @@
           <p:nvPr>
             <p:ph type="sldNum" sz="quarter" idx="12"/>
             <p:custDataLst>
-              <p:tags r:id="rId3"/>
+              <p:tags r:id="rId4"/>
             </p:custDataLst>
           </p:nvPr>
         </p:nvSpPr>
@@ -1577,7 +1580,6 @@
           <a:p>
             <a:fld id="{49AE70B2-8BF9-45C0-BB95-33D1B9D3A854}" type="slidenum">
               <a:rPr lang="zh-CN" altLang="en-US" smtClean="0"/>
-              <a:t>‹#›</a:t>
             </a:fld>
             <a:endParaRPr lang="zh-CN" altLang="en-US"/>
           </a:p>
@@ -1592,7 +1594,7 @@
           <p:nvPr>
             <p:ph type="title" hasCustomPrompt="1"/>
             <p:custDataLst>
-              <p:tags r:id="rId4"/>
+              <p:tags r:id="rId5"/>
             </p:custDataLst>
           </p:nvPr>
         </p:nvSpPr>
@@ -1639,6 +1641,9 @@
               </a:rPr>
               <a:t>单击此处编辑标题</a:t>
             </a:r>
+            <a:endParaRPr>
+              <a:sym typeface="+mn-ea"/>
+            </a:endParaRPr>
           </a:p>
         </p:txBody>
       </p:sp>
@@ -1676,7 +1681,7 @@
           <p:nvPr>
             <p:ph type="dt" sz="half" idx="10"/>
             <p:custDataLst>
-              <p:tags r:id="rId1"/>
+              <p:tags r:id="rId2"/>
             </p:custDataLst>
           </p:nvPr>
         </p:nvSpPr>
@@ -1692,7 +1697,6 @@
           <a:p>
             <a:fld id="{9EFD9D74-47D9-4702-A33C-335B63B48DBF}" type="datetimeFigureOut">
               <a:rPr lang="zh-CN" altLang="en-US" smtClean="0"/>
-              <a:t>2022/8/15</a:t>
             </a:fld>
             <a:endParaRPr lang="zh-CN" altLang="en-US" dirty="0"/>
           </a:p>
@@ -1707,7 +1711,7 @@
           <p:nvPr>
             <p:ph type="ftr" sz="quarter" idx="11"/>
             <p:custDataLst>
-              <p:tags r:id="rId2"/>
+              <p:tags r:id="rId3"/>
             </p:custDataLst>
           </p:nvPr>
         </p:nvSpPr>
@@ -1734,7 +1738,7 @@
           <p:nvPr>
             <p:ph type="sldNum" sz="quarter" idx="12"/>
             <p:custDataLst>
-              <p:tags r:id="rId3"/>
+              <p:tags r:id="rId4"/>
             </p:custDataLst>
           </p:nvPr>
         </p:nvSpPr>
@@ -1750,7 +1754,6 @@
           <a:p>
             <a:fld id="{FABC47A4-756D-490B-A52F-7D9E2C9FC05F}" type="slidenum">
               <a:rPr lang="zh-CN" altLang="en-US" smtClean="0"/>
-              <a:t>‹#›</a:t>
             </a:fld>
             <a:endParaRPr lang="zh-CN" altLang="en-US"/>
           </a:p>
@@ -1795,6 +1798,11 @@
               </a:rPr>
               <a:t>~</a:t>
             </a:r>
+            <a:endParaRPr lang="en-US" altLang="zh-CN" sz="5400">
+              <a:latin typeface="+mj-ea"/>
+              <a:ea typeface="+mj-ea"/>
+              <a:cs typeface="+mj-ea"/>
+            </a:endParaRPr>
           </a:p>
         </p:txBody>
       </p:sp>
@@ -1832,7 +1840,7 @@
           <p:nvPr>
             <p:ph type="title"/>
             <p:custDataLst>
-              <p:tags r:id="rId1"/>
+              <p:tags r:id="rId2"/>
             </p:custDataLst>
           </p:nvPr>
         </p:nvSpPr>
@@ -1872,6 +1880,9 @@
               </a:rPr>
               <a:t>单击此处编辑母版标题样式</a:t>
             </a:r>
+            <a:endParaRPr dirty="0">
+              <a:sym typeface="+mn-ea"/>
+            </a:endParaRPr>
           </a:p>
         </p:txBody>
       </p:sp>
@@ -1884,7 +1895,7 @@
           <p:nvPr>
             <p:ph sz="half" idx="1"/>
             <p:custDataLst>
-              <p:tags r:id="rId2"/>
+              <p:tags r:id="rId3"/>
             </p:custDataLst>
           </p:nvPr>
         </p:nvSpPr>
@@ -2041,6 +2052,9 @@
               </a:rPr>
               <a:t>单击此处编辑母版文本样式</a:t>
             </a:r>
+            <a:endParaRPr dirty="0">
+              <a:sym typeface="+mn-ea"/>
+            </a:endParaRPr>
           </a:p>
           <a:p>
             <a:pPr lvl="1"/>
@@ -2050,6 +2064,9 @@
               </a:rPr>
               <a:t>第二级</a:t>
             </a:r>
+            <a:endParaRPr dirty="0">
+              <a:sym typeface="+mn-ea"/>
+            </a:endParaRPr>
           </a:p>
           <a:p>
             <a:pPr lvl="2"/>
@@ -2059,6 +2076,9 @@
               </a:rPr>
               <a:t>第三级</a:t>
             </a:r>
+            <a:endParaRPr dirty="0">
+              <a:sym typeface="+mn-ea"/>
+            </a:endParaRPr>
           </a:p>
           <a:p>
             <a:pPr lvl="3"/>
@@ -2068,6 +2088,9 @@
               </a:rPr>
               <a:t>第四级</a:t>
             </a:r>
+            <a:endParaRPr dirty="0">
+              <a:sym typeface="+mn-ea"/>
+            </a:endParaRPr>
           </a:p>
           <a:p>
             <a:pPr lvl="4"/>
@@ -2077,6 +2100,9 @@
               </a:rPr>
               <a:t>第五级</a:t>
             </a:r>
+            <a:endParaRPr dirty="0">
+              <a:sym typeface="+mn-ea"/>
+            </a:endParaRPr>
           </a:p>
         </p:txBody>
       </p:sp>
@@ -2089,7 +2115,7 @@
           <p:nvPr>
             <p:ph sz="half" idx="2"/>
             <p:custDataLst>
-              <p:tags r:id="rId3"/>
+              <p:tags r:id="rId4"/>
             </p:custDataLst>
           </p:nvPr>
         </p:nvSpPr>
@@ -2161,6 +2187,7 @@
               <a:rPr lang="zh-CN" altLang="en-US" dirty="0"/>
               <a:t>单击此处编辑母版文本样式</a:t>
             </a:r>
+            <a:endParaRPr lang="zh-CN" altLang="en-US" dirty="0"/>
           </a:p>
           <a:p>
             <a:pPr lvl="1"/>
@@ -2168,6 +2195,7 @@
               <a:rPr lang="zh-CN" altLang="en-US" dirty="0"/>
               <a:t>第二级</a:t>
             </a:r>
+            <a:endParaRPr lang="zh-CN" altLang="en-US" dirty="0"/>
           </a:p>
           <a:p>
             <a:pPr lvl="2"/>
@@ -2175,6 +2203,7 @@
               <a:rPr lang="zh-CN" altLang="en-US" dirty="0"/>
               <a:t>第三级</a:t>
             </a:r>
+            <a:endParaRPr lang="zh-CN" altLang="en-US" dirty="0"/>
           </a:p>
           <a:p>
             <a:pPr lvl="3"/>
@@ -2182,6 +2211,7 @@
               <a:rPr lang="zh-CN" altLang="en-US" dirty="0"/>
               <a:t>第四级</a:t>
             </a:r>
+            <a:endParaRPr lang="zh-CN" altLang="en-US" dirty="0"/>
           </a:p>
           <a:p>
             <a:pPr lvl="4"/>
@@ -2189,6 +2219,7 @@
               <a:rPr lang="zh-CN" altLang="en-US" dirty="0"/>
               <a:t>第五级</a:t>
             </a:r>
+            <a:endParaRPr lang="zh-CN" altLang="en-US" dirty="0"/>
           </a:p>
         </p:txBody>
       </p:sp>
@@ -2201,7 +2232,7 @@
           <p:nvPr>
             <p:ph type="dt" sz="half" idx="10"/>
             <p:custDataLst>
-              <p:tags r:id="rId4"/>
+              <p:tags r:id="rId5"/>
             </p:custDataLst>
           </p:nvPr>
         </p:nvSpPr>
@@ -2217,7 +2248,6 @@
           <a:p>
             <a:fld id="{760FBDFE-C587-4B4C-A407-44438C67B59E}" type="datetimeFigureOut">
               <a:rPr lang="zh-CN" altLang="en-US" smtClean="0"/>
-              <a:t>2022/8/15</a:t>
             </a:fld>
             <a:endParaRPr lang="zh-CN" altLang="en-US"/>
           </a:p>
@@ -2232,7 +2262,7 @@
           <p:nvPr>
             <p:ph type="ftr" sz="quarter" idx="11"/>
             <p:custDataLst>
-              <p:tags r:id="rId5"/>
+              <p:tags r:id="rId6"/>
             </p:custDataLst>
           </p:nvPr>
         </p:nvSpPr>
@@ -2259,7 +2289,7 @@
           <p:nvPr>
             <p:ph type="sldNum" sz="quarter" idx="12"/>
             <p:custDataLst>
-              <p:tags r:id="rId6"/>
+              <p:tags r:id="rId7"/>
             </p:custDataLst>
           </p:nvPr>
         </p:nvSpPr>
@@ -2275,7 +2305,6 @@
           <a:p>
             <a:fld id="{49AE70B2-8BF9-45C0-BB95-33D1B9D3A854}" type="slidenum">
               <a:rPr lang="zh-CN" altLang="en-US" smtClean="0"/>
-              <a:t>‹#›</a:t>
             </a:fld>
             <a:endParaRPr lang="zh-CN" altLang="en-US"/>
           </a:p>
@@ -2315,7 +2344,7 @@
           <p:nvPr>
             <p:ph type="title"/>
             <p:custDataLst>
-              <p:tags r:id="rId1"/>
+              <p:tags r:id="rId2"/>
             </p:custDataLst>
           </p:nvPr>
         </p:nvSpPr>
@@ -2355,6 +2384,9 @@
               </a:rPr>
               <a:t>单击此处编辑母版标题样式</a:t>
             </a:r>
+            <a:endParaRPr dirty="0">
+              <a:sym typeface="+mn-ea"/>
+            </a:endParaRPr>
           </a:p>
         </p:txBody>
       </p:sp>
@@ -2367,7 +2399,7 @@
           <p:nvPr>
             <p:ph type="body" idx="1" hasCustomPrompt="1"/>
             <p:custDataLst>
-              <p:tags r:id="rId2"/>
+              <p:tags r:id="rId3"/>
             </p:custDataLst>
           </p:nvPr>
         </p:nvSpPr>
@@ -2436,6 +2468,7 @@
               <a:rPr lang="zh-CN" altLang="en-US" dirty="0"/>
               <a:t>单击此处编辑文本</a:t>
             </a:r>
+            <a:endParaRPr lang="zh-CN" altLang="en-US" dirty="0"/>
           </a:p>
         </p:txBody>
       </p:sp>
@@ -2448,7 +2481,7 @@
           <p:nvPr>
             <p:ph sz="half" idx="2"/>
             <p:custDataLst>
-              <p:tags r:id="rId3"/>
+              <p:tags r:id="rId4"/>
             </p:custDataLst>
           </p:nvPr>
         </p:nvSpPr>
@@ -2605,6 +2638,9 @@
               </a:rPr>
               <a:t>单击此处编辑母版文本样式</a:t>
             </a:r>
+            <a:endParaRPr dirty="0">
+              <a:sym typeface="+mn-ea"/>
+            </a:endParaRPr>
           </a:p>
           <a:p>
             <a:pPr lvl="1"/>
@@ -2614,6 +2650,9 @@
               </a:rPr>
               <a:t>第二级</a:t>
             </a:r>
+            <a:endParaRPr dirty="0">
+              <a:sym typeface="+mn-ea"/>
+            </a:endParaRPr>
           </a:p>
           <a:p>
             <a:pPr lvl="2"/>
@@ -2623,6 +2662,9 @@
               </a:rPr>
               <a:t>第三级</a:t>
             </a:r>
+            <a:endParaRPr dirty="0">
+              <a:sym typeface="+mn-ea"/>
+            </a:endParaRPr>
           </a:p>
           <a:p>
             <a:pPr lvl="3"/>
@@ -2632,6 +2674,9 @@
               </a:rPr>
               <a:t>第四级</a:t>
             </a:r>
+            <a:endParaRPr dirty="0">
+              <a:sym typeface="+mn-ea"/>
+            </a:endParaRPr>
           </a:p>
           <a:p>
             <a:pPr lvl="4"/>
@@ -2641,6 +2686,9 @@
               </a:rPr>
               <a:t>第五级</a:t>
             </a:r>
+            <a:endParaRPr dirty="0">
+              <a:sym typeface="+mn-ea"/>
+            </a:endParaRPr>
           </a:p>
         </p:txBody>
       </p:sp>
@@ -2653,7 +2701,7 @@
           <p:nvPr>
             <p:ph type="body" sz="quarter" idx="3" hasCustomPrompt="1"/>
             <p:custDataLst>
-              <p:tags r:id="rId4"/>
+              <p:tags r:id="rId5"/>
             </p:custDataLst>
           </p:nvPr>
         </p:nvSpPr>
@@ -2732,6 +2780,9 @@
               </a:rPr>
               <a:t>单击此处编辑文本</a:t>
             </a:r>
+            <a:endParaRPr>
+              <a:sym typeface="+mn-ea"/>
+            </a:endParaRPr>
           </a:p>
         </p:txBody>
       </p:sp>
@@ -2744,7 +2795,7 @@
           <p:nvPr>
             <p:ph sz="quarter" idx="4"/>
             <p:custDataLst>
-              <p:tags r:id="rId5"/>
+              <p:tags r:id="rId6"/>
             </p:custDataLst>
           </p:nvPr>
         </p:nvSpPr>
@@ -2901,6 +2952,9 @@
               </a:rPr>
               <a:t>单击此处编辑母版文本样式</a:t>
             </a:r>
+            <a:endParaRPr dirty="0">
+              <a:sym typeface="+mn-ea"/>
+            </a:endParaRPr>
           </a:p>
           <a:p>
             <a:pPr lvl="1"/>
@@ -2910,6 +2964,9 @@
               </a:rPr>
               <a:t>第二级</a:t>
             </a:r>
+            <a:endParaRPr dirty="0">
+              <a:sym typeface="+mn-ea"/>
+            </a:endParaRPr>
           </a:p>
           <a:p>
             <a:pPr lvl="2"/>
@@ -2919,6 +2976,9 @@
               </a:rPr>
               <a:t>第三级</a:t>
             </a:r>
+            <a:endParaRPr dirty="0">
+              <a:sym typeface="+mn-ea"/>
+            </a:endParaRPr>
           </a:p>
           <a:p>
             <a:pPr lvl="3"/>
@@ -2928,6 +2988,9 @@
               </a:rPr>
               <a:t>第四级</a:t>
             </a:r>
+            <a:endParaRPr dirty="0">
+              <a:sym typeface="+mn-ea"/>
+            </a:endParaRPr>
           </a:p>
           <a:p>
             <a:pPr lvl="4"/>
@@ -2937,6 +3000,9 @@
               </a:rPr>
               <a:t>第五级</a:t>
             </a:r>
+            <a:endParaRPr dirty="0">
+              <a:sym typeface="+mn-ea"/>
+            </a:endParaRPr>
           </a:p>
         </p:txBody>
       </p:sp>
@@ -2949,7 +3015,7 @@
           <p:nvPr>
             <p:ph type="dt" sz="half" idx="10"/>
             <p:custDataLst>
-              <p:tags r:id="rId6"/>
+              <p:tags r:id="rId7"/>
             </p:custDataLst>
           </p:nvPr>
         </p:nvSpPr>
@@ -2965,7 +3031,6 @@
           <a:p>
             <a:fld id="{760FBDFE-C587-4B4C-A407-44438C67B59E}" type="datetimeFigureOut">
               <a:rPr lang="zh-CN" altLang="en-US" smtClean="0"/>
-              <a:t>2022/8/15</a:t>
             </a:fld>
             <a:endParaRPr lang="zh-CN" altLang="en-US"/>
           </a:p>
@@ -2980,7 +3045,7 @@
           <p:nvPr>
             <p:ph type="ftr" sz="quarter" idx="11"/>
             <p:custDataLst>
-              <p:tags r:id="rId7"/>
+              <p:tags r:id="rId8"/>
             </p:custDataLst>
           </p:nvPr>
         </p:nvSpPr>
@@ -3007,7 +3072,7 @@
           <p:nvPr>
             <p:ph type="sldNum" sz="quarter" idx="12"/>
             <p:custDataLst>
-              <p:tags r:id="rId8"/>
+              <p:tags r:id="rId9"/>
             </p:custDataLst>
           </p:nvPr>
         </p:nvSpPr>
@@ -3023,7 +3088,6 @@
           <a:p>
             <a:fld id="{49AE70B2-8BF9-45C0-BB95-33D1B9D3A854}" type="slidenum">
               <a:rPr lang="zh-CN" altLang="en-US" smtClean="0"/>
-              <a:t>‹#›</a:t>
             </a:fld>
             <a:endParaRPr lang="zh-CN" altLang="en-US"/>
           </a:p>
@@ -3063,7 +3127,7 @@
           <p:nvPr>
             <p:ph type="title"/>
             <p:custDataLst>
-              <p:tags r:id="rId1"/>
+              <p:tags r:id="rId2"/>
             </p:custDataLst>
           </p:nvPr>
         </p:nvSpPr>
@@ -3103,6 +3167,9 @@
               </a:rPr>
               <a:t>单击此处编辑母版标题样式</a:t>
             </a:r>
+            <a:endParaRPr>
+              <a:sym typeface="+mn-ea"/>
+            </a:endParaRPr>
           </a:p>
         </p:txBody>
       </p:sp>
@@ -3115,7 +3182,7 @@
           <p:nvPr>
             <p:ph type="dt" sz="half" idx="10"/>
             <p:custDataLst>
-              <p:tags r:id="rId2"/>
+              <p:tags r:id="rId3"/>
             </p:custDataLst>
           </p:nvPr>
         </p:nvSpPr>
@@ -3131,7 +3198,6 @@
           <a:p>
             <a:fld id="{760FBDFE-C587-4B4C-A407-44438C67B59E}" type="datetimeFigureOut">
               <a:rPr lang="zh-CN" altLang="en-US" smtClean="0"/>
-              <a:t>2022/8/15</a:t>
             </a:fld>
             <a:endParaRPr lang="zh-CN" altLang="en-US"/>
           </a:p>
@@ -3146,7 +3212,7 @@
           <p:nvPr>
             <p:ph type="ftr" sz="quarter" idx="11"/>
             <p:custDataLst>
-              <p:tags r:id="rId3"/>
+              <p:tags r:id="rId4"/>
             </p:custDataLst>
           </p:nvPr>
         </p:nvSpPr>
@@ -3173,7 +3239,7 @@
           <p:nvPr>
             <p:ph type="sldNum" sz="quarter" idx="12"/>
             <p:custDataLst>
-              <p:tags r:id="rId4"/>
+              <p:tags r:id="rId5"/>
             </p:custDataLst>
           </p:nvPr>
         </p:nvSpPr>
@@ -3189,7 +3255,6 @@
           <a:p>
             <a:fld id="{49AE70B2-8BF9-45C0-BB95-33D1B9D3A854}" type="slidenum">
               <a:rPr lang="zh-CN" altLang="en-US" smtClean="0"/>
-              <a:t>‹#›</a:t>
             </a:fld>
             <a:endParaRPr lang="zh-CN" altLang="en-US"/>
           </a:p>
@@ -3229,7 +3294,7 @@
           <p:nvPr>
             <p:ph type="dt" sz="half" idx="10"/>
             <p:custDataLst>
-              <p:tags r:id="rId1"/>
+              <p:tags r:id="rId2"/>
             </p:custDataLst>
           </p:nvPr>
         </p:nvSpPr>
@@ -3245,7 +3310,6 @@
           <a:p>
             <a:fld id="{760FBDFE-C587-4B4C-A407-44438C67B59E}" type="datetimeFigureOut">
               <a:rPr lang="zh-CN" altLang="en-US" smtClean="0"/>
-              <a:t>2022/8/15</a:t>
             </a:fld>
             <a:endParaRPr lang="zh-CN" altLang="en-US"/>
           </a:p>
@@ -3260,7 +3324,7 @@
           <p:nvPr>
             <p:ph type="ftr" sz="quarter" idx="11"/>
             <p:custDataLst>
-              <p:tags r:id="rId2"/>
+              <p:tags r:id="rId3"/>
             </p:custDataLst>
           </p:nvPr>
         </p:nvSpPr>
@@ -3287,7 +3351,7 @@
           <p:nvPr>
             <p:ph type="sldNum" sz="quarter" idx="12"/>
             <p:custDataLst>
-              <p:tags r:id="rId3"/>
+              <p:tags r:id="rId4"/>
             </p:custDataLst>
           </p:nvPr>
         </p:nvSpPr>
@@ -3303,7 +3367,6 @@
           <a:p>
             <a:fld id="{49AE70B2-8BF9-45C0-BB95-33D1B9D3A854}" type="slidenum">
               <a:rPr lang="zh-CN" altLang="en-US" smtClean="0"/>
-              <a:t>‹#›</a:t>
             </a:fld>
             <a:endParaRPr lang="zh-CN" altLang="en-US"/>
           </a:p>
@@ -3343,7 +3406,7 @@
           <p:nvPr>
             <p:ph type="pic" idx="1"/>
             <p:custDataLst>
-              <p:tags r:id="rId1"/>
+              <p:tags r:id="rId2"/>
             </p:custDataLst>
           </p:nvPr>
         </p:nvSpPr>
@@ -3497,7 +3560,7 @@
           <p:nvPr>
             <p:ph type="body" sz="half" idx="2"/>
             <p:custDataLst>
-              <p:tags r:id="rId2"/>
+              <p:tags r:id="rId3"/>
             </p:custDataLst>
           </p:nvPr>
         </p:nvSpPr>
@@ -3547,6 +3610,9 @@
               </a:rPr>
               <a:t>单击此处编辑母版文本样式</a:t>
             </a:r>
+            <a:endParaRPr>
+              <a:sym typeface="+mn-ea"/>
+            </a:endParaRPr>
           </a:p>
         </p:txBody>
       </p:sp>
@@ -3559,7 +3625,7 @@
           <p:nvPr>
             <p:ph type="dt" sz="half" idx="10"/>
             <p:custDataLst>
-              <p:tags r:id="rId3"/>
+              <p:tags r:id="rId4"/>
             </p:custDataLst>
           </p:nvPr>
         </p:nvSpPr>
@@ -3575,7 +3641,6 @@
           <a:p>
             <a:fld id="{9EFD9D74-47D9-4702-A33C-335B63B48DBF}" type="datetimeFigureOut">
               <a:rPr lang="zh-CN" altLang="en-US" smtClean="0"/>
-              <a:t>2022/8/15</a:t>
             </a:fld>
             <a:endParaRPr lang="zh-CN" altLang="en-US" dirty="0"/>
           </a:p>
@@ -3590,7 +3655,7 @@
           <p:nvPr>
             <p:ph type="ftr" sz="quarter" idx="11"/>
             <p:custDataLst>
-              <p:tags r:id="rId4"/>
+              <p:tags r:id="rId5"/>
             </p:custDataLst>
           </p:nvPr>
         </p:nvSpPr>
@@ -3617,7 +3682,7 @@
           <p:nvPr>
             <p:ph type="sldNum" sz="quarter" idx="12"/>
             <p:custDataLst>
-              <p:tags r:id="rId5"/>
+              <p:tags r:id="rId6"/>
             </p:custDataLst>
           </p:nvPr>
         </p:nvSpPr>
@@ -3633,7 +3698,6 @@
           <a:p>
             <a:fld id="{FABC47A4-756D-490B-A52F-7D9E2C9FC05F}" type="slidenum">
               <a:rPr lang="zh-CN" altLang="en-US" smtClean="0"/>
-              <a:t>‹#›</a:t>
             </a:fld>
             <a:endParaRPr lang="zh-CN" altLang="en-US"/>
           </a:p>
@@ -3648,7 +3712,7 @@
           <p:nvPr>
             <p:ph type="title"/>
             <p:custDataLst>
-              <p:tags r:id="rId6"/>
+              <p:tags r:id="rId7"/>
             </p:custDataLst>
           </p:nvPr>
         </p:nvSpPr>
@@ -3666,6 +3730,7 @@
               <a:rPr lang="zh-CN" altLang="en-US"/>
               <a:t>单击此处编辑母版标题样式</a:t>
             </a:r>
+            <a:endParaRPr lang="zh-CN" altLang="en-US"/>
           </a:p>
         </p:txBody>
       </p:sp>
@@ -3703,7 +3768,7 @@
           <p:nvPr>
             <p:ph type="body" idx="1"/>
             <p:custDataLst>
-              <p:tags r:id="rId1"/>
+              <p:tags r:id="rId2"/>
             </p:custDataLst>
           </p:nvPr>
         </p:nvSpPr>
@@ -3818,6 +3883,7 @@
               <a:rPr lang="zh-CN" altLang="en-US" dirty="0"/>
               <a:t>单击此处编辑母版文本样式</a:t>
             </a:r>
+            <a:endParaRPr lang="zh-CN" altLang="en-US" dirty="0"/>
           </a:p>
         </p:txBody>
       </p:sp>
@@ -3830,7 +3896,7 @@
           <p:nvPr>
             <p:ph type="title"/>
             <p:custDataLst>
-              <p:tags r:id="rId2"/>
+              <p:tags r:id="rId3"/>
             </p:custDataLst>
           </p:nvPr>
         </p:nvSpPr>
@@ -3870,6 +3936,9 @@
               </a:rPr>
               <a:t>单击此处编辑母版标题样式</a:t>
             </a:r>
+            <a:endParaRPr>
+              <a:sym typeface="+mn-ea"/>
+            </a:endParaRPr>
           </a:p>
         </p:txBody>
       </p:sp>
@@ -3907,7 +3976,7 @@
           <p:nvPr>
             <p:ph type="title" orient="vert"/>
             <p:custDataLst>
-              <p:tags r:id="rId1"/>
+              <p:tags r:id="rId2"/>
             </p:custDataLst>
           </p:nvPr>
         </p:nvSpPr>
@@ -3950,6 +4019,9 @@
               </a:rPr>
               <a:t>单击此处编辑母版标题样式</a:t>
             </a:r>
+            <a:endParaRPr>
+              <a:sym typeface="+mn-ea"/>
+            </a:endParaRPr>
           </a:p>
         </p:txBody>
       </p:sp>
@@ -3962,7 +4034,7 @@
           <p:nvPr>
             <p:ph type="body" orient="vert" idx="1"/>
             <p:custDataLst>
-              <p:tags r:id="rId2"/>
+              <p:tags r:id="rId3"/>
             </p:custDataLst>
           </p:nvPr>
         </p:nvSpPr>
@@ -4032,6 +4104,7 @@
               <a:rPr lang="zh-CN" altLang="en-US" dirty="0"/>
               <a:t>单击此处编辑母版文本样式</a:t>
             </a:r>
+            <a:endParaRPr lang="zh-CN" altLang="en-US" dirty="0"/>
           </a:p>
           <a:p>
             <a:pPr lvl="1"/>
@@ -4039,6 +4112,7 @@
               <a:rPr lang="zh-CN" altLang="en-US" dirty="0"/>
               <a:t>第二级</a:t>
             </a:r>
+            <a:endParaRPr lang="zh-CN" altLang="en-US" dirty="0"/>
           </a:p>
           <a:p>
             <a:pPr lvl="2"/>
@@ -4046,6 +4120,7 @@
               <a:rPr lang="zh-CN" altLang="en-US" dirty="0"/>
               <a:t>第三级</a:t>
             </a:r>
+            <a:endParaRPr lang="zh-CN" altLang="en-US" dirty="0"/>
           </a:p>
           <a:p>
             <a:pPr lvl="3"/>
@@ -4053,6 +4128,7 @@
               <a:rPr lang="zh-CN" altLang="en-US" dirty="0"/>
               <a:t>第四级</a:t>
             </a:r>
+            <a:endParaRPr lang="zh-CN" altLang="en-US" dirty="0"/>
           </a:p>
           <a:p>
             <a:pPr lvl="4"/>
@@ -4060,6 +4136,7 @@
               <a:rPr lang="zh-CN" altLang="en-US" dirty="0"/>
               <a:t>第五级</a:t>
             </a:r>
+            <a:endParaRPr lang="zh-CN" altLang="en-US" dirty="0"/>
           </a:p>
         </p:txBody>
       </p:sp>
@@ -4072,7 +4149,7 @@
           <p:nvPr>
             <p:ph type="dt" sz="half" idx="10"/>
             <p:custDataLst>
-              <p:tags r:id="rId3"/>
+              <p:tags r:id="rId4"/>
             </p:custDataLst>
           </p:nvPr>
         </p:nvSpPr>
@@ -4088,7 +4165,6 @@
           <a:p>
             <a:fld id="{760FBDFE-C587-4B4C-A407-44438C67B59E}" type="datetimeFigureOut">
               <a:rPr lang="zh-CN" altLang="en-US" smtClean="0"/>
-              <a:t>2022/8/15</a:t>
             </a:fld>
             <a:endParaRPr lang="zh-CN" altLang="en-US"/>
           </a:p>
@@ -4103,7 +4179,7 @@
           <p:nvPr>
             <p:ph type="ftr" sz="quarter" idx="11"/>
             <p:custDataLst>
-              <p:tags r:id="rId4"/>
+              <p:tags r:id="rId5"/>
             </p:custDataLst>
           </p:nvPr>
         </p:nvSpPr>
@@ -4130,7 +4206,7 @@
           <p:nvPr>
             <p:ph type="sldNum" sz="quarter" idx="12"/>
             <p:custDataLst>
-              <p:tags r:id="rId5"/>
+              <p:tags r:id="rId6"/>
             </p:custDataLst>
           </p:nvPr>
         </p:nvSpPr>
@@ -4146,7 +4222,6 @@
           <a:p>
             <a:fld id="{49AE70B2-8BF9-45C0-BB95-33D1B9D3A854}" type="slidenum">
               <a:rPr lang="zh-CN" altLang="en-US" smtClean="0"/>
-              <a:t>‹#›</a:t>
             </a:fld>
             <a:endParaRPr lang="zh-CN" altLang="en-US"/>
           </a:p>
@@ -4186,7 +4261,7 @@
           <p:nvPr>
             <p:ph type="dt" sz="half" idx="10"/>
             <p:custDataLst>
-              <p:tags r:id="rId1"/>
+              <p:tags r:id="rId2"/>
             </p:custDataLst>
           </p:nvPr>
         </p:nvSpPr>
@@ -4202,7 +4277,6 @@
           <a:p>
             <a:fld id="{760FBDFE-C587-4B4C-A407-44438C67B59E}" type="datetimeFigureOut">
               <a:rPr lang="zh-CN" altLang="en-US" smtClean="0"/>
-              <a:t>2022/8/15</a:t>
             </a:fld>
             <a:endParaRPr lang="zh-CN" altLang="en-US"/>
           </a:p>
@@ -4217,7 +4291,7 @@
           <p:nvPr>
             <p:ph type="ftr" sz="quarter" idx="11"/>
             <p:custDataLst>
-              <p:tags r:id="rId2"/>
+              <p:tags r:id="rId3"/>
             </p:custDataLst>
           </p:nvPr>
         </p:nvSpPr>
@@ -4244,7 +4318,7 @@
           <p:nvPr>
             <p:ph type="sldNum" sz="quarter" idx="12"/>
             <p:custDataLst>
-              <p:tags r:id="rId3"/>
+              <p:tags r:id="rId4"/>
             </p:custDataLst>
           </p:nvPr>
         </p:nvSpPr>
@@ -4260,7 +4334,6 @@
           <a:p>
             <a:fld id="{49AE70B2-8BF9-45C0-BB95-33D1B9D3A854}" type="slidenum">
               <a:rPr lang="zh-CN" altLang="en-US" smtClean="0"/>
-              <a:t>‹#›</a:t>
             </a:fld>
             <a:endParaRPr lang="zh-CN" altLang="en-US"/>
           </a:p>
@@ -4275,7 +4348,7 @@
           <p:nvPr>
             <p:ph sz="quarter" idx="13"/>
             <p:custDataLst>
-              <p:tags r:id="rId4"/>
+              <p:tags r:id="rId5"/>
             </p:custDataLst>
           </p:nvPr>
         </p:nvSpPr>
@@ -4345,6 +4418,7 @@
               <a:rPr lang="zh-CN" altLang="en-US" dirty="0"/>
               <a:t>单击此处编辑母版文本样式</a:t>
             </a:r>
+            <a:endParaRPr lang="zh-CN" altLang="en-US" dirty="0"/>
           </a:p>
           <a:p>
             <a:pPr lvl="1"/>
@@ -4352,6 +4426,7 @@
               <a:rPr lang="zh-CN" altLang="en-US" dirty="0"/>
               <a:t>第二级</a:t>
             </a:r>
+            <a:endParaRPr lang="zh-CN" altLang="en-US" dirty="0"/>
           </a:p>
           <a:p>
             <a:pPr lvl="2"/>
@@ -4359,6 +4434,7 @@
               <a:rPr lang="zh-CN" altLang="en-US" dirty="0"/>
               <a:t>第三级</a:t>
             </a:r>
+            <a:endParaRPr lang="zh-CN" altLang="en-US" dirty="0"/>
           </a:p>
           <a:p>
             <a:pPr lvl="3"/>
@@ -4366,6 +4442,7 @@
               <a:rPr lang="zh-CN" altLang="en-US" dirty="0"/>
               <a:t>第四级</a:t>
             </a:r>
+            <a:endParaRPr lang="zh-CN" altLang="en-US" dirty="0"/>
           </a:p>
           <a:p>
             <a:pPr lvl="4"/>
@@ -4373,6 +4450,7 @@
               <a:rPr lang="zh-CN" altLang="en-US" dirty="0"/>
               <a:t>第五级</a:t>
             </a:r>
+            <a:endParaRPr lang="zh-CN" altLang="en-US" dirty="0"/>
           </a:p>
         </p:txBody>
       </p:sp>
@@ -4390,7 +4468,7 @@
     <p:bg>
       <p:bgPr>
         <a:blipFill rotWithShape="1">
-          <a:blip r:embed="rId3"/>
+          <a:blip r:embed="rId2"/>
           <a:stretch>
             <a:fillRect/>
           </a:stretch>
@@ -4437,6 +4515,7 @@
               <a:rPr lang="zh-CN" altLang="en-US"/>
               <a:t>单击此处编辑母版文本样式</a:t>
             </a:r>
+            <a:endParaRPr lang="zh-CN" altLang="en-US"/>
           </a:p>
           <a:p>
             <a:pPr lvl="1"/>
@@ -4444,6 +4523,7 @@
               <a:rPr lang="zh-CN" altLang="en-US"/>
               <a:t>第二级</a:t>
             </a:r>
+            <a:endParaRPr lang="zh-CN" altLang="en-US"/>
           </a:p>
           <a:p>
             <a:pPr lvl="2"/>
@@ -4451,6 +4531,7 @@
               <a:rPr lang="zh-CN" altLang="en-US"/>
               <a:t>第三级</a:t>
             </a:r>
+            <a:endParaRPr lang="zh-CN" altLang="en-US"/>
           </a:p>
           <a:p>
             <a:pPr lvl="3"/>
@@ -4458,6 +4539,7 @@
               <a:rPr lang="zh-CN" altLang="en-US"/>
               <a:t>第四级</a:t>
             </a:r>
+            <a:endParaRPr lang="zh-CN" altLang="en-US"/>
           </a:p>
           <a:p>
             <a:pPr lvl="4"/>
@@ -4465,6 +4547,7 @@
               <a:rPr lang="zh-CN" altLang="en-US"/>
               <a:t>第五级</a:t>
             </a:r>
+            <a:endParaRPr lang="zh-CN" altLang="en-US"/>
           </a:p>
         </p:txBody>
       </p:sp>
@@ -4490,7 +4573,6 @@
           <a:p>
             <a:fld id="{82F288E0-7875-42C4-84C8-98DBBD3BF4D2}" type="datetimeFigureOut">
               <a:rPr lang="zh-CN" altLang="en-US" smtClean="0"/>
-              <a:t>2022/8/15</a:t>
             </a:fld>
             <a:endParaRPr lang="zh-CN" altLang="en-US"/>
           </a:p>
@@ -4542,7 +4624,6 @@
           <a:p>
             <a:fld id="{7D9BB5D0-35E4-459D-AEF3-FE4D7C45CC19}" type="slidenum">
               <a:rPr lang="zh-CN" altLang="en-US" smtClean="0"/>
-              <a:t>‹#›</a:t>
             </a:fld>
             <a:endParaRPr lang="zh-CN" altLang="en-US"/>
           </a:p>
@@ -4557,7 +4638,7 @@
           <p:nvPr>
             <p:ph type="title"/>
             <p:custDataLst>
-              <p:tags r:id="rId1"/>
+              <p:tags r:id="rId3"/>
             </p:custDataLst>
           </p:nvPr>
         </p:nvSpPr>
@@ -4597,6 +4678,9 @@
               </a:rPr>
               <a:t>单击此处编辑母版标题样式</a:t>
             </a:r>
+            <a:endParaRPr>
+              <a:sym typeface="+mn-ea"/>
+            </a:endParaRPr>
           </a:p>
         </p:txBody>
       </p:sp>
@@ -4634,7 +4718,7 @@
           <p:nvPr>
             <p:ph type="title"/>
             <p:custDataLst>
-              <p:tags r:id="rId1"/>
+              <p:tags r:id="rId2"/>
             </p:custDataLst>
           </p:nvPr>
         </p:nvSpPr>
@@ -4674,6 +4758,9 @@
               </a:rPr>
               <a:t>单击此处编辑母版标题样式</a:t>
             </a:r>
+            <a:endParaRPr dirty="0">
+              <a:sym typeface="+mn-ea"/>
+            </a:endParaRPr>
           </a:p>
         </p:txBody>
       </p:sp>
@@ -4686,7 +4773,7 @@
           <p:nvPr>
             <p:ph type="body" idx="1" hasCustomPrompt="1"/>
             <p:custDataLst>
-              <p:tags r:id="rId2"/>
+              <p:tags r:id="rId3"/>
             </p:custDataLst>
           </p:nvPr>
         </p:nvSpPr>
@@ -4755,6 +4842,7 @@
               <a:rPr lang="zh-CN" altLang="en-US" dirty="0"/>
               <a:t>单击此处编辑文本</a:t>
             </a:r>
+            <a:endParaRPr lang="zh-CN" altLang="en-US" dirty="0"/>
           </a:p>
         </p:txBody>
       </p:sp>
@@ -4767,7 +4855,7 @@
           <p:nvPr>
             <p:ph sz="half" idx="2" hasCustomPrompt="1"/>
             <p:custDataLst>
-              <p:tags r:id="rId3"/>
+              <p:tags r:id="rId4"/>
             </p:custDataLst>
           </p:nvPr>
         </p:nvSpPr>
@@ -4933,7 +5021,7 @@
           <p:nvPr>
             <p:ph type="dt" sz="half" idx="10"/>
             <p:custDataLst>
-              <p:tags r:id="rId4"/>
+              <p:tags r:id="rId5"/>
             </p:custDataLst>
           </p:nvPr>
         </p:nvSpPr>
@@ -4949,7 +5037,6 @@
           <a:p>
             <a:fld id="{760FBDFE-C587-4B4C-A407-44438C67B59E}" type="datetimeFigureOut">
               <a:rPr lang="zh-CN" altLang="en-US" smtClean="0"/>
-              <a:t>2022/8/15</a:t>
             </a:fld>
             <a:endParaRPr lang="zh-CN" altLang="en-US"/>
           </a:p>
@@ -4964,7 +5051,7 @@
           <p:nvPr>
             <p:ph type="ftr" sz="quarter" idx="11"/>
             <p:custDataLst>
-              <p:tags r:id="rId5"/>
+              <p:tags r:id="rId6"/>
             </p:custDataLst>
           </p:nvPr>
         </p:nvSpPr>
@@ -4991,7 +5078,7 @@
           <p:nvPr>
             <p:ph type="sldNum" sz="quarter" idx="12"/>
             <p:custDataLst>
-              <p:tags r:id="rId6"/>
+              <p:tags r:id="rId7"/>
             </p:custDataLst>
           </p:nvPr>
         </p:nvSpPr>
@@ -5007,7 +5094,6 @@
           <a:p>
             <a:fld id="{49AE70B2-8BF9-45C0-BB95-33D1B9D3A854}" type="slidenum">
               <a:rPr lang="zh-CN" altLang="en-US" smtClean="0"/>
-              <a:t>‹#›</a:t>
             </a:fld>
             <a:endParaRPr lang="zh-CN" altLang="en-US"/>
           </a:p>
@@ -5047,7 +5133,7 @@
           <p:nvPr>
             <p:ph type="body" idx="1"/>
             <p:custDataLst>
-              <p:tags r:id="rId1"/>
+              <p:tags r:id="rId2"/>
             </p:custDataLst>
           </p:nvPr>
         </p:nvSpPr>
@@ -5162,6 +5248,7 @@
               <a:rPr lang="zh-CN" altLang="en-US" dirty="0"/>
               <a:t>单击此处编辑母版文本样式</a:t>
             </a:r>
+            <a:endParaRPr lang="zh-CN" altLang="en-US" dirty="0"/>
           </a:p>
         </p:txBody>
       </p:sp>
@@ -5195,6 +5282,10 @@
               </a:rPr>
               <a:t>回顾相关课程内容</a:t>
             </a:r>
+            <a:endParaRPr lang="zh-CN" altLang="en-US" sz="2800" b="1">
+              <a:latin typeface="+mj-ea"/>
+              <a:ea typeface="+mj-ea"/>
+            </a:endParaRPr>
           </a:p>
         </p:txBody>
       </p:sp>
@@ -5232,7 +5323,7 @@
           <p:nvPr>
             <p:ph type="body" idx="1"/>
             <p:custDataLst>
-              <p:tags r:id="rId1"/>
+              <p:tags r:id="rId2"/>
             </p:custDataLst>
           </p:nvPr>
         </p:nvSpPr>
@@ -5347,6 +5438,7 @@
               <a:rPr lang="zh-CN" altLang="en-US" dirty="0"/>
               <a:t>单击此处编辑母版文本样式</a:t>
             </a:r>
+            <a:endParaRPr lang="zh-CN" altLang="en-US" dirty="0"/>
           </a:p>
         </p:txBody>
       </p:sp>
@@ -5380,6 +5472,10 @@
               </a:rPr>
               <a:t>提出问题</a:t>
             </a:r>
+            <a:endParaRPr lang="zh-CN" altLang="en-US" sz="2800" b="1">
+              <a:latin typeface="+mj-ea"/>
+              <a:ea typeface="+mj-ea"/>
+            </a:endParaRPr>
           </a:p>
         </p:txBody>
       </p:sp>
@@ -5417,7 +5513,7 @@
           <p:nvPr>
             <p:ph type="body" idx="1"/>
             <p:custDataLst>
-              <p:tags r:id="rId1"/>
+              <p:tags r:id="rId2"/>
             </p:custDataLst>
           </p:nvPr>
         </p:nvSpPr>
@@ -5532,6 +5628,7 @@
               <a:rPr lang="zh-CN" altLang="en-US" dirty="0"/>
               <a:t>单击此处编辑母版文本样式</a:t>
             </a:r>
+            <a:endParaRPr lang="zh-CN" altLang="en-US" dirty="0"/>
           </a:p>
         </p:txBody>
       </p:sp>
@@ -5565,6 +5662,10 @@
               </a:rPr>
               <a:t>内容预览</a:t>
             </a:r>
+            <a:endParaRPr lang="zh-CN" altLang="en-US" sz="2800" b="1">
+              <a:latin typeface="+mj-ea"/>
+              <a:ea typeface="+mj-ea"/>
+            </a:endParaRPr>
           </a:p>
         </p:txBody>
       </p:sp>
@@ -5602,7 +5703,7 @@
           <p:nvPr>
             <p:ph type="dt" sz="half" idx="10"/>
             <p:custDataLst>
-              <p:tags r:id="rId1"/>
+              <p:tags r:id="rId2"/>
             </p:custDataLst>
           </p:nvPr>
         </p:nvSpPr>
@@ -5618,7 +5719,6 @@
           <a:p>
             <a:fld id="{9EFD9D74-47D9-4702-A33C-335B63B48DBF}" type="datetimeFigureOut">
               <a:rPr lang="zh-CN" altLang="en-US" smtClean="0"/>
-              <a:t>2022/8/15</a:t>
             </a:fld>
             <a:endParaRPr lang="zh-CN" altLang="en-US" dirty="0"/>
           </a:p>
@@ -5633,7 +5733,7 @@
           <p:nvPr>
             <p:ph type="ftr" sz="quarter" idx="11"/>
             <p:custDataLst>
-              <p:tags r:id="rId2"/>
+              <p:tags r:id="rId3"/>
             </p:custDataLst>
           </p:nvPr>
         </p:nvSpPr>
@@ -5660,7 +5760,7 @@
           <p:nvPr>
             <p:ph type="sldNum" sz="quarter" idx="12"/>
             <p:custDataLst>
-              <p:tags r:id="rId3"/>
+              <p:tags r:id="rId4"/>
             </p:custDataLst>
           </p:nvPr>
         </p:nvSpPr>
@@ -5676,7 +5776,6 @@
           <a:p>
             <a:fld id="{FABC47A4-756D-490B-A52F-7D9E2C9FC05F}" type="slidenum">
               <a:rPr lang="zh-CN" altLang="en-US" smtClean="0"/>
-              <a:t>‹#›</a:t>
             </a:fld>
             <a:endParaRPr lang="zh-CN" altLang="en-US"/>
           </a:p>
@@ -5713,6 +5812,11 @@
               </a:rPr>
               <a:t>复习</a:t>
             </a:r>
+            <a:endParaRPr lang="zh-CN" altLang="en-US" sz="5400">
+              <a:latin typeface="+mj-ea"/>
+              <a:ea typeface="+mj-ea"/>
+              <a:cs typeface="+mj-ea"/>
+            </a:endParaRPr>
           </a:p>
         </p:txBody>
       </p:sp>
@@ -5750,7 +5854,7 @@
           <p:nvPr>
             <p:ph type="dt" sz="half" idx="10"/>
             <p:custDataLst>
-              <p:tags r:id="rId1"/>
+              <p:tags r:id="rId2"/>
             </p:custDataLst>
           </p:nvPr>
         </p:nvSpPr>
@@ -5766,7 +5870,6 @@
           <a:p>
             <a:fld id="{9EFD9D74-47D9-4702-A33C-335B63B48DBF}" type="datetimeFigureOut">
               <a:rPr lang="zh-CN" altLang="en-US" smtClean="0"/>
-              <a:t>2022/8/15</a:t>
             </a:fld>
             <a:endParaRPr lang="zh-CN" altLang="en-US" dirty="0"/>
           </a:p>
@@ -5781,7 +5884,7 @@
           <p:nvPr>
             <p:ph type="ftr" sz="quarter" idx="11"/>
             <p:custDataLst>
-              <p:tags r:id="rId2"/>
+              <p:tags r:id="rId3"/>
             </p:custDataLst>
           </p:nvPr>
         </p:nvSpPr>
@@ -5808,7 +5911,7 @@
           <p:nvPr>
             <p:ph type="sldNum" sz="quarter" idx="12"/>
             <p:custDataLst>
-              <p:tags r:id="rId3"/>
+              <p:tags r:id="rId4"/>
             </p:custDataLst>
           </p:nvPr>
         </p:nvSpPr>
@@ -5824,7 +5927,6 @@
           <a:p>
             <a:fld id="{FABC47A4-756D-490B-A52F-7D9E2C9FC05F}" type="slidenum">
               <a:rPr lang="zh-CN" altLang="en-US" smtClean="0"/>
-              <a:t>‹#›</a:t>
             </a:fld>
             <a:endParaRPr lang="zh-CN" altLang="en-US"/>
           </a:p>
@@ -5861,6 +5963,11 @@
               </a:rPr>
               <a:t>回答之前提出的问题</a:t>
             </a:r>
+            <a:endParaRPr lang="zh-CN" altLang="en-US" sz="5400">
+              <a:latin typeface="+mj-ea"/>
+              <a:ea typeface="+mj-ea"/>
+              <a:cs typeface="+mj-ea"/>
+            </a:endParaRPr>
           </a:p>
         </p:txBody>
       </p:sp>
@@ -5898,7 +6005,7 @@
           <p:nvPr>
             <p:ph type="body" idx="1"/>
             <p:custDataLst>
-              <p:tags r:id="rId1"/>
+              <p:tags r:id="rId2"/>
             </p:custDataLst>
           </p:nvPr>
         </p:nvSpPr>
@@ -6013,6 +6120,7 @@
               <a:rPr lang="zh-CN" altLang="en-US" dirty="0"/>
               <a:t>单击此处编辑母版文本样式</a:t>
             </a:r>
+            <a:endParaRPr lang="zh-CN" altLang="en-US" dirty="0"/>
           </a:p>
         </p:txBody>
       </p:sp>
@@ -6046,6 +6154,10 @@
               </a:rPr>
               <a:t>参考资料</a:t>
             </a:r>
+            <a:endParaRPr lang="zh-CN" altLang="en-US" sz="2800" b="1">
+              <a:latin typeface="+mj-ea"/>
+              <a:ea typeface="+mj-ea"/>
+            </a:endParaRPr>
           </a:p>
         </p:txBody>
       </p:sp>
@@ -6063,7 +6175,7 @@
     <p:bg>
       <p:bgPr>
         <a:blipFill dpi="0" rotWithShape="1">
-          <a:blip r:embed="rId25">
+          <a:blip r:embed="rId23">
             <a:lum/>
           </a:blip>
           <a:srcRect/>
@@ -6507,6 +6619,7 @@
               <a:rPr lang="en-US" altLang="zh-CN"/>
               <a:t>z</a:t>
             </a:r>
+            <a:endParaRPr lang="en-US" altLang="zh-CN"/>
           </a:p>
         </p:txBody>
       </p:sp>
@@ -6536,20 +6649,14 @@
       </p:sp>
       <p:pic>
         <p:nvPicPr>
-          <p:cNvPr id="3" name="图片 2">
-            <a:extLst>
-              <a:ext uri="{FF2B5EF4-FFF2-40B4-BE49-F238E27FC236}">
-                <a16:creationId xmlns:a16="http://schemas.microsoft.com/office/drawing/2014/main" id="{37E41677-47A1-BE78-7C8A-8DBEB5BBEB77}"/>
-              </a:ext>
-            </a:extLst>
-          </p:cNvPr>
+          <p:cNvPr id="3" name="图片 2"/>
           <p:cNvPicPr>
             <a:picLocks noChangeAspect="1"/>
           </p:cNvPicPr>
           <p:nvPr/>
         </p:nvPicPr>
         <p:blipFill>
-          <a:blip r:embed="rId4">
+          <a:blip r:embed="rId1">
             <a:extLst>
               <a:ext uri="{28A0092B-C50C-407E-A947-70E740481C1C}">
                 <a14:useLocalDpi xmlns:a14="http://schemas.microsoft.com/office/drawing/2010/main" val="0"/>
@@ -6572,7 +6679,7 @@
       </p:pic>
     </p:spTree>
     <p:custDataLst>
-      <p:tags r:id="rId1"/>
+      <p:tags r:id="rId2"/>
     </p:custDataLst>
   </p:cSld>
   <p:clrMapOvr>
@@ -6621,6 +6728,7 @@
               <a:rPr lang="zh-CN" altLang="en-US" dirty="0"/>
               <a:t>课程介绍</a:t>
             </a:r>
+            <a:endParaRPr lang="zh-CN" altLang="en-US" dirty="0"/>
           </a:p>
           <a:p>
             <a:pPr marL="285750" indent="-285750">
@@ -6632,9 +6740,10 @@
               <a:t>实现“判断性别”</a:t>
             </a:r>
             <a:r>
-              <a:rPr lang="en" altLang="zh-CN" dirty="0"/>
+              <a:rPr lang="en-GB" altLang="zh-CN" dirty="0"/>
               <a:t>Demo</a:t>
             </a:r>
+            <a:endParaRPr lang="en-GB" altLang="zh-CN" dirty="0"/>
           </a:p>
           <a:p>
             <a:pPr marL="285750" indent="-285750">
@@ -6645,6 +6754,7 @@
               <a:rPr lang="zh-CN" altLang="en-US" dirty="0"/>
               <a:t>推导前向传播和梯度下降</a:t>
             </a:r>
+            <a:endParaRPr lang="zh-CN" altLang="en-US" dirty="0"/>
           </a:p>
           <a:p>
             <a:pPr marL="285750" indent="-285750">
@@ -6656,9 +6766,10 @@
               <a:t>基于全连接层实现“识别手写数字”</a:t>
             </a:r>
             <a:r>
-              <a:rPr lang="en" altLang="zh-CN" dirty="0"/>
+              <a:rPr lang="en-GB" altLang="zh-CN" dirty="0"/>
               <a:t>Demo</a:t>
             </a:r>
+            <a:endParaRPr lang="en-GB" altLang="zh-CN" dirty="0"/>
           </a:p>
           <a:p>
             <a:pPr marL="285750" indent="-285750">
@@ -6670,9 +6781,10 @@
               <a:t>基于卷积神经网络实现“判断性别”</a:t>
             </a:r>
             <a:r>
-              <a:rPr lang="en" altLang="zh-CN" dirty="0"/>
+              <a:rPr lang="en-GB" altLang="zh-CN" dirty="0"/>
               <a:t>Demo</a:t>
             </a:r>
+            <a:endParaRPr lang="en-GB" altLang="zh-CN" dirty="0"/>
           </a:p>
           <a:p>
             <a:pPr marL="285750" indent="-285750">
@@ -6684,9 +6796,10 @@
               <a:t>基于卷积神经网络实现“识别手写数字”</a:t>
             </a:r>
             <a:r>
-              <a:rPr lang="en" altLang="zh-CN" dirty="0"/>
+              <a:rPr lang="en-GB" altLang="zh-CN" dirty="0"/>
               <a:t>Demo</a:t>
             </a:r>
+            <a:endParaRPr lang="en-GB" altLang="zh-CN" dirty="0"/>
           </a:p>
           <a:p>
             <a:pPr marL="285750" indent="-285750">
@@ -6697,6 +6810,7 @@
               <a:rPr lang="zh-CN" altLang="en-US" dirty="0"/>
               <a:t>实现优化算法</a:t>
             </a:r>
+            <a:endParaRPr lang="zh-CN" altLang="en-US" dirty="0"/>
           </a:p>
           <a:p>
             <a:pPr marL="285750" indent="-285750">
@@ -6708,10 +6822,10 @@
               <a:t>实现</a:t>
             </a:r>
             <a:r>
-              <a:rPr lang="en" altLang="zh-CN" dirty="0" err="1"/>
+              <a:rPr lang="en-GB" altLang="zh-CN" dirty="0" err="1"/>
               <a:t>LeNet</a:t>
             </a:r>
-            <a:endParaRPr lang="en" altLang="zh-CN" dirty="0"/>
+            <a:endParaRPr lang="en-GB" altLang="zh-CN" dirty="0"/>
           </a:p>
           <a:p>
             <a:pPr marL="285750" indent="-285750">
@@ -6723,10 +6837,10 @@
               <a:t>实现</a:t>
             </a:r>
             <a:r>
-              <a:rPr lang="en" altLang="zh-CN" dirty="0" err="1"/>
+              <a:rPr lang="en-GB" altLang="zh-CN" dirty="0" err="1"/>
               <a:t>AlexNet</a:t>
             </a:r>
-            <a:endParaRPr lang="en" altLang="zh-CN" dirty="0"/>
+            <a:endParaRPr lang="en-GB" altLang="zh-CN" dirty="0" err="1"/>
           </a:p>
           <a:p>
             <a:pPr marL="285750" indent="-285750">
@@ -6734,13 +6848,21 @@
               <a:buChar char="•"/>
             </a:pPr>
             <a:r>
-              <a:rPr lang="zh-CN" altLang="en-US" dirty="0"/>
-              <a:t>实现多个</a:t>
-            </a:r>
-            <a:r>
-              <a:rPr lang="en" altLang="zh-CN" dirty="0"/>
-              <a:t>Backend</a:t>
-            </a:r>
+              <a:rPr altLang="en-GB" dirty="0"/>
+              <a:t>实现图像识别</a:t>
+            </a:r>
+            <a:r>
+              <a:rPr lang="en-US" altLang="zh-CN" dirty="0"/>
+              <a:t>Demo</a:t>
+            </a:r>
+            <a:endParaRPr lang="en-GB" altLang="zh-CN" dirty="0"/>
+          </a:p>
+          <a:p>
+            <a:pPr marL="285750" indent="-285750">
+              <a:buFont typeface="Arial" panose="020B0604020202020204" pitchFamily="34" charset="0"/>
+              <a:buChar char="•"/>
+            </a:pPr>
+            <a:endParaRPr lang="en-GB" altLang="zh-CN" dirty="0"/>
           </a:p>
         </p:txBody>
       </p:sp>
@@ -6763,6 +6885,7 @@
               <a:rPr lang="zh-CN" altLang="en-US" dirty="0"/>
               <a:t>课程大纲</a:t>
             </a:r>
+            <a:endParaRPr lang="zh-CN" altLang="en-US" dirty="0"/>
           </a:p>
         </p:txBody>
       </p:sp>
@@ -7338,13 +7461,18 @@
               <a:buChar char="•"/>
             </a:pPr>
             <a:r>
-              <a:rPr lang="zh-CN" altLang="en-US" dirty="0"/>
-              <a:t>基于卷积神经网络实现“降噪”</a:t>
-            </a:r>
-            <a:r>
-              <a:rPr lang="en" altLang="zh-CN" dirty="0"/>
-              <a:t>Demo</a:t>
-            </a:r>
+              <a:rPr dirty="0">
+                <a:sym typeface="+mn-ea"/>
+              </a:rPr>
+              <a:t>实现多个</a:t>
+            </a:r>
+            <a:r>
+              <a:rPr lang="en-GB" altLang="zh-CN" dirty="0">
+                <a:sym typeface="+mn-ea"/>
+              </a:rPr>
+              <a:t>Backend</a:t>
+            </a:r>
+            <a:endParaRPr lang="zh-CN" altLang="en-US" dirty="0"/>
           </a:p>
           <a:p>
             <a:pPr marL="285750" indent="-285750">
@@ -7353,13 +7481,13 @@
             </a:pPr>
             <a:r>
               <a:rPr lang="zh-CN" altLang="en-US" dirty="0"/>
-              <a:t>改进“降噪”</a:t>
-            </a:r>
-            <a:r>
-              <a:rPr lang="en" altLang="zh-CN" dirty="0"/>
+              <a:t>基于卷积神经网络实现“降噪”</a:t>
+            </a:r>
+            <a:r>
+              <a:rPr lang="en-GB" altLang="zh-CN" dirty="0"/>
               <a:t>Demo</a:t>
             </a:r>
-            <a:endParaRPr lang="en" altLang="zh-CN" dirty="0">
+            <a:endParaRPr lang="en-GB" altLang="zh-CN" dirty="0">
               <a:effectLst/>
             </a:endParaRPr>
           </a:p>
@@ -7384,6 +7512,7 @@
               <a:rPr lang="zh-CN" altLang="en-US"/>
               <a:t>课程大纲</a:t>
             </a:r>
+            <a:endParaRPr lang="zh-CN" altLang="en-US"/>
           </a:p>
         </p:txBody>
       </p:sp>
@@ -7391,11 +7520,6 @@
     <p:custDataLst>
       <p:tags r:id="rId1"/>
     </p:custDataLst>
-    <p:extLst>
-      <p:ext uri="{BB962C8B-B14F-4D97-AF65-F5344CB8AC3E}">
-        <p14:creationId xmlns:p14="http://schemas.microsoft.com/office/powerpoint/2010/main" val="541098324"/>
-      </p:ext>
-    </p:extLst>
   </p:cSld>
   <p:clrMapOvr>
     <a:masterClrMapping/>
@@ -7604,12 +7728,12 @@
             <a:pPr marL="285750" indent="-285750"/>
             <a:r>
               <a:rPr lang="zh-CN" altLang="en-US" dirty="0">
-                <a:hlinkClick r:id="rId3"/>
+                <a:hlinkClick r:id="rId1"/>
               </a:rPr>
               <a:t>深度学习如何入门？</a:t>
             </a:r>
             <a:endParaRPr lang="en-US" altLang="zh-CN" dirty="0">
-              <a:hlinkClick r:id="rId4"/>
+              <a:hlinkClick r:id="rId2"/>
             </a:endParaRPr>
           </a:p>
           <a:p>
@@ -7619,7 +7743,7 @@
             </a:pPr>
             <a:r>
               <a:rPr lang="zh-CN" altLang="en-US" dirty="0">
-                <a:hlinkClick r:id="rId4"/>
+                <a:hlinkClick r:id="rId2"/>
               </a:rPr>
               <a:t>零基础入门深度学习</a:t>
             </a:r>
@@ -7632,7 +7756,7 @@
             </a:pPr>
             <a:r>
               <a:rPr lang="zh-CN" altLang="en-US" dirty="0">
-                <a:hlinkClick r:id="rId5"/>
+                <a:hlinkClick r:id="rId3"/>
               </a:rPr>
               <a:t>深度学习</a:t>
             </a:r>
@@ -7645,19 +7769,19 @@
             </a:pPr>
             <a:r>
               <a:rPr lang="en-US" altLang="zh-CN" dirty="0">
-                <a:hlinkClick r:id="rId6"/>
+                <a:hlinkClick r:id="rId4"/>
               </a:rPr>
               <a:t>《</a:t>
             </a:r>
             <a:r>
               <a:rPr lang="zh-CN" altLang="en-US" dirty="0">
-                <a:hlinkClick r:id="rId6"/>
+                <a:hlinkClick r:id="rId4"/>
               </a:rPr>
               <a:t>动手学深度学习</a:t>
             </a:r>
             <a:r>
               <a:rPr lang="en-US" altLang="zh-CN" dirty="0">
-                <a:hlinkClick r:id="rId6"/>
+                <a:hlinkClick r:id="rId4"/>
               </a:rPr>
               <a:t>》</a:t>
             </a:r>
@@ -7670,7 +7794,7 @@
             </a:pPr>
             <a:r>
               <a:rPr lang="zh-CN" altLang="en-US" dirty="0">
-                <a:hlinkClick r:id="rId7"/>
+                <a:hlinkClick r:id="rId5"/>
               </a:rPr>
               <a:t>吴恩达深度学习视频</a:t>
             </a:r>
@@ -7683,7 +7807,7 @@
             </a:pPr>
             <a:r>
               <a:rPr lang="en-US" altLang="zh-CN" dirty="0">
-                <a:hlinkClick r:id="rId8"/>
+                <a:hlinkClick r:id="rId6"/>
               </a:rPr>
               <a:t>Neural Networks and Deep Learning</a:t>
             </a:r>
@@ -7709,7 +7833,7 @@
               <a:buChar char="•"/>
             </a:pPr>
             <a:endParaRPr dirty="0">
-              <a:hlinkClick r:id="rId9" action="ppaction://hlinkfile"/>
+              <a:hlinkClick r:id="rId7" action="ppaction://hlinkfile"/>
             </a:endParaRPr>
           </a:p>
           <a:p>
@@ -7719,7 +7843,7 @@
       </p:sp>
     </p:spTree>
     <p:custDataLst>
-      <p:tags r:id="rId1"/>
+      <p:tags r:id="rId8"/>
     </p:custDataLst>
   </p:cSld>
   <p:clrMapOvr>
@@ -8093,18 +8217,18 @@
               <a:t>“判断性别”</a:t>
             </a:r>
             <a:r>
-              <a:rPr lang="en" altLang="zh-CN" dirty="0"/>
+              <a:rPr lang="en-GB" altLang="zh-CN" dirty="0"/>
               <a:t>Demo</a:t>
             </a:r>
             <a:r>
-              <a:rPr lang="zh-CN" altLang="en" dirty="0"/>
+              <a:rPr lang="zh-CN" altLang="en-GB" dirty="0"/>
               <a:t>需求</a:t>
             </a:r>
             <a:r>
               <a:rPr lang="zh-CN" altLang="en-US" dirty="0"/>
               <a:t>分析和初步设计</a:t>
             </a:r>
-            <a:endParaRPr lang="en" altLang="zh-CN" dirty="0"/>
+            <a:endParaRPr lang="en-GB" altLang="zh-CN" dirty="0"/>
           </a:p>
           <a:p>
             <a:pPr>
@@ -8135,6 +8259,7 @@
               <a:rPr lang="zh-CN" altLang="en-US"/>
               <a:t>下节课预告</a:t>
             </a:r>
+            <a:endParaRPr lang="zh-CN" altLang="en-US"/>
           </a:p>
         </p:txBody>
       </p:sp>
@@ -8213,7 +8338,107 @@
               <a:buFont typeface="Arial" panose="020B0604020202020204" pitchFamily="34" charset="0"/>
               <a:buChar char="•"/>
             </a:pPr>
-            <a:endParaRPr lang="en-US" altLang="zh-CN">
+            <a:r>
+              <a:rPr>
+                <a:sym typeface="+mn-ea"/>
+              </a:rPr>
+              <a:t>数学</a:t>
+            </a:r>
+            <a:r>
+              <a:rPr lang="en-US" altLang="zh-CN">
+                <a:sym typeface="+mn-ea"/>
+              </a:rPr>
+              <a:t> </a:t>
+            </a:r>
+            <a:r>
+              <a:rPr>
+                <a:sym typeface="+mn-ea"/>
+              </a:rPr>
+              <a:t>准备？</a:t>
+            </a:r>
+            <a:endParaRPr>
+              <a:sym typeface="+mn-ea"/>
+            </a:endParaRPr>
+          </a:p>
+          <a:p>
+            <a:pPr marL="285750" indent="-285750">
+              <a:buFont typeface="Arial" panose="020B0604020202020204" pitchFamily="34" charset="0"/>
+              <a:buChar char="•"/>
+            </a:pPr>
+            <a:r>
+              <a:rPr>
+                <a:sym typeface="+mn-ea"/>
+              </a:rPr>
+              <a:t>现在行业就业方向？</a:t>
+            </a:r>
+            <a:br>
+              <a:rPr>
+                <a:sym typeface="+mn-ea"/>
+              </a:rPr>
+            </a:br>
+            <a:r>
+              <a:rPr>
+                <a:sym typeface="+mn-ea"/>
+              </a:rPr>
+              <a:t>以后</a:t>
+            </a:r>
+            <a:r>
+              <a:rPr>
+                <a:sym typeface="+mn-ea"/>
+              </a:rPr>
+              <a:t>可能可以推荐</a:t>
+            </a:r>
+            <a:r>
+              <a:rPr>
+                <a:sym typeface="+mn-ea"/>
+              </a:rPr>
+              <a:t>就业</a:t>
+            </a:r>
+            <a:endParaRPr>
+              <a:sym typeface="+mn-ea"/>
+            </a:endParaRPr>
+          </a:p>
+          <a:p>
+            <a:pPr marL="285750" indent="-285750">
+              <a:buFont typeface="Arial" panose="020B0604020202020204" pitchFamily="34" charset="0"/>
+              <a:buChar char="•"/>
+            </a:pPr>
+            <a:r>
+              <a:rPr>
+                <a:sym typeface="+mn-ea"/>
+              </a:rPr>
+              <a:t>持续</a:t>
+            </a:r>
+            <a:r>
+              <a:rPr>
+                <a:sym typeface="+mn-ea"/>
+              </a:rPr>
+              <a:t>多久？</a:t>
+            </a:r>
+            <a:br>
+              <a:rPr>
+                <a:sym typeface="+mn-ea"/>
+              </a:rPr>
+            </a:br>
+            <a:r>
+              <a:rPr lang="en-US" altLang="zh-CN">
+                <a:sym typeface="+mn-ea"/>
+              </a:rPr>
+              <a:t>2</a:t>
+            </a:r>
+            <a:r>
+              <a:rPr>
+                <a:sym typeface="+mn-ea"/>
+              </a:rPr>
+              <a:t>个月</a:t>
+            </a:r>
+            <a:r>
+              <a:rPr>
+                <a:sym typeface="+mn-ea"/>
+              </a:rPr>
+              <a:t>以上</a:t>
+            </a:r>
+            <a:endParaRPr>
               <a:sym typeface="+mn-ea"/>
             </a:endParaRPr>
           </a:p>
@@ -8238,6 +8463,7 @@
               <a:rPr lang="zh-CN" altLang="en-US"/>
               <a:t>问答</a:t>
             </a:r>
+            <a:endParaRPr lang="zh-CN" altLang="en-US"/>
           </a:p>
         </p:txBody>
       </p:sp>
@@ -8321,6 +8547,7 @@
               <a:rPr lang="zh-CN" altLang="en-US" dirty="0"/>
               <a:t>第一节课：课程介绍</a:t>
             </a:r>
+            <a:endParaRPr lang="zh-CN" altLang="en-US" dirty="0"/>
           </a:p>
         </p:txBody>
       </p:sp>
@@ -8482,6 +8709,7 @@
               <a:rPr lang="zh-CN" altLang="en-US" dirty="0"/>
               <a:t>内容预览</a:t>
             </a:r>
+            <a:endParaRPr lang="zh-CN" altLang="en-US" dirty="0"/>
           </a:p>
         </p:txBody>
       </p:sp>
@@ -9035,13 +9263,14 @@
               <a:t>开始，进行数学推导，并且实现可以运行的</a:t>
             </a:r>
             <a:r>
-              <a:rPr lang="en" altLang="zh-CN" dirty="0"/>
+              <a:rPr lang="en-GB" altLang="zh-CN" dirty="0"/>
               <a:t>Demo</a:t>
             </a:r>
             <a:r>
               <a:rPr lang="zh-CN" altLang="en-US" dirty="0"/>
               <a:t>程序</a:t>
             </a:r>
+            <a:endParaRPr lang="zh-CN" altLang="en-US" dirty="0"/>
           </a:p>
           <a:p>
             <a:endParaRPr lang="zh-CN" altLang="en-US" dirty="0">
@@ -9071,6 +9300,9 @@
               </a:rPr>
               <a:t>课程简介</a:t>
             </a:r>
+            <a:endParaRPr dirty="0">
+              <a:sym typeface="+mn-ea"/>
+            </a:endParaRPr>
           </a:p>
         </p:txBody>
       </p:sp>
@@ -9256,7 +9488,7 @@
             </a:pPr>
             <a:r>
               <a:rPr lang="zh-CN" altLang="en-US" dirty="0">
-                <a:hlinkClick r:id="rId3"/>
+                <a:hlinkClick r:id="rId1"/>
               </a:rPr>
               <a:t>深度学习和图形学渲染的结合和应用 </a:t>
             </a:r>
@@ -9300,13 +9532,8 @@
       </p:sp>
     </p:spTree>
     <p:custDataLst>
-      <p:tags r:id="rId1"/>
+      <p:tags r:id="rId2"/>
     </p:custDataLst>
-    <p:extLst>
-      <p:ext uri="{BB962C8B-B14F-4D97-AF65-F5344CB8AC3E}">
-        <p14:creationId xmlns:p14="http://schemas.microsoft.com/office/powerpoint/2010/main" val="13655999"/>
-      </p:ext>
-    </p:extLst>
   </p:cSld>
   <p:clrMapOvr>
     <a:masterClrMapping/>
@@ -9433,6 +9660,7 @@
               <a:rPr lang="zh-CN" altLang="en-US" dirty="0"/>
               <a:t>课程使用“学本式教学”的方式，以学生为本。以学习者为中心。以学习者的学习为本，以学习者的能力发展为本</a:t>
             </a:r>
+            <a:endParaRPr lang="zh-CN" altLang="en-US" dirty="0"/>
           </a:p>
           <a:p>
             <a:pPr marL="285750" indent="-285750">
@@ -9443,6 +9671,7 @@
               <a:rPr lang="zh-CN" altLang="en-US" dirty="0"/>
               <a:t>通过全程提问（学生讨论回答）、零讲解的方式来讲课</a:t>
             </a:r>
+            <a:endParaRPr lang="zh-CN" altLang="en-US" dirty="0"/>
           </a:p>
           <a:p>
             <a:pPr marL="285750" indent="-285750">
@@ -9453,6 +9682,7 @@
               <a:rPr lang="zh-CN" altLang="en-US" dirty="0"/>
               <a:t>“学本式教学”需要学生高度参与课程，通过自己和小组合作回答课程的所有问题，并在课程中现场写代码</a:t>
             </a:r>
+            <a:endParaRPr lang="zh-CN" altLang="en-US" dirty="0"/>
           </a:p>
         </p:txBody>
       </p:sp>
@@ -9759,6 +9989,7 @@
               <a:rPr lang="zh-CN" altLang="en-US" dirty="0"/>
               <a:t>技术栈</a:t>
             </a:r>
+            <a:endParaRPr lang="zh-CN" altLang="en-US" dirty="0"/>
           </a:p>
         </p:txBody>
       </p:sp>
@@ -9813,6 +10044,7 @@
               <a:rPr lang="zh-CN" altLang="en-US" dirty="0"/>
               <a:t>零基础上手学习</a:t>
             </a:r>
+            <a:endParaRPr lang="zh-CN" altLang="en-US" dirty="0"/>
           </a:p>
           <a:p>
             <a:pPr marL="285750" indent="-285750">
@@ -9823,6 +10055,7 @@
               <a:rPr lang="zh-CN" altLang="en-US" dirty="0"/>
               <a:t>从0开始</a:t>
             </a:r>
+            <a:endParaRPr lang="zh-CN" altLang="en-US" dirty="0"/>
           </a:p>
           <a:p>
             <a:pPr marL="285750" indent="-285750">
@@ -9845,13 +10078,14 @@
               <a:t>实现可以运行的</a:t>
             </a:r>
             <a:r>
-              <a:rPr lang="en" altLang="zh-CN" dirty="0"/>
+              <a:rPr lang="en-GB" altLang="zh-CN" dirty="0"/>
               <a:t>Demo</a:t>
             </a:r>
             <a:r>
               <a:rPr lang="zh-CN" altLang="en-US" dirty="0"/>
               <a:t>程序</a:t>
             </a:r>
+            <a:endParaRPr lang="zh-CN" altLang="en-US" dirty="0"/>
           </a:p>
         </p:txBody>
       </p:sp>
@@ -9874,6 +10108,7 @@
               <a:rPr lang="zh-CN" altLang="en-US" dirty="0"/>
               <a:t>课程特色</a:t>
             </a:r>
+            <a:endParaRPr lang="zh-CN" altLang="en-US" dirty="0"/>
           </a:p>
         </p:txBody>
       </p:sp>
@@ -10180,6 +10415,7 @@
               <a:rPr lang="zh-CN" altLang="en-US" dirty="0"/>
               <a:t>了解深度学习在图形学中的应用</a:t>
             </a:r>
+            <a:endParaRPr lang="zh-CN" altLang="en-US" dirty="0"/>
           </a:p>
         </p:txBody>
       </p:sp>
@@ -10202,6 +10438,7 @@
               <a:rPr lang="zh-CN" altLang="en-US" dirty="0"/>
               <a:t>学员收益</a:t>
             </a:r>
+            <a:endParaRPr lang="zh-CN" altLang="en-US" dirty="0"/>
           </a:p>
         </p:txBody>
       </p:sp>
@@ -10398,14 +10635,293 @@
 </file>
 
 <file path=ppt/tags/tag1.xml><?xml version="1.0" encoding="utf-8"?>
-<p:tagLst xmlns:a="http://schemas.openxmlformats.org/drawingml/2006/main" xmlns:r="http://schemas.openxmlformats.org/officeDocument/2006/relationships" xmlns:p="http://schemas.openxmlformats.org/presentationml/2006/main">
-  <p:tag name="KSO_DOCER_TEMPLATE_OPEN_ONCE_MARK" val="1"/>
-  <p:tag name="COMMONDATA" val="eyJoZGlkIjoiMjg3YWU3MzE4Zjc2MGFjY2U2ZGQ0NDQwMWZkNTA3OTgifQ=="/>
+<p:tagLst xmlns:p="http://schemas.openxmlformats.org/presentationml/2006/main">
+  <p:tag name="KSO_WM_UNIT_HIGHLIGHT" val="0"/>
+  <p:tag name="KSO_WM_UNIT_COMPATIBLE" val="0"/>
+  <p:tag name="KSO_WM_UNIT_DIAGRAM_ISNUMVISUAL" val="0"/>
+  <p:tag name="KSO_WM_UNIT_DIAGRAM_ISREFERUNIT" val="0"/>
+  <p:tag name="KSO_WM_UNIT_ID" val="_3**"/>
+  <p:tag name="KSO_WM_UNIT_LAYERLEVEL" val="1"/>
+  <p:tag name="KSO_WM_TAG_VERSION" val="1.0"/>
+  <p:tag name="KSO_WM_BEAUTIFY_FLAG" val="#wm#"/>
 </p:tagLst>
 </file>
 
 <file path=ppt/tags/tag10.xml><?xml version="1.0" encoding="utf-8"?>
-<p:tagLst xmlns:a="http://schemas.openxmlformats.org/drawingml/2006/main" xmlns:r="http://schemas.openxmlformats.org/officeDocument/2006/relationships" xmlns:p="http://schemas.openxmlformats.org/presentationml/2006/main">
+<p:tagLst xmlns:p="http://schemas.openxmlformats.org/presentationml/2006/main">
+  <p:tag name="KSO_WM_UNIT_HIGHLIGHT" val="0"/>
+  <p:tag name="KSO_WM_UNIT_COMPATIBLE" val="0"/>
+  <p:tag name="KSO_WM_UNIT_DIAGRAM_ISNUMVISUAL" val="0"/>
+  <p:tag name="KSO_WM_UNIT_DIAGRAM_ISREFERUNIT" val="0"/>
+  <p:tag name="KSO_WM_UNIT_ID" val="_3**"/>
+  <p:tag name="KSO_WM_UNIT_LAYERLEVEL" val="1"/>
+  <p:tag name="KSO_WM_TAG_VERSION" val="1.0"/>
+  <p:tag name="KSO_WM_BEAUTIFY_FLAG" val="#wm#"/>
+</p:tagLst>
+</file>
+
+<file path=ppt/tags/tag11.xml><?xml version="1.0" encoding="utf-8"?>
+<p:tagLst xmlns:p="http://schemas.openxmlformats.org/presentationml/2006/main">
+  <p:tag name="KSO_WM_UNIT_HIGHLIGHT" val="0"/>
+  <p:tag name="KSO_WM_UNIT_COMPATIBLE" val="0"/>
+  <p:tag name="KSO_WM_UNIT_DIAGRAM_ISNUMVISUAL" val="0"/>
+  <p:tag name="KSO_WM_UNIT_DIAGRAM_ISREFERUNIT" val="0"/>
+  <p:tag name="KSO_WM_UNIT_ID" val="_3**"/>
+  <p:tag name="KSO_WM_UNIT_LAYERLEVEL" val="1"/>
+  <p:tag name="KSO_WM_TAG_VERSION" val="1.0"/>
+  <p:tag name="KSO_WM_BEAUTIFY_FLAG" val="#wm#"/>
+</p:tagLst>
+</file>
+
+<file path=ppt/tags/tag12.xml><?xml version="1.0" encoding="utf-8"?>
+<p:tagLst xmlns:p="http://schemas.openxmlformats.org/presentationml/2006/main">
+  <p:tag name="KSO_WM_UNIT_HIGHLIGHT" val="0"/>
+  <p:tag name="KSO_WM_UNIT_COMPATIBLE" val="0"/>
+  <p:tag name="KSO_WM_UNIT_DIAGRAM_ISNUMVISUAL" val="0"/>
+  <p:tag name="KSO_WM_UNIT_DIAGRAM_ISREFERUNIT" val="0"/>
+  <p:tag name="KSO_WM_UNIT_ID" val="_8**"/>
+  <p:tag name="KSO_WM_UNIT_LAYERLEVEL" val="1"/>
+  <p:tag name="KSO_WM_TAG_VERSION" val="1.0"/>
+  <p:tag name="KSO_WM_BEAUTIFY_FLAG" val="#wm#"/>
+</p:tagLst>
+</file>
+
+<file path=ppt/tags/tag13.xml><?xml version="1.0" encoding="utf-8"?>
+<p:tagLst xmlns:p="http://schemas.openxmlformats.org/presentationml/2006/main">
+  <p:tag name="KSO_WM_UNIT_HIGHLIGHT" val="0"/>
+  <p:tag name="KSO_WM_UNIT_COMPATIBLE" val="0"/>
+  <p:tag name="KSO_WM_UNIT_DIAGRAM_ISNUMVISUAL" val="0"/>
+  <p:tag name="KSO_WM_UNIT_DIAGRAM_ISREFERUNIT" val="0"/>
+  <p:tag name="KSO_WM_UNIT_ID" val="_8**"/>
+  <p:tag name="KSO_WM_UNIT_LAYERLEVEL" val="1"/>
+  <p:tag name="KSO_WM_TAG_VERSION" val="1.0"/>
+  <p:tag name="KSO_WM_BEAUTIFY_FLAG" val="#wm#"/>
+</p:tagLst>
+</file>
+
+<file path=ppt/tags/tag14.xml><?xml version="1.0" encoding="utf-8"?>
+<p:tagLst xmlns:p="http://schemas.openxmlformats.org/presentationml/2006/main">
+  <p:tag name="KSO_WM_UNIT_HIGHLIGHT" val="0"/>
+  <p:tag name="KSO_WM_UNIT_COMPATIBLE" val="0"/>
+  <p:tag name="KSO_WM_UNIT_DIAGRAM_ISNUMVISUAL" val="0"/>
+  <p:tag name="KSO_WM_UNIT_DIAGRAM_ISREFERUNIT" val="0"/>
+  <p:tag name="KSO_WM_UNIT_ID" val="_8**"/>
+  <p:tag name="KSO_WM_UNIT_LAYERLEVEL" val="1"/>
+  <p:tag name="KSO_WM_TAG_VERSION" val="1.0"/>
+  <p:tag name="KSO_WM_BEAUTIFY_FLAG" val="#wm#"/>
+</p:tagLst>
+</file>
+
+<file path=ppt/tags/tag15.xml><?xml version="1.0" encoding="utf-8"?>
+<p:tagLst xmlns:p="http://schemas.openxmlformats.org/presentationml/2006/main">
+  <p:tag name="KSO_WM_UNIT_HIGHLIGHT" val="0"/>
+  <p:tag name="KSO_WM_UNIT_COMPATIBLE" val="0"/>
+  <p:tag name="KSO_WM_UNIT_DIAGRAM_ISNUMVISUAL" val="0"/>
+  <p:tag name="KSO_WM_UNIT_DIAGRAM_ISREFERUNIT" val="0"/>
+  <p:tag name="KSO_WM_UNIT_ID" val="_8**"/>
+  <p:tag name="KSO_WM_UNIT_LAYERLEVEL" val="1"/>
+  <p:tag name="KSO_WM_TAG_VERSION" val="1.0"/>
+  <p:tag name="KSO_WM_BEAUTIFY_FLAG" val="#wm#"/>
+</p:tagLst>
+</file>
+
+<file path=ppt/tags/tag16.xml><?xml version="1.0" encoding="utf-8"?>
+<p:tagLst xmlns:p="http://schemas.openxmlformats.org/presentationml/2006/main">
+  <p:tag name="KSO_WM_UNIT_HIGHLIGHT" val="0"/>
+  <p:tag name="KSO_WM_UNIT_COMPATIBLE" val="0"/>
+  <p:tag name="KSO_WM_UNIT_DIAGRAM_ISNUMVISUAL" val="0"/>
+  <p:tag name="KSO_WM_UNIT_DIAGRAM_ISREFERUNIT" val="0"/>
+  <p:tag name="KSO_WM_UNIT_ID" val="_8**"/>
+  <p:tag name="KSO_WM_UNIT_LAYERLEVEL" val="1"/>
+  <p:tag name="KSO_WM_TAG_VERSION" val="1.0"/>
+  <p:tag name="KSO_WM_BEAUTIFY_FLAG" val="#wm#"/>
+</p:tagLst>
+</file>
+
+<file path=ppt/tags/tag17.xml><?xml version="1.0" encoding="utf-8"?>
+<p:tagLst xmlns:p="http://schemas.openxmlformats.org/presentationml/2006/main">
+  <p:tag name="KSO_WM_UNIT_HIGHLIGHT" val="0"/>
+  <p:tag name="KSO_WM_UNIT_COMPATIBLE" val="0"/>
+  <p:tag name="KSO_WM_UNIT_DIAGRAM_ISNUMVISUAL" val="0"/>
+  <p:tag name="KSO_WM_UNIT_DIAGRAM_ISREFERUNIT" val="0"/>
+  <p:tag name="KSO_WM_UNIT_ID" val="_8**"/>
+  <p:tag name="KSO_WM_UNIT_LAYERLEVEL" val="1"/>
+  <p:tag name="KSO_WM_TAG_VERSION" val="1.0"/>
+  <p:tag name="KSO_WM_BEAUTIFY_FLAG" val="#wm#"/>
+</p:tagLst>
+</file>
+
+<file path=ppt/tags/tag18.xml><?xml version="1.0" encoding="utf-8"?>
+<p:tagLst xmlns:p="http://schemas.openxmlformats.org/presentationml/2006/main">
+  <p:tag name="KSO_WM_UNIT_HIGHLIGHT" val="0"/>
+  <p:tag name="KSO_WM_UNIT_COMPATIBLE" val="0"/>
+  <p:tag name="KSO_WM_UNIT_DIAGRAM_ISNUMVISUAL" val="0"/>
+  <p:tag name="KSO_WM_UNIT_DIAGRAM_ISREFERUNIT" val="0"/>
+  <p:tag name="KSO_WM_UNIT_ID" val="_3**"/>
+  <p:tag name="KSO_WM_UNIT_LAYERLEVEL" val="1"/>
+  <p:tag name="KSO_WM_TAG_VERSION" val="1.0"/>
+  <p:tag name="KSO_WM_BEAUTIFY_FLAG" val="#wm#"/>
+</p:tagLst>
+</file>
+
+<file path=ppt/tags/tag19.xml><?xml version="1.0" encoding="utf-8"?>
+<p:tagLst xmlns:p="http://schemas.openxmlformats.org/presentationml/2006/main">
+  <p:tag name="KSO_WM_UNIT_HIGHLIGHT" val="0"/>
+  <p:tag name="KSO_WM_UNIT_COMPATIBLE" val="0"/>
+  <p:tag name="KSO_WM_UNIT_DIAGRAM_ISNUMVISUAL" val="0"/>
+  <p:tag name="KSO_WM_UNIT_DIAGRAM_ISREFERUNIT" val="0"/>
+  <p:tag name="KSO_WM_UNIT_ID" val="_3**"/>
+  <p:tag name="KSO_WM_UNIT_LAYERLEVEL" val="1"/>
+  <p:tag name="KSO_WM_TAG_VERSION" val="1.0"/>
+  <p:tag name="KSO_WM_BEAUTIFY_FLAG" val="#wm#"/>
+</p:tagLst>
+</file>
+
+<file path=ppt/tags/tag2.xml><?xml version="1.0" encoding="utf-8"?>
+<p:tagLst xmlns:p="http://schemas.openxmlformats.org/presentationml/2006/main">
+  <p:tag name="KSO_WM_UNIT_HIGHLIGHT" val="0"/>
+  <p:tag name="KSO_WM_UNIT_COMPATIBLE" val="0"/>
+  <p:tag name="KSO_WM_UNIT_DIAGRAM_ISNUMVISUAL" val="0"/>
+  <p:tag name="KSO_WM_UNIT_DIAGRAM_ISREFERUNIT" val="0"/>
+  <p:tag name="KSO_WM_UNIT_ID" val="_6**"/>
+  <p:tag name="KSO_WM_UNIT_LAYERLEVEL" val="1"/>
+  <p:tag name="KSO_WM_TAG_VERSION" val="1.0"/>
+  <p:tag name="KSO_WM_BEAUTIFY_FLAG" val="#wm#"/>
+</p:tagLst>
+</file>
+
+<file path=ppt/tags/tag20.xml><?xml version="1.0" encoding="utf-8"?>
+<p:tagLst xmlns:p="http://schemas.openxmlformats.org/presentationml/2006/main">
+  <p:tag name="KSO_WM_UNIT_HIGHLIGHT" val="0"/>
+  <p:tag name="KSO_WM_UNIT_COMPATIBLE" val="0"/>
+  <p:tag name="KSO_WM_UNIT_DIAGRAM_ISNUMVISUAL" val="0"/>
+  <p:tag name="KSO_WM_UNIT_DIAGRAM_ISREFERUNIT" val="0"/>
+  <p:tag name="KSO_WM_UNIT_ID" val="_8**"/>
+  <p:tag name="KSO_WM_UNIT_LAYERLEVEL" val="1"/>
+  <p:tag name="KSO_WM_TAG_VERSION" val="1.0"/>
+  <p:tag name="KSO_WM_BEAUTIFY_FLAG" val="#wm#"/>
+</p:tagLst>
+</file>
+
+<file path=ppt/tags/tag21.xml><?xml version="1.0" encoding="utf-8"?>
+<p:tagLst xmlns:p="http://schemas.openxmlformats.org/presentationml/2006/main">
+  <p:tag name="KSO_WM_UNIT_HIGHLIGHT" val="0"/>
+  <p:tag name="KSO_WM_UNIT_COMPATIBLE" val="0"/>
+  <p:tag name="KSO_WM_UNIT_DIAGRAM_ISNUMVISUAL" val="0"/>
+  <p:tag name="KSO_WM_UNIT_DIAGRAM_ISREFERUNIT" val="0"/>
+  <p:tag name="KSO_WM_UNIT_ID" val="_8**"/>
+  <p:tag name="KSO_WM_UNIT_LAYERLEVEL" val="1"/>
+  <p:tag name="KSO_WM_TAG_VERSION" val="1.0"/>
+  <p:tag name="KSO_WM_BEAUTIFY_FLAG" val="#wm#"/>
+</p:tagLst>
+</file>
+
+<file path=ppt/tags/tag22.xml><?xml version="1.0" encoding="utf-8"?>
+<p:tagLst xmlns:p="http://schemas.openxmlformats.org/presentationml/2006/main">
+  <p:tag name="KSO_WM_UNIT_HIGHLIGHT" val="0"/>
+  <p:tag name="KSO_WM_UNIT_COMPATIBLE" val="0"/>
+  <p:tag name="KSO_WM_UNIT_DIAGRAM_ISNUMVISUAL" val="0"/>
+  <p:tag name="KSO_WM_UNIT_DIAGRAM_ISREFERUNIT" val="0"/>
+  <p:tag name="KSO_WM_UNIT_ID" val="_8**"/>
+  <p:tag name="KSO_WM_UNIT_LAYERLEVEL" val="1"/>
+  <p:tag name="KSO_WM_TAG_VERSION" val="1.0"/>
+  <p:tag name="KSO_WM_BEAUTIFY_FLAG" val="#wm#"/>
+</p:tagLst>
+</file>
+
+<file path=ppt/tags/tag23.xml><?xml version="1.0" encoding="utf-8"?>
+<p:tagLst xmlns:p="http://schemas.openxmlformats.org/presentationml/2006/main">
+  <p:tag name="KSO_WM_UNIT_HIGHLIGHT" val="0"/>
+  <p:tag name="KSO_WM_UNIT_COMPATIBLE" val="0"/>
+  <p:tag name="KSO_WM_UNIT_DIAGRAM_ISNUMVISUAL" val="0"/>
+  <p:tag name="KSO_WM_UNIT_DIAGRAM_ISREFERUNIT" val="0"/>
+  <p:tag name="KSO_WM_UNIT_ID" val="_3**"/>
+  <p:tag name="KSO_WM_UNIT_LAYERLEVEL" val="1"/>
+  <p:tag name="KSO_WM_TAG_VERSION" val="1.0"/>
+  <p:tag name="KSO_WM_BEAUTIFY_FLAG" val="#wm#"/>
+</p:tagLst>
+</file>
+
+<file path=ppt/tags/tag24.xml><?xml version="1.0" encoding="utf-8"?>
+<p:tagLst xmlns:p="http://schemas.openxmlformats.org/presentationml/2006/main">
+  <p:tag name="KSO_WM_UNIT_HIGHLIGHT" val="0"/>
+  <p:tag name="KSO_WM_UNIT_COMPATIBLE" val="0"/>
+  <p:tag name="KSO_WM_UNIT_DIAGRAM_ISNUMVISUAL" val="0"/>
+  <p:tag name="KSO_WM_UNIT_DIAGRAM_ISREFERUNIT" val="0"/>
+  <p:tag name="KSO_WM_UNIT_ID" val="_11**"/>
+  <p:tag name="KSO_WM_UNIT_LAYERLEVEL" val="1"/>
+  <p:tag name="KSO_WM_TAG_VERSION" val="1.0"/>
+  <p:tag name="KSO_WM_BEAUTIFY_FLAG" val="#wm#"/>
+</p:tagLst>
+</file>
+
+<file path=ppt/tags/tag25.xml><?xml version="1.0" encoding="utf-8"?>
+<p:tagLst xmlns:p="http://schemas.openxmlformats.org/presentationml/2006/main">
+  <p:tag name="KSO_WM_UNIT_HIGHLIGHT" val="0"/>
+  <p:tag name="KSO_WM_UNIT_COMPATIBLE" val="0"/>
+  <p:tag name="KSO_WM_UNIT_DIAGRAM_ISNUMVISUAL" val="0"/>
+  <p:tag name="KSO_WM_UNIT_DIAGRAM_ISREFERUNIT" val="0"/>
+  <p:tag name="KSO_WM_UNIT_ID" val="_11**"/>
+  <p:tag name="KSO_WM_UNIT_LAYERLEVEL" val="1"/>
+  <p:tag name="KSO_WM_TAG_VERSION" val="1.0"/>
+  <p:tag name="KSO_WM_BEAUTIFY_FLAG" val="#wm#"/>
+</p:tagLst>
+</file>
+
+<file path=ppt/tags/tag26.xml><?xml version="1.0" encoding="utf-8"?>
+<p:tagLst xmlns:p="http://schemas.openxmlformats.org/presentationml/2006/main">
+  <p:tag name="KSO_WM_UNIT_HIGHLIGHT" val="0"/>
+  <p:tag name="KSO_WM_UNIT_COMPATIBLE" val="0"/>
+  <p:tag name="KSO_WM_UNIT_DIAGRAM_ISNUMVISUAL" val="0"/>
+  <p:tag name="KSO_WM_UNIT_DIAGRAM_ISREFERUNIT" val="0"/>
+  <p:tag name="KSO_WM_UNIT_ID" val="_11**"/>
+  <p:tag name="KSO_WM_UNIT_LAYERLEVEL" val="1"/>
+  <p:tag name="KSO_WM_TAG_VERSION" val="1.0"/>
+  <p:tag name="KSO_WM_BEAUTIFY_FLAG" val="#wm#"/>
+</p:tagLst>
+</file>
+
+<file path=ppt/tags/tag27.xml><?xml version="1.0" encoding="utf-8"?>
+<p:tagLst xmlns:p="http://schemas.openxmlformats.org/presentationml/2006/main">
+  <p:tag name="KSO_WM_UNIT_HIGHLIGHT" val="0"/>
+  <p:tag name="KSO_WM_UNIT_COMPATIBLE" val="0"/>
+  <p:tag name="KSO_WM_UNIT_DIAGRAM_ISNUMVISUAL" val="0"/>
+  <p:tag name="KSO_WM_UNIT_DIAGRAM_ISREFERUNIT" val="0"/>
+  <p:tag name="KSO_WM_UNIT_ID" val="_11**"/>
+  <p:tag name="KSO_WM_UNIT_LAYERLEVEL" val="1"/>
+  <p:tag name="KSO_WM_TAG_VERSION" val="1.0"/>
+  <p:tag name="KSO_WM_BEAUTIFY_FLAG" val="#wm#"/>
+</p:tagLst>
+</file>
+
+<file path=ppt/tags/tag28.xml><?xml version="1.0" encoding="utf-8"?>
+<p:tagLst xmlns:p="http://schemas.openxmlformats.org/presentationml/2006/main">
+  <p:tag name="KSO_WM_UNIT_HIGHLIGHT" val="0"/>
+  <p:tag name="KSO_WM_UNIT_COMPATIBLE" val="0"/>
+  <p:tag name="KSO_WM_UNIT_DIAGRAM_ISNUMVISUAL" val="0"/>
+  <p:tag name="KSO_WM_UNIT_DIAGRAM_ISREFERUNIT" val="0"/>
+  <p:tag name="KSO_WM_UNIT_ID" val="_8**"/>
+  <p:tag name="KSO_WM_UNIT_LAYERLEVEL" val="1"/>
+  <p:tag name="KSO_WM_TAG_VERSION" val="1.0"/>
+  <p:tag name="KSO_WM_BEAUTIFY_FLAG" val="#wm#"/>
+</p:tagLst>
+</file>
+
+<file path=ppt/tags/tag29.xml><?xml version="1.0" encoding="utf-8"?>
+<p:tagLst xmlns:p="http://schemas.openxmlformats.org/presentationml/2006/main">
+  <p:tag name="KSO_WM_UNIT_HIGHLIGHT" val="0"/>
+  <p:tag name="KSO_WM_UNIT_COMPATIBLE" val="0"/>
+  <p:tag name="KSO_WM_UNIT_DIAGRAM_ISNUMVISUAL" val="0"/>
+  <p:tag name="KSO_WM_UNIT_DIAGRAM_ISREFERUNIT" val="0"/>
+  <p:tag name="KSO_WM_UNIT_ID" val="_8**"/>
+  <p:tag name="KSO_WM_UNIT_LAYERLEVEL" val="1"/>
+  <p:tag name="KSO_WM_TAG_VERSION" val="1.0"/>
+  <p:tag name="KSO_WM_BEAUTIFY_FLAG" val="#wm#"/>
+</p:tagLst>
+</file>
+
+<file path=ppt/tags/tag3.xml><?xml version="1.0" encoding="utf-8"?>
+<p:tagLst xmlns:p="http://schemas.openxmlformats.org/presentationml/2006/main">
   <p:tag name="KSO_WM_UNIT_HIGHLIGHT" val="0"/>
   <p:tag name="KSO_WM_UNIT_COMPATIBLE" val="0"/>
   <p:tag name="KSO_WM_UNIT_DIAGRAM_ISNUMVISUAL" val="0"/>
@@ -10417,47 +10933,8 @@
 </p:tagLst>
 </file>
 
-<file path=ppt/tags/tag11.xml><?xml version="1.0" encoding="utf-8"?>
-<p:tagLst xmlns:a="http://schemas.openxmlformats.org/drawingml/2006/main" xmlns:r="http://schemas.openxmlformats.org/officeDocument/2006/relationships" xmlns:p="http://schemas.openxmlformats.org/presentationml/2006/main">
-  <p:tag name="KSO_WM_UNIT_HIGHLIGHT" val="0"/>
-  <p:tag name="KSO_WM_UNIT_COMPATIBLE" val="0"/>
-  <p:tag name="KSO_WM_UNIT_DIAGRAM_ISNUMVISUAL" val="0"/>
-  <p:tag name="KSO_WM_UNIT_DIAGRAM_ISREFERUNIT" val="0"/>
-  <p:tag name="KSO_WM_UNIT_ID" val="_3**"/>
-  <p:tag name="KSO_WM_UNIT_LAYERLEVEL" val="1"/>
-  <p:tag name="KSO_WM_TAG_VERSION" val="1.0"/>
-  <p:tag name="KSO_WM_BEAUTIFY_FLAG" val="#wm#"/>
-</p:tagLst>
-</file>
-
-<file path=ppt/tags/tag12.xml><?xml version="1.0" encoding="utf-8"?>
-<p:tagLst xmlns:a="http://schemas.openxmlformats.org/drawingml/2006/main" xmlns:r="http://schemas.openxmlformats.org/officeDocument/2006/relationships" xmlns:p="http://schemas.openxmlformats.org/presentationml/2006/main">
-  <p:tag name="KSO_WM_UNIT_HIGHLIGHT" val="0"/>
-  <p:tag name="KSO_WM_UNIT_COMPATIBLE" val="0"/>
-  <p:tag name="KSO_WM_UNIT_DIAGRAM_ISNUMVISUAL" val="0"/>
-  <p:tag name="KSO_WM_UNIT_DIAGRAM_ISREFERUNIT" val="0"/>
-  <p:tag name="KSO_WM_UNIT_ID" val="_3**"/>
-  <p:tag name="KSO_WM_UNIT_LAYERLEVEL" val="1"/>
-  <p:tag name="KSO_WM_TAG_VERSION" val="1.0"/>
-  <p:tag name="KSO_WM_BEAUTIFY_FLAG" val="#wm#"/>
-</p:tagLst>
-</file>
-
-<file path=ppt/tags/tag13.xml><?xml version="1.0" encoding="utf-8"?>
-<p:tagLst xmlns:a="http://schemas.openxmlformats.org/drawingml/2006/main" xmlns:r="http://schemas.openxmlformats.org/officeDocument/2006/relationships" xmlns:p="http://schemas.openxmlformats.org/presentationml/2006/main">
-  <p:tag name="KSO_WM_UNIT_HIGHLIGHT" val="0"/>
-  <p:tag name="KSO_WM_UNIT_COMPATIBLE" val="0"/>
-  <p:tag name="KSO_WM_UNIT_DIAGRAM_ISNUMVISUAL" val="0"/>
-  <p:tag name="KSO_WM_UNIT_DIAGRAM_ISREFERUNIT" val="0"/>
-  <p:tag name="KSO_WM_UNIT_ID" val="_3**"/>
-  <p:tag name="KSO_WM_UNIT_LAYERLEVEL" val="1"/>
-  <p:tag name="KSO_WM_TAG_VERSION" val="1.0"/>
-  <p:tag name="KSO_WM_BEAUTIFY_FLAG" val="#wm#"/>
-</p:tagLst>
-</file>
-
-<file path=ppt/tags/tag14.xml><?xml version="1.0" encoding="utf-8"?>
-<p:tagLst xmlns:a="http://schemas.openxmlformats.org/drawingml/2006/main" xmlns:r="http://schemas.openxmlformats.org/officeDocument/2006/relationships" xmlns:p="http://schemas.openxmlformats.org/presentationml/2006/main">
+<file path=ppt/tags/tag30.xml><?xml version="1.0" encoding="utf-8"?>
+<p:tagLst xmlns:p="http://schemas.openxmlformats.org/presentationml/2006/main">
   <p:tag name="KSO_WM_UNIT_HIGHLIGHT" val="0"/>
   <p:tag name="KSO_WM_UNIT_COMPATIBLE" val="0"/>
   <p:tag name="KSO_WM_UNIT_DIAGRAM_ISNUMVISUAL" val="0"/>
@@ -10469,8 +10946,307 @@
 </p:tagLst>
 </file>
 
-<file path=ppt/tags/tag15.xml><?xml version="1.0" encoding="utf-8"?>
-<p:tagLst xmlns:a="http://schemas.openxmlformats.org/drawingml/2006/main" xmlns:r="http://schemas.openxmlformats.org/officeDocument/2006/relationships" xmlns:p="http://schemas.openxmlformats.org/presentationml/2006/main">
+<file path=ppt/tags/tag31.xml><?xml version="1.0" encoding="utf-8"?>
+<p:tagLst xmlns:p="http://schemas.openxmlformats.org/presentationml/2006/main">
+  <p:tag name="KSO_WM_UNIT_HIGHLIGHT" val="0"/>
+  <p:tag name="KSO_WM_UNIT_COMPATIBLE" val="0"/>
+  <p:tag name="KSO_WM_UNIT_DIAGRAM_ISNUMVISUAL" val="0"/>
+  <p:tag name="KSO_WM_UNIT_DIAGRAM_ISREFERUNIT" val="0"/>
+  <p:tag name="KSO_WM_UNIT_ID" val="_4**"/>
+  <p:tag name="KSO_WM_UNIT_LAYERLEVEL" val="1"/>
+  <p:tag name="KSO_WM_TAG_VERSION" val="1.0"/>
+  <p:tag name="KSO_WM_BEAUTIFY_FLAG" val="#wm#"/>
+</p:tagLst>
+</file>
+
+<file path=ppt/tags/tag32.xml><?xml version="1.0" encoding="utf-8"?>
+<p:tagLst xmlns:p="http://schemas.openxmlformats.org/presentationml/2006/main">
+  <p:tag name="KSO_WM_UNIT_HIGHLIGHT" val="0"/>
+  <p:tag name="KSO_WM_UNIT_COMPATIBLE" val="0"/>
+  <p:tag name="KSO_WM_UNIT_DIAGRAM_ISNUMVISUAL" val="0"/>
+  <p:tag name="KSO_WM_UNIT_DIAGRAM_ISREFERUNIT" val="0"/>
+  <p:tag name="KSO_WM_UNIT_ID" val="_4**"/>
+  <p:tag name="KSO_WM_UNIT_LAYERLEVEL" val="1"/>
+  <p:tag name="KSO_WM_TAG_VERSION" val="1.0"/>
+  <p:tag name="KSO_WM_BEAUTIFY_FLAG" val="#wm#"/>
+</p:tagLst>
+</file>
+
+<file path=ppt/tags/tag33.xml><?xml version="1.0" encoding="utf-8"?>
+<p:tagLst xmlns:p="http://schemas.openxmlformats.org/presentationml/2006/main">
+  <p:tag name="KSO_WM_UNIT_HIGHLIGHT" val="0"/>
+  <p:tag name="KSO_WM_UNIT_COMPATIBLE" val="0"/>
+  <p:tag name="KSO_WM_UNIT_DIAGRAM_ISNUMVISUAL" val="0"/>
+  <p:tag name="KSO_WM_UNIT_DIAGRAM_ISREFERUNIT" val="0"/>
+  <p:tag name="KSO_WM_UNIT_ID" val="_4**"/>
+  <p:tag name="KSO_WM_UNIT_LAYERLEVEL" val="1"/>
+  <p:tag name="KSO_WM_TAG_VERSION" val="1.0"/>
+  <p:tag name="KSO_WM_BEAUTIFY_FLAG" val="#wm#"/>
+</p:tagLst>
+</file>
+
+<file path=ppt/tags/tag34.xml><?xml version="1.0" encoding="utf-8"?>
+<p:tagLst xmlns:p="http://schemas.openxmlformats.org/presentationml/2006/main">
+  <p:tag name="KSO_WM_UNIT_HIGHLIGHT" val="0"/>
+  <p:tag name="KSO_WM_UNIT_COMPATIBLE" val="0"/>
+  <p:tag name="KSO_WM_UNIT_DIAGRAM_ISNUMVISUAL" val="0"/>
+  <p:tag name="KSO_WM_UNIT_DIAGRAM_ISREFERUNIT" val="0"/>
+  <p:tag name="KSO_WM_UNIT_ID" val="_4**"/>
+  <p:tag name="KSO_WM_UNIT_LAYERLEVEL" val="1"/>
+  <p:tag name="KSO_WM_TAG_VERSION" val="1.0"/>
+  <p:tag name="KSO_WM_BEAUTIFY_FLAG" val="#wm#"/>
+</p:tagLst>
+</file>
+
+<file path=ppt/tags/tag35.xml><?xml version="1.0" encoding="utf-8"?>
+<p:tagLst xmlns:p="http://schemas.openxmlformats.org/presentationml/2006/main">
+  <p:tag name="KSO_WM_UNIT_HIGHLIGHT" val="0"/>
+  <p:tag name="KSO_WM_UNIT_COMPATIBLE" val="0"/>
+  <p:tag name="KSO_WM_UNIT_DIAGRAM_ISNUMVISUAL" val="0"/>
+  <p:tag name="KSO_WM_UNIT_DIAGRAM_ISREFERUNIT" val="0"/>
+  <p:tag name="KSO_WM_UNIT_ID" val="_4**"/>
+  <p:tag name="KSO_WM_UNIT_LAYERLEVEL" val="1"/>
+  <p:tag name="KSO_WM_TAG_VERSION" val="1.0"/>
+  <p:tag name="KSO_WM_BEAUTIFY_FLAG" val="#wm#"/>
+</p:tagLst>
+</file>
+
+<file path=ppt/tags/tag36.xml><?xml version="1.0" encoding="utf-8"?>
+<p:tagLst xmlns:p="http://schemas.openxmlformats.org/presentationml/2006/main">
+  <p:tag name="KSO_WM_UNIT_HIGHLIGHT" val="0"/>
+  <p:tag name="KSO_WM_UNIT_COMPATIBLE" val="0"/>
+  <p:tag name="KSO_WM_UNIT_DIAGRAM_ISNUMVISUAL" val="0"/>
+  <p:tag name="KSO_WM_UNIT_DIAGRAM_ISREFERUNIT" val="0"/>
+  <p:tag name="KSO_WM_UNIT_ID" val="_4**"/>
+  <p:tag name="KSO_WM_UNIT_LAYERLEVEL" val="1"/>
+  <p:tag name="KSO_WM_TAG_VERSION" val="1.0"/>
+  <p:tag name="KSO_WM_BEAUTIFY_FLAG" val="#wm#"/>
+</p:tagLst>
+</file>
+
+<file path=ppt/tags/tag37.xml><?xml version="1.0" encoding="utf-8"?>
+<p:tagLst xmlns:p="http://schemas.openxmlformats.org/presentationml/2006/main">
+  <p:tag name="KSO_WM_UNIT_HIGHLIGHT" val="0"/>
+  <p:tag name="KSO_WM_UNIT_COMPATIBLE" val="0"/>
+  <p:tag name="KSO_WM_UNIT_DIAGRAM_ISNUMVISUAL" val="0"/>
+  <p:tag name="KSO_WM_UNIT_DIAGRAM_ISREFERUNIT" val="0"/>
+  <p:tag name="KSO_WM_UNIT_ID" val="_5**"/>
+  <p:tag name="KSO_WM_UNIT_LAYERLEVEL" val="1"/>
+  <p:tag name="KSO_WM_TAG_VERSION" val="1.0"/>
+  <p:tag name="KSO_WM_BEAUTIFY_FLAG" val="#wm#"/>
+</p:tagLst>
+</file>
+
+<file path=ppt/tags/tag38.xml><?xml version="1.0" encoding="utf-8"?>
+<p:tagLst xmlns:p="http://schemas.openxmlformats.org/presentationml/2006/main">
+  <p:tag name="KSO_WM_UNIT_HIGHLIGHT" val="0"/>
+  <p:tag name="KSO_WM_UNIT_COMPATIBLE" val="0"/>
+  <p:tag name="KSO_WM_UNIT_DIAGRAM_ISNUMVISUAL" val="0"/>
+  <p:tag name="KSO_WM_UNIT_DIAGRAM_ISREFERUNIT" val="0"/>
+  <p:tag name="KSO_WM_UNIT_ID" val="_5**"/>
+  <p:tag name="KSO_WM_UNIT_LAYERLEVEL" val="1"/>
+  <p:tag name="KSO_WM_TAG_VERSION" val="1.0"/>
+  <p:tag name="KSO_WM_BEAUTIFY_FLAG" val="#wm#"/>
+</p:tagLst>
+</file>
+
+<file path=ppt/tags/tag39.xml><?xml version="1.0" encoding="utf-8"?>
+<p:tagLst xmlns:p="http://schemas.openxmlformats.org/presentationml/2006/main">
+  <p:tag name="KSO_WM_UNIT_HIGHLIGHT" val="0"/>
+  <p:tag name="KSO_WM_UNIT_COMPATIBLE" val="0"/>
+  <p:tag name="KSO_WM_UNIT_DIAGRAM_ISNUMVISUAL" val="0"/>
+  <p:tag name="KSO_WM_UNIT_DIAGRAM_ISREFERUNIT" val="0"/>
+  <p:tag name="KSO_WM_UNIT_ID" val="_5**"/>
+  <p:tag name="KSO_WM_UNIT_LAYERLEVEL" val="1"/>
+  <p:tag name="KSO_WM_TAG_VERSION" val="1.0"/>
+  <p:tag name="KSO_WM_BEAUTIFY_FLAG" val="#wm#"/>
+</p:tagLst>
+</file>
+
+<file path=ppt/tags/tag4.xml><?xml version="1.0" encoding="utf-8"?>
+<p:tagLst xmlns:p="http://schemas.openxmlformats.org/presentationml/2006/main">
+  <p:tag name="KSO_WM_UNIT_HIGHLIGHT" val="0"/>
+  <p:tag name="KSO_WM_UNIT_COMPATIBLE" val="0"/>
+  <p:tag name="KSO_WM_UNIT_DIAGRAM_ISNUMVISUAL" val="0"/>
+  <p:tag name="KSO_WM_UNIT_DIAGRAM_ISREFERUNIT" val="0"/>
+  <p:tag name="KSO_WM_UNIT_ID" val="_5**"/>
+  <p:tag name="KSO_WM_UNIT_LAYERLEVEL" val="1"/>
+  <p:tag name="KSO_WM_TAG_VERSION" val="1.0"/>
+  <p:tag name="KSO_WM_BEAUTIFY_FLAG" val="#wm#"/>
+</p:tagLst>
+</file>
+
+<file path=ppt/tags/tag40.xml><?xml version="1.0" encoding="utf-8"?>
+<p:tagLst xmlns:p="http://schemas.openxmlformats.org/presentationml/2006/main">
+  <p:tag name="KSO_WM_UNIT_HIGHLIGHT" val="0"/>
+  <p:tag name="KSO_WM_UNIT_COMPATIBLE" val="0"/>
+  <p:tag name="KSO_WM_UNIT_DIAGRAM_ISNUMVISUAL" val="0"/>
+  <p:tag name="KSO_WM_UNIT_DIAGRAM_ISREFERUNIT" val="0"/>
+  <p:tag name="KSO_WM_UNIT_ID" val="_5**"/>
+  <p:tag name="KSO_WM_UNIT_LAYERLEVEL" val="1"/>
+  <p:tag name="KSO_WM_TAG_VERSION" val="1.0"/>
+  <p:tag name="KSO_WM_BEAUTIFY_FLAG" val="#wm#"/>
+</p:tagLst>
+</file>
+
+<file path=ppt/tags/tag41.xml><?xml version="1.0" encoding="utf-8"?>
+<p:tagLst xmlns:p="http://schemas.openxmlformats.org/presentationml/2006/main">
+  <p:tag name="KSO_WM_UNIT_HIGHLIGHT" val="0"/>
+  <p:tag name="KSO_WM_UNIT_COMPATIBLE" val="0"/>
+  <p:tag name="KSO_WM_UNIT_DIAGRAM_ISNUMVISUAL" val="0"/>
+  <p:tag name="KSO_WM_UNIT_DIAGRAM_ISREFERUNIT" val="0"/>
+  <p:tag name="KSO_WM_UNIT_ID" val="_5**"/>
+  <p:tag name="KSO_WM_UNIT_LAYERLEVEL" val="1"/>
+  <p:tag name="KSO_WM_TAG_VERSION" val="1.0"/>
+  <p:tag name="KSO_WM_BEAUTIFY_FLAG" val="#wm#"/>
+</p:tagLst>
+</file>
+
+<file path=ppt/tags/tag42.xml><?xml version="1.0" encoding="utf-8"?>
+<p:tagLst xmlns:p="http://schemas.openxmlformats.org/presentationml/2006/main">
+  <p:tag name="KSO_WM_UNIT_HIGHLIGHT" val="0"/>
+  <p:tag name="KSO_WM_UNIT_COMPATIBLE" val="0"/>
+  <p:tag name="KSO_WM_UNIT_DIAGRAM_ISNUMVISUAL" val="0"/>
+  <p:tag name="KSO_WM_UNIT_DIAGRAM_ISREFERUNIT" val="0"/>
+  <p:tag name="KSO_WM_UNIT_ID" val="_5**"/>
+  <p:tag name="KSO_WM_UNIT_LAYERLEVEL" val="1"/>
+  <p:tag name="KSO_WM_TAG_VERSION" val="1.0"/>
+  <p:tag name="KSO_WM_BEAUTIFY_FLAG" val="#wm#"/>
+</p:tagLst>
+</file>
+
+<file path=ppt/tags/tag43.xml><?xml version="1.0" encoding="utf-8"?>
+<p:tagLst xmlns:p="http://schemas.openxmlformats.org/presentationml/2006/main">
+  <p:tag name="KSO_WM_UNIT_HIGHLIGHT" val="0"/>
+  <p:tag name="KSO_WM_UNIT_COMPATIBLE" val="0"/>
+  <p:tag name="KSO_WM_UNIT_DIAGRAM_ISNUMVISUAL" val="0"/>
+  <p:tag name="KSO_WM_UNIT_DIAGRAM_ISREFERUNIT" val="0"/>
+  <p:tag name="KSO_WM_UNIT_ID" val="_5**"/>
+  <p:tag name="KSO_WM_UNIT_LAYERLEVEL" val="1"/>
+  <p:tag name="KSO_WM_TAG_VERSION" val="1.0"/>
+  <p:tag name="KSO_WM_BEAUTIFY_FLAG" val="#wm#"/>
+</p:tagLst>
+</file>
+
+<file path=ppt/tags/tag44.xml><?xml version="1.0" encoding="utf-8"?>
+<p:tagLst xmlns:p="http://schemas.openxmlformats.org/presentationml/2006/main">
+  <p:tag name="KSO_WM_UNIT_HIGHLIGHT" val="0"/>
+  <p:tag name="KSO_WM_UNIT_COMPATIBLE" val="0"/>
+  <p:tag name="KSO_WM_UNIT_DIAGRAM_ISNUMVISUAL" val="0"/>
+  <p:tag name="KSO_WM_UNIT_DIAGRAM_ISREFERUNIT" val="0"/>
+  <p:tag name="KSO_WM_UNIT_ID" val="_5**"/>
+  <p:tag name="KSO_WM_UNIT_LAYERLEVEL" val="1"/>
+  <p:tag name="KSO_WM_TAG_VERSION" val="1.0"/>
+  <p:tag name="KSO_WM_BEAUTIFY_FLAG" val="#wm#"/>
+</p:tagLst>
+</file>
+
+<file path=ppt/tags/tag45.xml><?xml version="1.0" encoding="utf-8"?>
+<p:tagLst xmlns:p="http://schemas.openxmlformats.org/presentationml/2006/main">
+  <p:tag name="KSO_WM_UNIT_HIGHLIGHT" val="0"/>
+  <p:tag name="KSO_WM_UNIT_COMPATIBLE" val="0"/>
+  <p:tag name="KSO_WM_UNIT_DIAGRAM_ISNUMVISUAL" val="0"/>
+  <p:tag name="KSO_WM_UNIT_DIAGRAM_ISREFERUNIT" val="0"/>
+  <p:tag name="KSO_WM_UNIT_ID" val="_6**"/>
+  <p:tag name="KSO_WM_UNIT_LAYERLEVEL" val="1"/>
+  <p:tag name="KSO_WM_TAG_VERSION" val="1.0"/>
+  <p:tag name="KSO_WM_BEAUTIFY_FLAG" val="#wm#"/>
+</p:tagLst>
+</file>
+
+<file path=ppt/tags/tag46.xml><?xml version="1.0" encoding="utf-8"?>
+<p:tagLst xmlns:p="http://schemas.openxmlformats.org/presentationml/2006/main">
+  <p:tag name="KSO_WM_UNIT_HIGHLIGHT" val="0"/>
+  <p:tag name="KSO_WM_UNIT_COMPATIBLE" val="0"/>
+  <p:tag name="KSO_WM_UNIT_DIAGRAM_ISNUMVISUAL" val="0"/>
+  <p:tag name="KSO_WM_UNIT_DIAGRAM_ISREFERUNIT" val="0"/>
+  <p:tag name="KSO_WM_UNIT_ID" val="_6**"/>
+  <p:tag name="KSO_WM_UNIT_LAYERLEVEL" val="1"/>
+  <p:tag name="KSO_WM_TAG_VERSION" val="1.0"/>
+  <p:tag name="KSO_WM_BEAUTIFY_FLAG" val="#wm#"/>
+</p:tagLst>
+</file>
+
+<file path=ppt/tags/tag47.xml><?xml version="1.0" encoding="utf-8"?>
+<p:tagLst xmlns:p="http://schemas.openxmlformats.org/presentationml/2006/main">
+  <p:tag name="KSO_WM_UNIT_HIGHLIGHT" val="0"/>
+  <p:tag name="KSO_WM_UNIT_COMPATIBLE" val="0"/>
+  <p:tag name="KSO_WM_UNIT_DIAGRAM_ISNUMVISUAL" val="0"/>
+  <p:tag name="KSO_WM_UNIT_DIAGRAM_ISREFERUNIT" val="0"/>
+  <p:tag name="KSO_WM_UNIT_ID" val="_6**"/>
+  <p:tag name="KSO_WM_UNIT_LAYERLEVEL" val="1"/>
+  <p:tag name="KSO_WM_TAG_VERSION" val="1.0"/>
+  <p:tag name="KSO_WM_BEAUTIFY_FLAG" val="#wm#"/>
+</p:tagLst>
+</file>
+
+<file path=ppt/tags/tag48.xml><?xml version="1.0" encoding="utf-8"?>
+<p:tagLst xmlns:p="http://schemas.openxmlformats.org/presentationml/2006/main">
+  <p:tag name="KSO_WM_UNIT_HIGHLIGHT" val="0"/>
+  <p:tag name="KSO_WM_UNIT_COMPATIBLE" val="0"/>
+  <p:tag name="KSO_WM_UNIT_DIAGRAM_ISNUMVISUAL" val="0"/>
+  <p:tag name="KSO_WM_UNIT_DIAGRAM_ISREFERUNIT" val="0"/>
+  <p:tag name="KSO_WM_UNIT_ID" val="_6**"/>
+  <p:tag name="KSO_WM_UNIT_LAYERLEVEL" val="1"/>
+  <p:tag name="KSO_WM_TAG_VERSION" val="1.0"/>
+  <p:tag name="KSO_WM_BEAUTIFY_FLAG" val="#wm#"/>
+</p:tagLst>
+</file>
+
+<file path=ppt/tags/tag49.xml><?xml version="1.0" encoding="utf-8"?>
+<p:tagLst xmlns:p="http://schemas.openxmlformats.org/presentationml/2006/main">
+  <p:tag name="KSO_WM_UNIT_HIGHLIGHT" val="0"/>
+  <p:tag name="KSO_WM_UNIT_COMPATIBLE" val="0"/>
+  <p:tag name="KSO_WM_UNIT_DIAGRAM_ISNUMVISUAL" val="0"/>
+  <p:tag name="KSO_WM_UNIT_DIAGRAM_ISREFERUNIT" val="0"/>
+  <p:tag name="KSO_WM_UNIT_ID" val="_7**"/>
+  <p:tag name="KSO_WM_UNIT_LAYERLEVEL" val="1"/>
+  <p:tag name="KSO_WM_TAG_VERSION" val="1.0"/>
+  <p:tag name="KSO_WM_BEAUTIFY_FLAG" val="#wm#"/>
+</p:tagLst>
+</file>
+
+<file path=ppt/tags/tag5.xml><?xml version="1.0" encoding="utf-8"?>
+<p:tagLst xmlns:p="http://schemas.openxmlformats.org/presentationml/2006/main">
+  <p:tag name="KSO_WM_UNIT_HIGHLIGHT" val="0"/>
+  <p:tag name="KSO_WM_UNIT_COMPATIBLE" val="0"/>
+  <p:tag name="KSO_WM_UNIT_DIAGRAM_ISNUMVISUAL" val="0"/>
+  <p:tag name="KSO_WM_UNIT_DIAGRAM_ISREFERUNIT" val="0"/>
+  <p:tag name="KSO_WM_UNIT_ID" val="_5**"/>
+  <p:tag name="KSO_WM_UNIT_LAYERLEVEL" val="1"/>
+  <p:tag name="KSO_WM_TAG_VERSION" val="1.0"/>
+  <p:tag name="KSO_WM_BEAUTIFY_FLAG" val="#wm#"/>
+</p:tagLst>
+</file>
+
+<file path=ppt/tags/tag50.xml><?xml version="1.0" encoding="utf-8"?>
+<p:tagLst xmlns:p="http://schemas.openxmlformats.org/presentationml/2006/main">
+  <p:tag name="KSO_WM_UNIT_HIGHLIGHT" val="0"/>
+  <p:tag name="KSO_WM_UNIT_COMPATIBLE" val="0"/>
+  <p:tag name="KSO_WM_UNIT_DIAGRAM_ISNUMVISUAL" val="0"/>
+  <p:tag name="KSO_WM_UNIT_DIAGRAM_ISREFERUNIT" val="0"/>
+  <p:tag name="KSO_WM_UNIT_ID" val="_7**"/>
+  <p:tag name="KSO_WM_UNIT_LAYERLEVEL" val="1"/>
+  <p:tag name="KSO_WM_TAG_VERSION" val="1.0"/>
+  <p:tag name="KSO_WM_BEAUTIFY_FLAG" val="#wm#"/>
+</p:tagLst>
+</file>
+
+<file path=ppt/tags/tag51.xml><?xml version="1.0" encoding="utf-8"?>
+<p:tagLst xmlns:p="http://schemas.openxmlformats.org/presentationml/2006/main">
+  <p:tag name="KSO_WM_UNIT_HIGHLIGHT" val="0"/>
+  <p:tag name="KSO_WM_UNIT_COMPATIBLE" val="0"/>
+  <p:tag name="KSO_WM_UNIT_DIAGRAM_ISNUMVISUAL" val="0"/>
+  <p:tag name="KSO_WM_UNIT_DIAGRAM_ISREFERUNIT" val="0"/>
+  <p:tag name="KSO_WM_UNIT_ID" val="_7**"/>
+  <p:tag name="KSO_WM_UNIT_LAYERLEVEL" val="1"/>
+  <p:tag name="KSO_WM_TAG_VERSION" val="1.0"/>
+  <p:tag name="KSO_WM_BEAUTIFY_FLAG" val="#wm#"/>
+</p:tagLst>
+</file>
+
+<file path=ppt/tags/tag52.xml><?xml version="1.0" encoding="utf-8"?>
+<p:tagLst xmlns:p="http://schemas.openxmlformats.org/presentationml/2006/main">
   <p:tag name="KSO_WM_UNIT_HIGHLIGHT" val="0"/>
   <p:tag name="KSO_WM_UNIT_COMPATIBLE" val="0"/>
   <p:tag name="KSO_WM_UNIT_DIAGRAM_ISNUMVISUAL" val="0"/>
@@ -10482,8 +11258,8 @@
 </p:tagLst>
 </file>
 
-<file path=ppt/tags/tag16.xml><?xml version="1.0" encoding="utf-8"?>
-<p:tagLst xmlns:a="http://schemas.openxmlformats.org/drawingml/2006/main" xmlns:r="http://schemas.openxmlformats.org/officeDocument/2006/relationships" xmlns:p="http://schemas.openxmlformats.org/presentationml/2006/main">
+<file path=ppt/tags/tag53.xml><?xml version="1.0" encoding="utf-8"?>
+<p:tagLst xmlns:p="http://schemas.openxmlformats.org/presentationml/2006/main">
   <p:tag name="KSO_WM_UNIT_HIGHLIGHT" val="0"/>
   <p:tag name="KSO_WM_UNIT_COMPATIBLE" val="0"/>
   <p:tag name="KSO_WM_UNIT_DIAGRAM_ISNUMVISUAL" val="0"/>
@@ -10495,8 +11271,8 @@
 </p:tagLst>
 </file>
 
-<file path=ppt/tags/tag17.xml><?xml version="1.0" encoding="utf-8"?>
-<p:tagLst xmlns:a="http://schemas.openxmlformats.org/drawingml/2006/main" xmlns:r="http://schemas.openxmlformats.org/officeDocument/2006/relationships" xmlns:p="http://schemas.openxmlformats.org/presentationml/2006/main">
+<file path=ppt/tags/tag54.xml><?xml version="1.0" encoding="utf-8"?>
+<p:tagLst xmlns:p="http://schemas.openxmlformats.org/presentationml/2006/main">
   <p:tag name="KSO_WM_UNIT_HIGHLIGHT" val="0"/>
   <p:tag name="KSO_WM_UNIT_COMPATIBLE" val="0"/>
   <p:tag name="KSO_WM_UNIT_DIAGRAM_ISNUMVISUAL" val="0"/>
@@ -10508,8 +11284,8 @@
 </p:tagLst>
 </file>
 
-<file path=ppt/tags/tag18.xml><?xml version="1.0" encoding="utf-8"?>
-<p:tagLst xmlns:a="http://schemas.openxmlformats.org/drawingml/2006/main" xmlns:r="http://schemas.openxmlformats.org/officeDocument/2006/relationships" xmlns:p="http://schemas.openxmlformats.org/presentationml/2006/main">
+<file path=ppt/tags/tag55.xml><?xml version="1.0" encoding="utf-8"?>
+<p:tagLst xmlns:p="http://schemas.openxmlformats.org/presentationml/2006/main">
   <p:tag name="KSO_WM_UNIT_HIGHLIGHT" val="0"/>
   <p:tag name="KSO_WM_UNIT_COMPATIBLE" val="0"/>
   <p:tag name="KSO_WM_UNIT_DIAGRAM_ISNUMVISUAL" val="0"/>
@@ -10521,8 +11297,8 @@
 </p:tagLst>
 </file>
 
-<file path=ppt/tags/tag19.xml><?xml version="1.0" encoding="utf-8"?>
-<p:tagLst xmlns:a="http://schemas.openxmlformats.org/drawingml/2006/main" xmlns:r="http://schemas.openxmlformats.org/officeDocument/2006/relationships" xmlns:p="http://schemas.openxmlformats.org/presentationml/2006/main">
+<file path=ppt/tags/tag56.xml><?xml version="1.0" encoding="utf-8"?>
+<p:tagLst xmlns:p="http://schemas.openxmlformats.org/presentationml/2006/main">
   <p:tag name="KSO_WM_UNIT_HIGHLIGHT" val="0"/>
   <p:tag name="KSO_WM_UNIT_COMPATIBLE" val="0"/>
   <p:tag name="KSO_WM_UNIT_DIAGRAM_ISNUMVISUAL" val="0"/>
@@ -10534,45 +11310,8 @@
 </p:tagLst>
 </file>
 
-<file path=ppt/tags/tag2.xml><?xml version="1.0" encoding="utf-8"?>
-<p:tagLst xmlns:a="http://schemas.openxmlformats.org/drawingml/2006/main" xmlns:r="http://schemas.openxmlformats.org/officeDocument/2006/relationships" xmlns:p="http://schemas.openxmlformats.org/presentationml/2006/main">
-  <p:tag name="KSO_WM_TEMPLATE_THUMBS_INDEX" val="1、2、3、6、8、10、11、12、15"/>
-  <p:tag name="KSO_WM_TEMPLATE_SUBCATEGORY" val="0"/>
-  <p:tag name="KSO_WM_TAG_VERSION" val="1.0"/>
-  <p:tag name="KSO_WM_BEAUTIFY_FLAG" val="#wm#"/>
-  <p:tag name="KSO_WM_TEMPLATE_CATEGORY" val="custom"/>
-  <p:tag name="KSO_WM_TEMPLATE_INDEX" val="20187308"/>
-</p:tagLst>
-</file>
-
-<file path=ppt/tags/tag20.xml><?xml version="1.0" encoding="utf-8"?>
-<p:tagLst xmlns:a="http://schemas.openxmlformats.org/drawingml/2006/main" xmlns:r="http://schemas.openxmlformats.org/officeDocument/2006/relationships" xmlns:p="http://schemas.openxmlformats.org/presentationml/2006/main">
-  <p:tag name="KSO_WM_UNIT_HIGHLIGHT" val="0"/>
-  <p:tag name="KSO_WM_UNIT_COMPATIBLE" val="0"/>
-  <p:tag name="KSO_WM_UNIT_DIAGRAM_ISNUMVISUAL" val="0"/>
-  <p:tag name="KSO_WM_UNIT_DIAGRAM_ISREFERUNIT" val="0"/>
-  <p:tag name="KSO_WM_UNIT_ID" val="_3**"/>
-  <p:tag name="KSO_WM_UNIT_LAYERLEVEL" val="1"/>
-  <p:tag name="KSO_WM_TAG_VERSION" val="1.0"/>
-  <p:tag name="KSO_WM_BEAUTIFY_FLAG" val="#wm#"/>
-</p:tagLst>
-</file>
-
-<file path=ppt/tags/tag21.xml><?xml version="1.0" encoding="utf-8"?>
-<p:tagLst xmlns:a="http://schemas.openxmlformats.org/drawingml/2006/main" xmlns:r="http://schemas.openxmlformats.org/officeDocument/2006/relationships" xmlns:p="http://schemas.openxmlformats.org/presentationml/2006/main">
-  <p:tag name="KSO_WM_UNIT_HIGHLIGHT" val="0"/>
-  <p:tag name="KSO_WM_UNIT_COMPATIBLE" val="0"/>
-  <p:tag name="KSO_WM_UNIT_DIAGRAM_ISNUMVISUAL" val="0"/>
-  <p:tag name="KSO_WM_UNIT_DIAGRAM_ISREFERUNIT" val="0"/>
-  <p:tag name="KSO_WM_UNIT_ID" val="_3**"/>
-  <p:tag name="KSO_WM_UNIT_LAYERLEVEL" val="1"/>
-  <p:tag name="KSO_WM_TAG_VERSION" val="1.0"/>
-  <p:tag name="KSO_WM_BEAUTIFY_FLAG" val="#wm#"/>
-</p:tagLst>
-</file>
-
-<file path=ppt/tags/tag22.xml><?xml version="1.0" encoding="utf-8"?>
-<p:tagLst xmlns:a="http://schemas.openxmlformats.org/drawingml/2006/main" xmlns:r="http://schemas.openxmlformats.org/officeDocument/2006/relationships" xmlns:p="http://schemas.openxmlformats.org/presentationml/2006/main">
+<file path=ppt/tags/tag57.xml><?xml version="1.0" encoding="utf-8"?>
+<p:tagLst xmlns:p="http://schemas.openxmlformats.org/presentationml/2006/main">
   <p:tag name="KSO_WM_UNIT_HIGHLIGHT" val="0"/>
   <p:tag name="KSO_WM_UNIT_COMPATIBLE" val="0"/>
   <p:tag name="KSO_WM_UNIT_DIAGRAM_ISNUMVISUAL" val="0"/>
@@ -10584,229 +11323,34 @@
 </p:tagLst>
 </file>
 
-<file path=ppt/tags/tag23.xml><?xml version="1.0" encoding="utf-8"?>
-<p:tagLst xmlns:a="http://schemas.openxmlformats.org/drawingml/2006/main" xmlns:r="http://schemas.openxmlformats.org/officeDocument/2006/relationships" xmlns:p="http://schemas.openxmlformats.org/presentationml/2006/main">
+<file path=ppt/tags/tag58.xml><?xml version="1.0" encoding="utf-8"?>
+<p:tagLst xmlns:p="http://schemas.openxmlformats.org/presentationml/2006/main">
   <p:tag name="KSO_WM_UNIT_HIGHLIGHT" val="0"/>
   <p:tag name="KSO_WM_UNIT_COMPATIBLE" val="0"/>
   <p:tag name="KSO_WM_UNIT_DIAGRAM_ISNUMVISUAL" val="0"/>
   <p:tag name="KSO_WM_UNIT_DIAGRAM_ISREFERUNIT" val="0"/>
-  <p:tag name="KSO_WM_UNIT_ID" val="_8**"/>
+  <p:tag name="KSO_WM_UNIT_ID" val="_9**"/>
   <p:tag name="KSO_WM_UNIT_LAYERLEVEL" val="1"/>
   <p:tag name="KSO_WM_TAG_VERSION" val="1.0"/>
   <p:tag name="KSO_WM_BEAUTIFY_FLAG" val="#wm#"/>
 </p:tagLst>
 </file>
 
-<file path=ppt/tags/tag24.xml><?xml version="1.0" encoding="utf-8"?>
-<p:tagLst xmlns:a="http://schemas.openxmlformats.org/drawingml/2006/main" xmlns:r="http://schemas.openxmlformats.org/officeDocument/2006/relationships" xmlns:p="http://schemas.openxmlformats.org/presentationml/2006/main">
+<file path=ppt/tags/tag59.xml><?xml version="1.0" encoding="utf-8"?>
+<p:tagLst xmlns:p="http://schemas.openxmlformats.org/presentationml/2006/main">
   <p:tag name="KSO_WM_UNIT_HIGHLIGHT" val="0"/>
   <p:tag name="KSO_WM_UNIT_COMPATIBLE" val="0"/>
   <p:tag name="KSO_WM_UNIT_DIAGRAM_ISNUMVISUAL" val="0"/>
   <p:tag name="KSO_WM_UNIT_DIAGRAM_ISREFERUNIT" val="0"/>
-  <p:tag name="KSO_WM_UNIT_ID" val="_8**"/>
+  <p:tag name="KSO_WM_UNIT_ID" val="_9**"/>
   <p:tag name="KSO_WM_UNIT_LAYERLEVEL" val="1"/>
   <p:tag name="KSO_WM_TAG_VERSION" val="1.0"/>
   <p:tag name="KSO_WM_BEAUTIFY_FLAG" val="#wm#"/>
 </p:tagLst>
 </file>
 
-<file path=ppt/tags/tag25.xml><?xml version="1.0" encoding="utf-8"?>
-<p:tagLst xmlns:a="http://schemas.openxmlformats.org/drawingml/2006/main" xmlns:r="http://schemas.openxmlformats.org/officeDocument/2006/relationships" xmlns:p="http://schemas.openxmlformats.org/presentationml/2006/main">
-  <p:tag name="KSO_WM_UNIT_HIGHLIGHT" val="0"/>
-  <p:tag name="KSO_WM_UNIT_COMPATIBLE" val="0"/>
-  <p:tag name="KSO_WM_UNIT_DIAGRAM_ISNUMVISUAL" val="0"/>
-  <p:tag name="KSO_WM_UNIT_DIAGRAM_ISREFERUNIT" val="0"/>
-  <p:tag name="KSO_WM_UNIT_ID" val="_3**"/>
-  <p:tag name="KSO_WM_UNIT_LAYERLEVEL" val="1"/>
-  <p:tag name="KSO_WM_TAG_VERSION" val="1.0"/>
-  <p:tag name="KSO_WM_BEAUTIFY_FLAG" val="#wm#"/>
-</p:tagLst>
-</file>
-
-<file path=ppt/tags/tag26.xml><?xml version="1.0" encoding="utf-8"?>
-<p:tagLst xmlns:a="http://schemas.openxmlformats.org/drawingml/2006/main" xmlns:r="http://schemas.openxmlformats.org/officeDocument/2006/relationships" xmlns:p="http://schemas.openxmlformats.org/presentationml/2006/main">
-  <p:tag name="KSO_WM_UNIT_HIGHLIGHT" val="0"/>
-  <p:tag name="KSO_WM_UNIT_COMPATIBLE" val="0"/>
-  <p:tag name="KSO_WM_UNIT_DIAGRAM_ISNUMVISUAL" val="0"/>
-  <p:tag name="KSO_WM_UNIT_DIAGRAM_ISREFERUNIT" val="0"/>
-  <p:tag name="KSO_WM_UNIT_ID" val="_11**"/>
-  <p:tag name="KSO_WM_UNIT_LAYERLEVEL" val="1"/>
-  <p:tag name="KSO_WM_TAG_VERSION" val="1.0"/>
-  <p:tag name="KSO_WM_BEAUTIFY_FLAG" val="#wm#"/>
-</p:tagLst>
-</file>
-
-<file path=ppt/tags/tag27.xml><?xml version="1.0" encoding="utf-8"?>
-<p:tagLst xmlns:a="http://schemas.openxmlformats.org/drawingml/2006/main" xmlns:r="http://schemas.openxmlformats.org/officeDocument/2006/relationships" xmlns:p="http://schemas.openxmlformats.org/presentationml/2006/main">
-  <p:tag name="KSO_WM_UNIT_HIGHLIGHT" val="0"/>
-  <p:tag name="KSO_WM_UNIT_COMPATIBLE" val="0"/>
-  <p:tag name="KSO_WM_UNIT_DIAGRAM_ISNUMVISUAL" val="0"/>
-  <p:tag name="KSO_WM_UNIT_DIAGRAM_ISREFERUNIT" val="0"/>
-  <p:tag name="KSO_WM_UNIT_ID" val="_11**"/>
-  <p:tag name="KSO_WM_UNIT_LAYERLEVEL" val="1"/>
-  <p:tag name="KSO_WM_TAG_VERSION" val="1.0"/>
-  <p:tag name="KSO_WM_BEAUTIFY_FLAG" val="#wm#"/>
-</p:tagLst>
-</file>
-
-<file path=ppt/tags/tag28.xml><?xml version="1.0" encoding="utf-8"?>
-<p:tagLst xmlns:a="http://schemas.openxmlformats.org/drawingml/2006/main" xmlns:r="http://schemas.openxmlformats.org/officeDocument/2006/relationships" xmlns:p="http://schemas.openxmlformats.org/presentationml/2006/main">
-  <p:tag name="KSO_WM_UNIT_HIGHLIGHT" val="0"/>
-  <p:tag name="KSO_WM_UNIT_COMPATIBLE" val="0"/>
-  <p:tag name="KSO_WM_UNIT_DIAGRAM_ISNUMVISUAL" val="0"/>
-  <p:tag name="KSO_WM_UNIT_DIAGRAM_ISREFERUNIT" val="0"/>
-  <p:tag name="KSO_WM_UNIT_ID" val="_11**"/>
-  <p:tag name="KSO_WM_UNIT_LAYERLEVEL" val="1"/>
-  <p:tag name="KSO_WM_TAG_VERSION" val="1.0"/>
-  <p:tag name="KSO_WM_BEAUTIFY_FLAG" val="#wm#"/>
-</p:tagLst>
-</file>
-
-<file path=ppt/tags/tag29.xml><?xml version="1.0" encoding="utf-8"?>
-<p:tagLst xmlns:a="http://schemas.openxmlformats.org/drawingml/2006/main" xmlns:r="http://schemas.openxmlformats.org/officeDocument/2006/relationships" xmlns:p="http://schemas.openxmlformats.org/presentationml/2006/main">
-  <p:tag name="KSO_WM_UNIT_HIGHLIGHT" val="0"/>
-  <p:tag name="KSO_WM_UNIT_COMPATIBLE" val="0"/>
-  <p:tag name="KSO_WM_UNIT_DIAGRAM_ISNUMVISUAL" val="0"/>
-  <p:tag name="KSO_WM_UNIT_DIAGRAM_ISREFERUNIT" val="0"/>
-  <p:tag name="KSO_WM_UNIT_ID" val="_11**"/>
-  <p:tag name="KSO_WM_UNIT_LAYERLEVEL" val="1"/>
-  <p:tag name="KSO_WM_TAG_VERSION" val="1.0"/>
-  <p:tag name="KSO_WM_BEAUTIFY_FLAG" val="#wm#"/>
-</p:tagLst>
-</file>
-
-<file path=ppt/tags/tag3.xml><?xml version="1.0" encoding="utf-8"?>
-<p:tagLst xmlns:a="http://schemas.openxmlformats.org/drawingml/2006/main" xmlns:r="http://schemas.openxmlformats.org/officeDocument/2006/relationships" xmlns:p="http://schemas.openxmlformats.org/presentationml/2006/main">
-  <p:tag name="KSO_WM_UNIT_HIGHLIGHT" val="0"/>
-  <p:tag name="KSO_WM_UNIT_COMPATIBLE" val="0"/>
-  <p:tag name="KSO_WM_UNIT_DIAGRAM_ISNUMVISUAL" val="0"/>
-  <p:tag name="KSO_WM_UNIT_DIAGRAM_ISREFERUNIT" val="0"/>
-  <p:tag name="KSO_WM_UNIT_ID" val="_3**"/>
-  <p:tag name="KSO_WM_UNIT_LAYERLEVEL" val="1"/>
-  <p:tag name="KSO_WM_TAG_VERSION" val="1.0"/>
-  <p:tag name="KSO_WM_BEAUTIFY_FLAG" val="#wm#"/>
-</p:tagLst>
-</file>
-
-<file path=ppt/tags/tag30.xml><?xml version="1.0" encoding="utf-8"?>
-<p:tagLst xmlns:a="http://schemas.openxmlformats.org/drawingml/2006/main" xmlns:r="http://schemas.openxmlformats.org/officeDocument/2006/relationships" xmlns:p="http://schemas.openxmlformats.org/presentationml/2006/main">
-  <p:tag name="KSO_WM_UNIT_HIGHLIGHT" val="0"/>
-  <p:tag name="KSO_WM_UNIT_COMPATIBLE" val="0"/>
-  <p:tag name="KSO_WM_UNIT_DIAGRAM_ISNUMVISUAL" val="0"/>
-  <p:tag name="KSO_WM_UNIT_DIAGRAM_ISREFERUNIT" val="0"/>
-  <p:tag name="KSO_WM_UNIT_ID" val="_8**"/>
-  <p:tag name="KSO_WM_UNIT_LAYERLEVEL" val="1"/>
-  <p:tag name="KSO_WM_TAG_VERSION" val="1.0"/>
-  <p:tag name="KSO_WM_BEAUTIFY_FLAG" val="#wm#"/>
-</p:tagLst>
-</file>
-
-<file path=ppt/tags/tag31.xml><?xml version="1.0" encoding="utf-8"?>
-<p:tagLst xmlns:a="http://schemas.openxmlformats.org/drawingml/2006/main" xmlns:r="http://schemas.openxmlformats.org/officeDocument/2006/relationships" xmlns:p="http://schemas.openxmlformats.org/presentationml/2006/main">
-  <p:tag name="KSO_WM_UNIT_HIGHLIGHT" val="0"/>
-  <p:tag name="KSO_WM_UNIT_COMPATIBLE" val="0"/>
-  <p:tag name="KSO_WM_UNIT_DIAGRAM_ISNUMVISUAL" val="0"/>
-  <p:tag name="KSO_WM_UNIT_DIAGRAM_ISREFERUNIT" val="0"/>
-  <p:tag name="KSO_WM_UNIT_ID" val="_8**"/>
-  <p:tag name="KSO_WM_UNIT_LAYERLEVEL" val="1"/>
-  <p:tag name="KSO_WM_TAG_VERSION" val="1.0"/>
-  <p:tag name="KSO_WM_BEAUTIFY_FLAG" val="#wm#"/>
-</p:tagLst>
-</file>
-
-<file path=ppt/tags/tag32.xml><?xml version="1.0" encoding="utf-8"?>
-<p:tagLst xmlns:a="http://schemas.openxmlformats.org/drawingml/2006/main" xmlns:r="http://schemas.openxmlformats.org/officeDocument/2006/relationships" xmlns:p="http://schemas.openxmlformats.org/presentationml/2006/main">
-  <p:tag name="KSO_WM_UNIT_HIGHLIGHT" val="0"/>
-  <p:tag name="KSO_WM_UNIT_COMPATIBLE" val="0"/>
-  <p:tag name="KSO_WM_UNIT_DIAGRAM_ISNUMVISUAL" val="0"/>
-  <p:tag name="KSO_WM_UNIT_DIAGRAM_ISREFERUNIT" val="0"/>
-  <p:tag name="KSO_WM_UNIT_ID" val="_8**"/>
-  <p:tag name="KSO_WM_UNIT_LAYERLEVEL" val="1"/>
-  <p:tag name="KSO_WM_TAG_VERSION" val="1.0"/>
-  <p:tag name="KSO_WM_BEAUTIFY_FLAG" val="#wm#"/>
-</p:tagLst>
-</file>
-
-<file path=ppt/tags/tag33.xml><?xml version="1.0" encoding="utf-8"?>
-<p:tagLst xmlns:a="http://schemas.openxmlformats.org/drawingml/2006/main" xmlns:r="http://schemas.openxmlformats.org/officeDocument/2006/relationships" xmlns:p="http://schemas.openxmlformats.org/presentationml/2006/main">
-  <p:tag name="KSO_WM_UNIT_HIGHLIGHT" val="0"/>
-  <p:tag name="KSO_WM_UNIT_COMPATIBLE" val="0"/>
-  <p:tag name="KSO_WM_UNIT_DIAGRAM_ISNUMVISUAL" val="0"/>
-  <p:tag name="KSO_WM_UNIT_DIAGRAM_ISREFERUNIT" val="0"/>
-  <p:tag name="KSO_WM_UNIT_ID" val="_4**"/>
-  <p:tag name="KSO_WM_UNIT_LAYERLEVEL" val="1"/>
-  <p:tag name="KSO_WM_TAG_VERSION" val="1.0"/>
-  <p:tag name="KSO_WM_BEAUTIFY_FLAG" val="#wm#"/>
-</p:tagLst>
-</file>
-
-<file path=ppt/tags/tag34.xml><?xml version="1.0" encoding="utf-8"?>
-<p:tagLst xmlns:a="http://schemas.openxmlformats.org/drawingml/2006/main" xmlns:r="http://schemas.openxmlformats.org/officeDocument/2006/relationships" xmlns:p="http://schemas.openxmlformats.org/presentationml/2006/main">
-  <p:tag name="KSO_WM_UNIT_HIGHLIGHT" val="0"/>
-  <p:tag name="KSO_WM_UNIT_COMPATIBLE" val="0"/>
-  <p:tag name="KSO_WM_UNIT_DIAGRAM_ISNUMVISUAL" val="0"/>
-  <p:tag name="KSO_WM_UNIT_DIAGRAM_ISREFERUNIT" val="0"/>
-  <p:tag name="KSO_WM_UNIT_ID" val="_4**"/>
-  <p:tag name="KSO_WM_UNIT_LAYERLEVEL" val="1"/>
-  <p:tag name="KSO_WM_TAG_VERSION" val="1.0"/>
-  <p:tag name="KSO_WM_BEAUTIFY_FLAG" val="#wm#"/>
-</p:tagLst>
-</file>
-
-<file path=ppt/tags/tag35.xml><?xml version="1.0" encoding="utf-8"?>
-<p:tagLst xmlns:a="http://schemas.openxmlformats.org/drawingml/2006/main" xmlns:r="http://schemas.openxmlformats.org/officeDocument/2006/relationships" xmlns:p="http://schemas.openxmlformats.org/presentationml/2006/main">
-  <p:tag name="KSO_WM_UNIT_HIGHLIGHT" val="0"/>
-  <p:tag name="KSO_WM_UNIT_COMPATIBLE" val="0"/>
-  <p:tag name="KSO_WM_UNIT_DIAGRAM_ISNUMVISUAL" val="0"/>
-  <p:tag name="KSO_WM_UNIT_DIAGRAM_ISREFERUNIT" val="0"/>
-  <p:tag name="KSO_WM_UNIT_ID" val="_4**"/>
-  <p:tag name="KSO_WM_UNIT_LAYERLEVEL" val="1"/>
-  <p:tag name="KSO_WM_TAG_VERSION" val="1.0"/>
-  <p:tag name="KSO_WM_BEAUTIFY_FLAG" val="#wm#"/>
-</p:tagLst>
-</file>
-
-<file path=ppt/tags/tag36.xml><?xml version="1.0" encoding="utf-8"?>
-<p:tagLst xmlns:a="http://schemas.openxmlformats.org/drawingml/2006/main" xmlns:r="http://schemas.openxmlformats.org/officeDocument/2006/relationships" xmlns:p="http://schemas.openxmlformats.org/presentationml/2006/main">
-  <p:tag name="KSO_WM_UNIT_HIGHLIGHT" val="0"/>
-  <p:tag name="KSO_WM_UNIT_COMPATIBLE" val="0"/>
-  <p:tag name="KSO_WM_UNIT_DIAGRAM_ISNUMVISUAL" val="0"/>
-  <p:tag name="KSO_WM_UNIT_DIAGRAM_ISREFERUNIT" val="0"/>
-  <p:tag name="KSO_WM_UNIT_ID" val="_4**"/>
-  <p:tag name="KSO_WM_UNIT_LAYERLEVEL" val="1"/>
-  <p:tag name="KSO_WM_TAG_VERSION" val="1.0"/>
-  <p:tag name="KSO_WM_BEAUTIFY_FLAG" val="#wm#"/>
-</p:tagLst>
-</file>
-
-<file path=ppt/tags/tag37.xml><?xml version="1.0" encoding="utf-8"?>
-<p:tagLst xmlns:a="http://schemas.openxmlformats.org/drawingml/2006/main" xmlns:r="http://schemas.openxmlformats.org/officeDocument/2006/relationships" xmlns:p="http://schemas.openxmlformats.org/presentationml/2006/main">
-  <p:tag name="KSO_WM_UNIT_HIGHLIGHT" val="0"/>
-  <p:tag name="KSO_WM_UNIT_COMPATIBLE" val="0"/>
-  <p:tag name="KSO_WM_UNIT_DIAGRAM_ISNUMVISUAL" val="0"/>
-  <p:tag name="KSO_WM_UNIT_DIAGRAM_ISREFERUNIT" val="0"/>
-  <p:tag name="KSO_WM_UNIT_ID" val="_4**"/>
-  <p:tag name="KSO_WM_UNIT_LAYERLEVEL" val="1"/>
-  <p:tag name="KSO_WM_TAG_VERSION" val="1.0"/>
-  <p:tag name="KSO_WM_BEAUTIFY_FLAG" val="#wm#"/>
-</p:tagLst>
-</file>
-
-<file path=ppt/tags/tag38.xml><?xml version="1.0" encoding="utf-8"?>
-<p:tagLst xmlns:a="http://schemas.openxmlformats.org/drawingml/2006/main" xmlns:r="http://schemas.openxmlformats.org/officeDocument/2006/relationships" xmlns:p="http://schemas.openxmlformats.org/presentationml/2006/main">
-  <p:tag name="KSO_WM_UNIT_HIGHLIGHT" val="0"/>
-  <p:tag name="KSO_WM_UNIT_COMPATIBLE" val="0"/>
-  <p:tag name="KSO_WM_UNIT_DIAGRAM_ISNUMVISUAL" val="0"/>
-  <p:tag name="KSO_WM_UNIT_DIAGRAM_ISREFERUNIT" val="0"/>
-  <p:tag name="KSO_WM_UNIT_ID" val="_4**"/>
-  <p:tag name="KSO_WM_UNIT_LAYERLEVEL" val="1"/>
-  <p:tag name="KSO_WM_TAG_VERSION" val="1.0"/>
-  <p:tag name="KSO_WM_BEAUTIFY_FLAG" val="#wm#"/>
-</p:tagLst>
-</file>
-
-<file path=ppt/tags/tag39.xml><?xml version="1.0" encoding="utf-8"?>
-<p:tagLst xmlns:a="http://schemas.openxmlformats.org/drawingml/2006/main" xmlns:r="http://schemas.openxmlformats.org/officeDocument/2006/relationships" xmlns:p="http://schemas.openxmlformats.org/presentationml/2006/main">
+<file path=ppt/tags/tag6.xml><?xml version="1.0" encoding="utf-8"?>
+<p:tagLst xmlns:p="http://schemas.openxmlformats.org/presentationml/2006/main">
   <p:tag name="KSO_WM_UNIT_HIGHLIGHT" val="0"/>
   <p:tag name="KSO_WM_UNIT_COMPATIBLE" val="0"/>
   <p:tag name="KSO_WM_UNIT_DIAGRAM_ISNUMVISUAL" val="0"/>
@@ -10818,8 +11362,99 @@
 </p:tagLst>
 </file>
 
-<file path=ppt/tags/tag4.xml><?xml version="1.0" encoding="utf-8"?>
-<p:tagLst xmlns:a="http://schemas.openxmlformats.org/drawingml/2006/main" xmlns:r="http://schemas.openxmlformats.org/officeDocument/2006/relationships" xmlns:p="http://schemas.openxmlformats.org/presentationml/2006/main">
+<file path=ppt/tags/tag60.xml><?xml version="1.0" encoding="utf-8"?>
+<p:tagLst xmlns:p="http://schemas.openxmlformats.org/presentationml/2006/main">
+  <p:tag name="KSO_WM_UNIT_HIGHLIGHT" val="0"/>
+  <p:tag name="KSO_WM_UNIT_COMPATIBLE" val="0"/>
+  <p:tag name="KSO_WM_UNIT_DIAGRAM_ISNUMVISUAL" val="0"/>
+  <p:tag name="KSO_WM_UNIT_DIAGRAM_ISREFERUNIT" val="0"/>
+  <p:tag name="KSO_WM_UNIT_ID" val="_9**"/>
+  <p:tag name="KSO_WM_UNIT_LAYERLEVEL" val="1"/>
+  <p:tag name="KSO_WM_TAG_VERSION" val="1.0"/>
+  <p:tag name="KSO_WM_BEAUTIFY_FLAG" val="#wm#"/>
+</p:tagLst>
+</file>
+
+<file path=ppt/tags/tag61.xml><?xml version="1.0" encoding="utf-8"?>
+<p:tagLst xmlns:p="http://schemas.openxmlformats.org/presentationml/2006/main">
+  <p:tag name="KSO_WM_UNIT_HIGHLIGHT" val="0"/>
+  <p:tag name="KSO_WM_UNIT_COMPATIBLE" val="0"/>
+  <p:tag name="KSO_WM_UNIT_DIAGRAM_ISNUMVISUAL" val="0"/>
+  <p:tag name="KSO_WM_UNIT_DIAGRAM_ISREFERUNIT" val="0"/>
+  <p:tag name="KSO_WM_UNIT_ID" val="_9**"/>
+  <p:tag name="KSO_WM_UNIT_LAYERLEVEL" val="1"/>
+  <p:tag name="KSO_WM_TAG_VERSION" val="1.0"/>
+  <p:tag name="KSO_WM_BEAUTIFY_FLAG" val="#wm#"/>
+</p:tagLst>
+</file>
+
+<file path=ppt/tags/tag62.xml><?xml version="1.0" encoding="utf-8"?>
+<p:tagLst xmlns:p="http://schemas.openxmlformats.org/presentationml/2006/main">
+  <p:tag name="KSO_WM_UNIT_HIGHLIGHT" val="0"/>
+  <p:tag name="KSO_WM_UNIT_COMPATIBLE" val="0"/>
+  <p:tag name="KSO_WM_UNIT_DIAGRAM_ISNUMVISUAL" val="0"/>
+  <p:tag name="KSO_WM_UNIT_DIAGRAM_ISREFERUNIT" val="0"/>
+  <p:tag name="KSO_WM_UNIT_ID" val="_9**"/>
+  <p:tag name="KSO_WM_UNIT_LAYERLEVEL" val="1"/>
+  <p:tag name="KSO_WM_TAG_VERSION" val="1.0"/>
+  <p:tag name="KSO_WM_BEAUTIFY_FLAG" val="#wm#"/>
+</p:tagLst>
+</file>
+
+<file path=ppt/tags/tag63.xml><?xml version="1.0" encoding="utf-8"?>
+<p:tagLst xmlns:p="http://schemas.openxmlformats.org/presentationml/2006/main">
+  <p:tag name="KSO_WM_UNIT_HIGHLIGHT" val="0"/>
+  <p:tag name="KSO_WM_UNIT_COMPATIBLE" val="0"/>
+  <p:tag name="KSO_WM_UNIT_DIAGRAM_ISNUMVISUAL" val="0"/>
+  <p:tag name="KSO_WM_UNIT_DIAGRAM_ISREFERUNIT" val="0"/>
+  <p:tag name="KSO_WM_UNIT_ID" val="_10**"/>
+  <p:tag name="KSO_WM_UNIT_LAYERLEVEL" val="1"/>
+  <p:tag name="KSO_WM_TAG_VERSION" val="1.0"/>
+  <p:tag name="KSO_WM_BEAUTIFY_FLAG" val="#wm#"/>
+</p:tagLst>
+</file>
+
+<file path=ppt/tags/tag64.xml><?xml version="1.0" encoding="utf-8"?>
+<p:tagLst xmlns:p="http://schemas.openxmlformats.org/presentationml/2006/main">
+  <p:tag name="KSO_WM_UNIT_HIGHLIGHT" val="0"/>
+  <p:tag name="KSO_WM_UNIT_COMPATIBLE" val="0"/>
+  <p:tag name="KSO_WM_UNIT_DIAGRAM_ISNUMVISUAL" val="0"/>
+  <p:tag name="KSO_WM_UNIT_DIAGRAM_ISREFERUNIT" val="0"/>
+  <p:tag name="KSO_WM_UNIT_ID" val="_10**"/>
+  <p:tag name="KSO_WM_UNIT_LAYERLEVEL" val="1"/>
+  <p:tag name="KSO_WM_TAG_VERSION" val="1.0"/>
+  <p:tag name="KSO_WM_BEAUTIFY_FLAG" val="#wm#"/>
+</p:tagLst>
+</file>
+
+<file path=ppt/tags/tag65.xml><?xml version="1.0" encoding="utf-8"?>
+<p:tagLst xmlns:p="http://schemas.openxmlformats.org/presentationml/2006/main">
+  <p:tag name="KSO_WM_UNIT_HIGHLIGHT" val="0"/>
+  <p:tag name="KSO_WM_UNIT_COMPATIBLE" val="0"/>
+  <p:tag name="KSO_WM_UNIT_DIAGRAM_ISNUMVISUAL" val="0"/>
+  <p:tag name="KSO_WM_UNIT_DIAGRAM_ISREFERUNIT" val="0"/>
+  <p:tag name="KSO_WM_UNIT_ID" val="_10**"/>
+  <p:tag name="KSO_WM_UNIT_LAYERLEVEL" val="1"/>
+  <p:tag name="KSO_WM_TAG_VERSION" val="1.0"/>
+  <p:tag name="KSO_WM_BEAUTIFY_FLAG" val="#wm#"/>
+</p:tagLst>
+</file>
+
+<file path=ppt/tags/tag66.xml><?xml version="1.0" encoding="utf-8"?>
+<p:tagLst xmlns:p="http://schemas.openxmlformats.org/presentationml/2006/main">
+  <p:tag name="KSO_WM_UNIT_HIGHLIGHT" val="0"/>
+  <p:tag name="KSO_WM_UNIT_COMPATIBLE" val="0"/>
+  <p:tag name="KSO_WM_UNIT_DIAGRAM_ISNUMVISUAL" val="0"/>
+  <p:tag name="KSO_WM_UNIT_DIAGRAM_ISREFERUNIT" val="0"/>
+  <p:tag name="KSO_WM_UNIT_ID" val="_10**"/>
+  <p:tag name="KSO_WM_UNIT_LAYERLEVEL" val="1"/>
+  <p:tag name="KSO_WM_TAG_VERSION" val="1.0"/>
+  <p:tag name="KSO_WM_BEAUTIFY_FLAG" val="#wm#"/>
+</p:tagLst>
+</file>
+
+<file path=ppt/tags/tag67.xml><?xml version="1.0" encoding="utf-8"?>
+<p:tagLst xmlns:p="http://schemas.openxmlformats.org/presentationml/2006/main">
   <p:tag name="KSO_WM_UNIT_HIGHLIGHT" val="0"/>
   <p:tag name="KSO_WM_UNIT_COMPATIBLE" val="0"/>
   <p:tag name="KSO_WM_UNIT_DIAGRAM_ISNUMVISUAL" val="0"/>
@@ -10831,437 +11466,19 @@
 </p:tagLst>
 </file>
 
-<file path=ppt/tags/tag40.xml><?xml version="1.0" encoding="utf-8"?>
-<p:tagLst xmlns:a="http://schemas.openxmlformats.org/drawingml/2006/main" xmlns:r="http://schemas.openxmlformats.org/officeDocument/2006/relationships" xmlns:p="http://schemas.openxmlformats.org/presentationml/2006/main">
-  <p:tag name="KSO_WM_UNIT_HIGHLIGHT" val="0"/>
-  <p:tag name="KSO_WM_UNIT_COMPATIBLE" val="0"/>
-  <p:tag name="KSO_WM_UNIT_DIAGRAM_ISNUMVISUAL" val="0"/>
-  <p:tag name="KSO_WM_UNIT_DIAGRAM_ISREFERUNIT" val="0"/>
-  <p:tag name="KSO_WM_UNIT_ID" val="_5**"/>
-  <p:tag name="KSO_WM_UNIT_LAYERLEVEL" val="1"/>
+<file path=ppt/tags/tag68.xml><?xml version="1.0" encoding="utf-8"?>
+<p:tagLst xmlns:p="http://schemas.openxmlformats.org/presentationml/2006/main">
+  <p:tag name="KSO_WM_TEMPLATE_THUMBS_INDEX" val="1、2、3、6、8、10、11、12、15"/>
+  <p:tag name="KSO_WM_TEMPLATE_SUBCATEGORY" val="0"/>
   <p:tag name="KSO_WM_TAG_VERSION" val="1.0"/>
   <p:tag name="KSO_WM_BEAUTIFY_FLAG" val="#wm#"/>
+  <p:tag name="KSO_WM_TEMPLATE_CATEGORY" val="custom"/>
+  <p:tag name="KSO_WM_TEMPLATE_INDEX" val="20187308"/>
 </p:tagLst>
 </file>
 
-<file path=ppt/tags/tag41.xml><?xml version="1.0" encoding="utf-8"?>
-<p:tagLst xmlns:a="http://schemas.openxmlformats.org/drawingml/2006/main" xmlns:r="http://schemas.openxmlformats.org/officeDocument/2006/relationships" xmlns:p="http://schemas.openxmlformats.org/presentationml/2006/main">
-  <p:tag name="KSO_WM_UNIT_HIGHLIGHT" val="0"/>
-  <p:tag name="KSO_WM_UNIT_COMPATIBLE" val="0"/>
-  <p:tag name="KSO_WM_UNIT_DIAGRAM_ISNUMVISUAL" val="0"/>
-  <p:tag name="KSO_WM_UNIT_DIAGRAM_ISREFERUNIT" val="0"/>
-  <p:tag name="KSO_WM_UNIT_ID" val="_5**"/>
-  <p:tag name="KSO_WM_UNIT_LAYERLEVEL" val="1"/>
-  <p:tag name="KSO_WM_TAG_VERSION" val="1.0"/>
-  <p:tag name="KSO_WM_BEAUTIFY_FLAG" val="#wm#"/>
-</p:tagLst>
-</file>
-
-<file path=ppt/tags/tag42.xml><?xml version="1.0" encoding="utf-8"?>
-<p:tagLst xmlns:a="http://schemas.openxmlformats.org/drawingml/2006/main" xmlns:r="http://schemas.openxmlformats.org/officeDocument/2006/relationships" xmlns:p="http://schemas.openxmlformats.org/presentationml/2006/main">
-  <p:tag name="KSO_WM_UNIT_HIGHLIGHT" val="0"/>
-  <p:tag name="KSO_WM_UNIT_COMPATIBLE" val="0"/>
-  <p:tag name="KSO_WM_UNIT_DIAGRAM_ISNUMVISUAL" val="0"/>
-  <p:tag name="KSO_WM_UNIT_DIAGRAM_ISREFERUNIT" val="0"/>
-  <p:tag name="KSO_WM_UNIT_ID" val="_5**"/>
-  <p:tag name="KSO_WM_UNIT_LAYERLEVEL" val="1"/>
-  <p:tag name="KSO_WM_TAG_VERSION" val="1.0"/>
-  <p:tag name="KSO_WM_BEAUTIFY_FLAG" val="#wm#"/>
-</p:tagLst>
-</file>
-
-<file path=ppt/tags/tag43.xml><?xml version="1.0" encoding="utf-8"?>
-<p:tagLst xmlns:a="http://schemas.openxmlformats.org/drawingml/2006/main" xmlns:r="http://schemas.openxmlformats.org/officeDocument/2006/relationships" xmlns:p="http://schemas.openxmlformats.org/presentationml/2006/main">
-  <p:tag name="KSO_WM_UNIT_HIGHLIGHT" val="0"/>
-  <p:tag name="KSO_WM_UNIT_COMPATIBLE" val="0"/>
-  <p:tag name="KSO_WM_UNIT_DIAGRAM_ISNUMVISUAL" val="0"/>
-  <p:tag name="KSO_WM_UNIT_DIAGRAM_ISREFERUNIT" val="0"/>
-  <p:tag name="KSO_WM_UNIT_ID" val="_5**"/>
-  <p:tag name="KSO_WM_UNIT_LAYERLEVEL" val="1"/>
-  <p:tag name="KSO_WM_TAG_VERSION" val="1.0"/>
-  <p:tag name="KSO_WM_BEAUTIFY_FLAG" val="#wm#"/>
-</p:tagLst>
-</file>
-
-<file path=ppt/tags/tag44.xml><?xml version="1.0" encoding="utf-8"?>
-<p:tagLst xmlns:a="http://schemas.openxmlformats.org/drawingml/2006/main" xmlns:r="http://schemas.openxmlformats.org/officeDocument/2006/relationships" xmlns:p="http://schemas.openxmlformats.org/presentationml/2006/main">
-  <p:tag name="KSO_WM_UNIT_HIGHLIGHT" val="0"/>
-  <p:tag name="KSO_WM_UNIT_COMPATIBLE" val="0"/>
-  <p:tag name="KSO_WM_UNIT_DIAGRAM_ISNUMVISUAL" val="0"/>
-  <p:tag name="KSO_WM_UNIT_DIAGRAM_ISREFERUNIT" val="0"/>
-  <p:tag name="KSO_WM_UNIT_ID" val="_5**"/>
-  <p:tag name="KSO_WM_UNIT_LAYERLEVEL" val="1"/>
-  <p:tag name="KSO_WM_TAG_VERSION" val="1.0"/>
-  <p:tag name="KSO_WM_BEAUTIFY_FLAG" val="#wm#"/>
-</p:tagLst>
-</file>
-
-<file path=ppt/tags/tag45.xml><?xml version="1.0" encoding="utf-8"?>
-<p:tagLst xmlns:a="http://schemas.openxmlformats.org/drawingml/2006/main" xmlns:r="http://schemas.openxmlformats.org/officeDocument/2006/relationships" xmlns:p="http://schemas.openxmlformats.org/presentationml/2006/main">
-  <p:tag name="KSO_WM_UNIT_HIGHLIGHT" val="0"/>
-  <p:tag name="KSO_WM_UNIT_COMPATIBLE" val="0"/>
-  <p:tag name="KSO_WM_UNIT_DIAGRAM_ISNUMVISUAL" val="0"/>
-  <p:tag name="KSO_WM_UNIT_DIAGRAM_ISREFERUNIT" val="0"/>
-  <p:tag name="KSO_WM_UNIT_ID" val="_5**"/>
-  <p:tag name="KSO_WM_UNIT_LAYERLEVEL" val="1"/>
-  <p:tag name="KSO_WM_TAG_VERSION" val="1.0"/>
-  <p:tag name="KSO_WM_BEAUTIFY_FLAG" val="#wm#"/>
-</p:tagLst>
-</file>
-
-<file path=ppt/tags/tag46.xml><?xml version="1.0" encoding="utf-8"?>
-<p:tagLst xmlns:a="http://schemas.openxmlformats.org/drawingml/2006/main" xmlns:r="http://schemas.openxmlformats.org/officeDocument/2006/relationships" xmlns:p="http://schemas.openxmlformats.org/presentationml/2006/main">
-  <p:tag name="KSO_WM_UNIT_HIGHLIGHT" val="0"/>
-  <p:tag name="KSO_WM_UNIT_COMPATIBLE" val="0"/>
-  <p:tag name="KSO_WM_UNIT_DIAGRAM_ISNUMVISUAL" val="0"/>
-  <p:tag name="KSO_WM_UNIT_DIAGRAM_ISREFERUNIT" val="0"/>
-  <p:tag name="KSO_WM_UNIT_ID" val="_5**"/>
-  <p:tag name="KSO_WM_UNIT_LAYERLEVEL" val="1"/>
-  <p:tag name="KSO_WM_TAG_VERSION" val="1.0"/>
-  <p:tag name="KSO_WM_BEAUTIFY_FLAG" val="#wm#"/>
-</p:tagLst>
-</file>
-
-<file path=ppt/tags/tag47.xml><?xml version="1.0" encoding="utf-8"?>
-<p:tagLst xmlns:a="http://schemas.openxmlformats.org/drawingml/2006/main" xmlns:r="http://schemas.openxmlformats.org/officeDocument/2006/relationships" xmlns:p="http://schemas.openxmlformats.org/presentationml/2006/main">
-  <p:tag name="KSO_WM_UNIT_HIGHLIGHT" val="0"/>
-  <p:tag name="KSO_WM_UNIT_COMPATIBLE" val="0"/>
-  <p:tag name="KSO_WM_UNIT_DIAGRAM_ISNUMVISUAL" val="0"/>
-  <p:tag name="KSO_WM_UNIT_DIAGRAM_ISREFERUNIT" val="0"/>
-  <p:tag name="KSO_WM_UNIT_ID" val="_6**"/>
-  <p:tag name="KSO_WM_UNIT_LAYERLEVEL" val="1"/>
-  <p:tag name="KSO_WM_TAG_VERSION" val="1.0"/>
-  <p:tag name="KSO_WM_BEAUTIFY_FLAG" val="#wm#"/>
-</p:tagLst>
-</file>
-
-<file path=ppt/tags/tag48.xml><?xml version="1.0" encoding="utf-8"?>
-<p:tagLst xmlns:a="http://schemas.openxmlformats.org/drawingml/2006/main" xmlns:r="http://schemas.openxmlformats.org/officeDocument/2006/relationships" xmlns:p="http://schemas.openxmlformats.org/presentationml/2006/main">
-  <p:tag name="KSO_WM_UNIT_HIGHLIGHT" val="0"/>
-  <p:tag name="KSO_WM_UNIT_COMPATIBLE" val="0"/>
-  <p:tag name="KSO_WM_UNIT_DIAGRAM_ISNUMVISUAL" val="0"/>
-  <p:tag name="KSO_WM_UNIT_DIAGRAM_ISREFERUNIT" val="0"/>
-  <p:tag name="KSO_WM_UNIT_ID" val="_6**"/>
-  <p:tag name="KSO_WM_UNIT_LAYERLEVEL" val="1"/>
-  <p:tag name="KSO_WM_TAG_VERSION" val="1.0"/>
-  <p:tag name="KSO_WM_BEAUTIFY_FLAG" val="#wm#"/>
-</p:tagLst>
-</file>
-
-<file path=ppt/tags/tag49.xml><?xml version="1.0" encoding="utf-8"?>
-<p:tagLst xmlns:a="http://schemas.openxmlformats.org/drawingml/2006/main" xmlns:r="http://schemas.openxmlformats.org/officeDocument/2006/relationships" xmlns:p="http://schemas.openxmlformats.org/presentationml/2006/main">
-  <p:tag name="KSO_WM_UNIT_HIGHLIGHT" val="0"/>
-  <p:tag name="KSO_WM_UNIT_COMPATIBLE" val="0"/>
-  <p:tag name="KSO_WM_UNIT_DIAGRAM_ISNUMVISUAL" val="0"/>
-  <p:tag name="KSO_WM_UNIT_DIAGRAM_ISREFERUNIT" val="0"/>
-  <p:tag name="KSO_WM_UNIT_ID" val="_6**"/>
-  <p:tag name="KSO_WM_UNIT_LAYERLEVEL" val="1"/>
-  <p:tag name="KSO_WM_TAG_VERSION" val="1.0"/>
-  <p:tag name="KSO_WM_BEAUTIFY_FLAG" val="#wm#"/>
-</p:tagLst>
-</file>
-
-<file path=ppt/tags/tag5.xml><?xml version="1.0" encoding="utf-8"?>
-<p:tagLst xmlns:a="http://schemas.openxmlformats.org/drawingml/2006/main" xmlns:r="http://schemas.openxmlformats.org/officeDocument/2006/relationships" xmlns:p="http://schemas.openxmlformats.org/presentationml/2006/main">
-  <p:tag name="KSO_WM_UNIT_HIGHLIGHT" val="0"/>
-  <p:tag name="KSO_WM_UNIT_COMPATIBLE" val="0"/>
-  <p:tag name="KSO_WM_UNIT_DIAGRAM_ISNUMVISUAL" val="0"/>
-  <p:tag name="KSO_WM_UNIT_DIAGRAM_ISREFERUNIT" val="0"/>
-  <p:tag name="KSO_WM_UNIT_ID" val="_5**"/>
-  <p:tag name="KSO_WM_UNIT_LAYERLEVEL" val="1"/>
-  <p:tag name="KSO_WM_TAG_VERSION" val="1.0"/>
-  <p:tag name="KSO_WM_BEAUTIFY_FLAG" val="#wm#"/>
-</p:tagLst>
-</file>
-
-<file path=ppt/tags/tag50.xml><?xml version="1.0" encoding="utf-8"?>
-<p:tagLst xmlns:a="http://schemas.openxmlformats.org/drawingml/2006/main" xmlns:r="http://schemas.openxmlformats.org/officeDocument/2006/relationships" xmlns:p="http://schemas.openxmlformats.org/presentationml/2006/main">
-  <p:tag name="KSO_WM_UNIT_HIGHLIGHT" val="0"/>
-  <p:tag name="KSO_WM_UNIT_COMPATIBLE" val="0"/>
-  <p:tag name="KSO_WM_UNIT_DIAGRAM_ISNUMVISUAL" val="0"/>
-  <p:tag name="KSO_WM_UNIT_DIAGRAM_ISREFERUNIT" val="0"/>
-  <p:tag name="KSO_WM_UNIT_ID" val="_6**"/>
-  <p:tag name="KSO_WM_UNIT_LAYERLEVEL" val="1"/>
-  <p:tag name="KSO_WM_TAG_VERSION" val="1.0"/>
-  <p:tag name="KSO_WM_BEAUTIFY_FLAG" val="#wm#"/>
-</p:tagLst>
-</file>
-
-<file path=ppt/tags/tag51.xml><?xml version="1.0" encoding="utf-8"?>
-<p:tagLst xmlns:a="http://schemas.openxmlformats.org/drawingml/2006/main" xmlns:r="http://schemas.openxmlformats.org/officeDocument/2006/relationships" xmlns:p="http://schemas.openxmlformats.org/presentationml/2006/main">
-  <p:tag name="KSO_WM_UNIT_HIGHLIGHT" val="0"/>
-  <p:tag name="KSO_WM_UNIT_COMPATIBLE" val="0"/>
-  <p:tag name="KSO_WM_UNIT_DIAGRAM_ISNUMVISUAL" val="0"/>
-  <p:tag name="KSO_WM_UNIT_DIAGRAM_ISREFERUNIT" val="0"/>
-  <p:tag name="KSO_WM_UNIT_ID" val="_7**"/>
-  <p:tag name="KSO_WM_UNIT_LAYERLEVEL" val="1"/>
-  <p:tag name="KSO_WM_TAG_VERSION" val="1.0"/>
-  <p:tag name="KSO_WM_BEAUTIFY_FLAG" val="#wm#"/>
-</p:tagLst>
-</file>
-
-<file path=ppt/tags/tag52.xml><?xml version="1.0" encoding="utf-8"?>
-<p:tagLst xmlns:a="http://schemas.openxmlformats.org/drawingml/2006/main" xmlns:r="http://schemas.openxmlformats.org/officeDocument/2006/relationships" xmlns:p="http://schemas.openxmlformats.org/presentationml/2006/main">
-  <p:tag name="KSO_WM_UNIT_HIGHLIGHT" val="0"/>
-  <p:tag name="KSO_WM_UNIT_COMPATIBLE" val="0"/>
-  <p:tag name="KSO_WM_UNIT_DIAGRAM_ISNUMVISUAL" val="0"/>
-  <p:tag name="KSO_WM_UNIT_DIAGRAM_ISREFERUNIT" val="0"/>
-  <p:tag name="KSO_WM_UNIT_ID" val="_7**"/>
-  <p:tag name="KSO_WM_UNIT_LAYERLEVEL" val="1"/>
-  <p:tag name="KSO_WM_TAG_VERSION" val="1.0"/>
-  <p:tag name="KSO_WM_BEAUTIFY_FLAG" val="#wm#"/>
-</p:tagLst>
-</file>
-
-<file path=ppt/tags/tag53.xml><?xml version="1.0" encoding="utf-8"?>
-<p:tagLst xmlns:a="http://schemas.openxmlformats.org/drawingml/2006/main" xmlns:r="http://schemas.openxmlformats.org/officeDocument/2006/relationships" xmlns:p="http://schemas.openxmlformats.org/presentationml/2006/main">
-  <p:tag name="KSO_WM_UNIT_HIGHLIGHT" val="0"/>
-  <p:tag name="KSO_WM_UNIT_COMPATIBLE" val="0"/>
-  <p:tag name="KSO_WM_UNIT_DIAGRAM_ISNUMVISUAL" val="0"/>
-  <p:tag name="KSO_WM_UNIT_DIAGRAM_ISREFERUNIT" val="0"/>
-  <p:tag name="KSO_WM_UNIT_ID" val="_7**"/>
-  <p:tag name="KSO_WM_UNIT_LAYERLEVEL" val="1"/>
-  <p:tag name="KSO_WM_TAG_VERSION" val="1.0"/>
-  <p:tag name="KSO_WM_BEAUTIFY_FLAG" val="#wm#"/>
-</p:tagLst>
-</file>
-
-<file path=ppt/tags/tag54.xml><?xml version="1.0" encoding="utf-8"?>
-<p:tagLst xmlns:a="http://schemas.openxmlformats.org/drawingml/2006/main" xmlns:r="http://schemas.openxmlformats.org/officeDocument/2006/relationships" xmlns:p="http://schemas.openxmlformats.org/presentationml/2006/main">
-  <p:tag name="KSO_WM_UNIT_HIGHLIGHT" val="0"/>
-  <p:tag name="KSO_WM_UNIT_COMPATIBLE" val="0"/>
-  <p:tag name="KSO_WM_UNIT_DIAGRAM_ISNUMVISUAL" val="0"/>
-  <p:tag name="KSO_WM_UNIT_DIAGRAM_ISREFERUNIT" val="0"/>
-  <p:tag name="KSO_WM_UNIT_ID" val="_8**"/>
-  <p:tag name="KSO_WM_UNIT_LAYERLEVEL" val="1"/>
-  <p:tag name="KSO_WM_TAG_VERSION" val="1.0"/>
-  <p:tag name="KSO_WM_BEAUTIFY_FLAG" val="#wm#"/>
-</p:tagLst>
-</file>
-
-<file path=ppt/tags/tag55.xml><?xml version="1.0" encoding="utf-8"?>
-<p:tagLst xmlns:a="http://schemas.openxmlformats.org/drawingml/2006/main" xmlns:r="http://schemas.openxmlformats.org/officeDocument/2006/relationships" xmlns:p="http://schemas.openxmlformats.org/presentationml/2006/main">
-  <p:tag name="KSO_WM_UNIT_HIGHLIGHT" val="0"/>
-  <p:tag name="KSO_WM_UNIT_COMPATIBLE" val="0"/>
-  <p:tag name="KSO_WM_UNIT_DIAGRAM_ISNUMVISUAL" val="0"/>
-  <p:tag name="KSO_WM_UNIT_DIAGRAM_ISREFERUNIT" val="0"/>
-  <p:tag name="KSO_WM_UNIT_ID" val="_8**"/>
-  <p:tag name="KSO_WM_UNIT_LAYERLEVEL" val="1"/>
-  <p:tag name="KSO_WM_TAG_VERSION" val="1.0"/>
-  <p:tag name="KSO_WM_BEAUTIFY_FLAG" val="#wm#"/>
-</p:tagLst>
-</file>
-
-<file path=ppt/tags/tag56.xml><?xml version="1.0" encoding="utf-8"?>
-<p:tagLst xmlns:a="http://schemas.openxmlformats.org/drawingml/2006/main" xmlns:r="http://schemas.openxmlformats.org/officeDocument/2006/relationships" xmlns:p="http://schemas.openxmlformats.org/presentationml/2006/main">
-  <p:tag name="KSO_WM_UNIT_HIGHLIGHT" val="0"/>
-  <p:tag name="KSO_WM_UNIT_COMPATIBLE" val="0"/>
-  <p:tag name="KSO_WM_UNIT_DIAGRAM_ISNUMVISUAL" val="0"/>
-  <p:tag name="KSO_WM_UNIT_DIAGRAM_ISREFERUNIT" val="0"/>
-  <p:tag name="KSO_WM_UNIT_ID" val="_8**"/>
-  <p:tag name="KSO_WM_UNIT_LAYERLEVEL" val="1"/>
-  <p:tag name="KSO_WM_TAG_VERSION" val="1.0"/>
-  <p:tag name="KSO_WM_BEAUTIFY_FLAG" val="#wm#"/>
-</p:tagLst>
-</file>
-
-<file path=ppt/tags/tag57.xml><?xml version="1.0" encoding="utf-8"?>
-<p:tagLst xmlns:a="http://schemas.openxmlformats.org/drawingml/2006/main" xmlns:r="http://schemas.openxmlformats.org/officeDocument/2006/relationships" xmlns:p="http://schemas.openxmlformats.org/presentationml/2006/main">
-  <p:tag name="KSO_WM_UNIT_HIGHLIGHT" val="0"/>
-  <p:tag name="KSO_WM_UNIT_COMPATIBLE" val="0"/>
-  <p:tag name="KSO_WM_UNIT_DIAGRAM_ISNUMVISUAL" val="0"/>
-  <p:tag name="KSO_WM_UNIT_DIAGRAM_ISREFERUNIT" val="0"/>
-  <p:tag name="KSO_WM_UNIT_ID" val="_8**"/>
-  <p:tag name="KSO_WM_UNIT_LAYERLEVEL" val="1"/>
-  <p:tag name="KSO_WM_TAG_VERSION" val="1.0"/>
-  <p:tag name="KSO_WM_BEAUTIFY_FLAG" val="#wm#"/>
-</p:tagLst>
-</file>
-
-<file path=ppt/tags/tag58.xml><?xml version="1.0" encoding="utf-8"?>
-<p:tagLst xmlns:a="http://schemas.openxmlformats.org/drawingml/2006/main" xmlns:r="http://schemas.openxmlformats.org/officeDocument/2006/relationships" xmlns:p="http://schemas.openxmlformats.org/presentationml/2006/main">
-  <p:tag name="KSO_WM_UNIT_HIGHLIGHT" val="0"/>
-  <p:tag name="KSO_WM_UNIT_COMPATIBLE" val="0"/>
-  <p:tag name="KSO_WM_UNIT_DIAGRAM_ISNUMVISUAL" val="0"/>
-  <p:tag name="KSO_WM_UNIT_DIAGRAM_ISREFERUNIT" val="0"/>
-  <p:tag name="KSO_WM_UNIT_ID" val="_8**"/>
-  <p:tag name="KSO_WM_UNIT_LAYERLEVEL" val="1"/>
-  <p:tag name="KSO_WM_TAG_VERSION" val="1.0"/>
-  <p:tag name="KSO_WM_BEAUTIFY_FLAG" val="#wm#"/>
-</p:tagLst>
-</file>
-
-<file path=ppt/tags/tag59.xml><?xml version="1.0" encoding="utf-8"?>
-<p:tagLst xmlns:a="http://schemas.openxmlformats.org/drawingml/2006/main" xmlns:r="http://schemas.openxmlformats.org/officeDocument/2006/relationships" xmlns:p="http://schemas.openxmlformats.org/presentationml/2006/main">
-  <p:tag name="KSO_WM_UNIT_HIGHLIGHT" val="0"/>
-  <p:tag name="KSO_WM_UNIT_COMPATIBLE" val="0"/>
-  <p:tag name="KSO_WM_UNIT_DIAGRAM_ISNUMVISUAL" val="0"/>
-  <p:tag name="KSO_WM_UNIT_DIAGRAM_ISREFERUNIT" val="0"/>
-  <p:tag name="KSO_WM_UNIT_ID" val="_8**"/>
-  <p:tag name="KSO_WM_UNIT_LAYERLEVEL" val="1"/>
-  <p:tag name="KSO_WM_TAG_VERSION" val="1.0"/>
-  <p:tag name="KSO_WM_BEAUTIFY_FLAG" val="#wm#"/>
-</p:tagLst>
-</file>
-
-<file path=ppt/tags/tag6.xml><?xml version="1.0" encoding="utf-8"?>
-<p:tagLst xmlns:a="http://schemas.openxmlformats.org/drawingml/2006/main" xmlns:r="http://schemas.openxmlformats.org/officeDocument/2006/relationships" xmlns:p="http://schemas.openxmlformats.org/presentationml/2006/main">
-  <p:tag name="KSO_WM_UNIT_HIGHLIGHT" val="0"/>
-  <p:tag name="KSO_WM_UNIT_COMPATIBLE" val="0"/>
-  <p:tag name="KSO_WM_UNIT_DIAGRAM_ISNUMVISUAL" val="0"/>
-  <p:tag name="KSO_WM_UNIT_DIAGRAM_ISREFERUNIT" val="0"/>
-  <p:tag name="KSO_WM_UNIT_ID" val="_5**"/>
-  <p:tag name="KSO_WM_UNIT_LAYERLEVEL" val="1"/>
-  <p:tag name="KSO_WM_TAG_VERSION" val="1.0"/>
-  <p:tag name="KSO_WM_BEAUTIFY_FLAG" val="#wm#"/>
-</p:tagLst>
-</file>
-
-<file path=ppt/tags/tag60.xml><?xml version="1.0" encoding="utf-8"?>
-<p:tagLst xmlns:a="http://schemas.openxmlformats.org/drawingml/2006/main" xmlns:r="http://schemas.openxmlformats.org/officeDocument/2006/relationships" xmlns:p="http://schemas.openxmlformats.org/presentationml/2006/main">
-  <p:tag name="KSO_WM_UNIT_HIGHLIGHT" val="0"/>
-  <p:tag name="KSO_WM_UNIT_COMPATIBLE" val="0"/>
-  <p:tag name="KSO_WM_UNIT_DIAGRAM_ISNUMVISUAL" val="0"/>
-  <p:tag name="KSO_WM_UNIT_DIAGRAM_ISREFERUNIT" val="0"/>
-  <p:tag name="KSO_WM_UNIT_ID" val="_9**"/>
-  <p:tag name="KSO_WM_UNIT_LAYERLEVEL" val="1"/>
-  <p:tag name="KSO_WM_TAG_VERSION" val="1.0"/>
-  <p:tag name="KSO_WM_BEAUTIFY_FLAG" val="#wm#"/>
-</p:tagLst>
-</file>
-
-<file path=ppt/tags/tag61.xml><?xml version="1.0" encoding="utf-8"?>
-<p:tagLst xmlns:a="http://schemas.openxmlformats.org/drawingml/2006/main" xmlns:r="http://schemas.openxmlformats.org/officeDocument/2006/relationships" xmlns:p="http://schemas.openxmlformats.org/presentationml/2006/main">
-  <p:tag name="KSO_WM_UNIT_HIGHLIGHT" val="0"/>
-  <p:tag name="KSO_WM_UNIT_COMPATIBLE" val="0"/>
-  <p:tag name="KSO_WM_UNIT_DIAGRAM_ISNUMVISUAL" val="0"/>
-  <p:tag name="KSO_WM_UNIT_DIAGRAM_ISREFERUNIT" val="0"/>
-  <p:tag name="KSO_WM_UNIT_ID" val="_9**"/>
-  <p:tag name="KSO_WM_UNIT_LAYERLEVEL" val="1"/>
-  <p:tag name="KSO_WM_TAG_VERSION" val="1.0"/>
-  <p:tag name="KSO_WM_BEAUTIFY_FLAG" val="#wm#"/>
-</p:tagLst>
-</file>
-
-<file path=ppt/tags/tag62.xml><?xml version="1.0" encoding="utf-8"?>
-<p:tagLst xmlns:a="http://schemas.openxmlformats.org/drawingml/2006/main" xmlns:r="http://schemas.openxmlformats.org/officeDocument/2006/relationships" xmlns:p="http://schemas.openxmlformats.org/presentationml/2006/main">
-  <p:tag name="KSO_WM_UNIT_HIGHLIGHT" val="0"/>
-  <p:tag name="KSO_WM_UNIT_COMPATIBLE" val="0"/>
-  <p:tag name="KSO_WM_UNIT_DIAGRAM_ISNUMVISUAL" val="0"/>
-  <p:tag name="KSO_WM_UNIT_DIAGRAM_ISREFERUNIT" val="0"/>
-  <p:tag name="KSO_WM_UNIT_ID" val="_9**"/>
-  <p:tag name="KSO_WM_UNIT_LAYERLEVEL" val="1"/>
-  <p:tag name="KSO_WM_TAG_VERSION" val="1.0"/>
-  <p:tag name="KSO_WM_BEAUTIFY_FLAG" val="#wm#"/>
-</p:tagLst>
-</file>
-
-<file path=ppt/tags/tag63.xml><?xml version="1.0" encoding="utf-8"?>
-<p:tagLst xmlns:a="http://schemas.openxmlformats.org/drawingml/2006/main" xmlns:r="http://schemas.openxmlformats.org/officeDocument/2006/relationships" xmlns:p="http://schemas.openxmlformats.org/presentationml/2006/main">
-  <p:tag name="KSO_WM_UNIT_HIGHLIGHT" val="0"/>
-  <p:tag name="KSO_WM_UNIT_COMPATIBLE" val="0"/>
-  <p:tag name="KSO_WM_UNIT_DIAGRAM_ISNUMVISUAL" val="0"/>
-  <p:tag name="KSO_WM_UNIT_DIAGRAM_ISREFERUNIT" val="0"/>
-  <p:tag name="KSO_WM_UNIT_ID" val="_9**"/>
-  <p:tag name="KSO_WM_UNIT_LAYERLEVEL" val="1"/>
-  <p:tag name="KSO_WM_TAG_VERSION" val="1.0"/>
-  <p:tag name="KSO_WM_BEAUTIFY_FLAG" val="#wm#"/>
-</p:tagLst>
-</file>
-
-<file path=ppt/tags/tag64.xml><?xml version="1.0" encoding="utf-8"?>
-<p:tagLst xmlns:a="http://schemas.openxmlformats.org/drawingml/2006/main" xmlns:r="http://schemas.openxmlformats.org/officeDocument/2006/relationships" xmlns:p="http://schemas.openxmlformats.org/presentationml/2006/main">
-  <p:tag name="KSO_WM_UNIT_HIGHLIGHT" val="0"/>
-  <p:tag name="KSO_WM_UNIT_COMPATIBLE" val="0"/>
-  <p:tag name="KSO_WM_UNIT_DIAGRAM_ISNUMVISUAL" val="0"/>
-  <p:tag name="KSO_WM_UNIT_DIAGRAM_ISREFERUNIT" val="0"/>
-  <p:tag name="KSO_WM_UNIT_ID" val="_9**"/>
-  <p:tag name="KSO_WM_UNIT_LAYERLEVEL" val="1"/>
-  <p:tag name="KSO_WM_TAG_VERSION" val="1.0"/>
-  <p:tag name="KSO_WM_BEAUTIFY_FLAG" val="#wm#"/>
-</p:tagLst>
-</file>
-
-<file path=ppt/tags/tag65.xml><?xml version="1.0" encoding="utf-8"?>
-<p:tagLst xmlns:a="http://schemas.openxmlformats.org/drawingml/2006/main" xmlns:r="http://schemas.openxmlformats.org/officeDocument/2006/relationships" xmlns:p="http://schemas.openxmlformats.org/presentationml/2006/main">
-  <p:tag name="KSO_WM_UNIT_HIGHLIGHT" val="0"/>
-  <p:tag name="KSO_WM_UNIT_COMPATIBLE" val="0"/>
-  <p:tag name="KSO_WM_UNIT_DIAGRAM_ISNUMVISUAL" val="0"/>
-  <p:tag name="KSO_WM_UNIT_DIAGRAM_ISREFERUNIT" val="0"/>
-  <p:tag name="KSO_WM_UNIT_ID" val="_10**"/>
-  <p:tag name="KSO_WM_UNIT_LAYERLEVEL" val="1"/>
-  <p:tag name="KSO_WM_TAG_VERSION" val="1.0"/>
-  <p:tag name="KSO_WM_BEAUTIFY_FLAG" val="#wm#"/>
-</p:tagLst>
-</file>
-
-<file path=ppt/tags/tag66.xml><?xml version="1.0" encoding="utf-8"?>
-<p:tagLst xmlns:a="http://schemas.openxmlformats.org/drawingml/2006/main" xmlns:r="http://schemas.openxmlformats.org/officeDocument/2006/relationships" xmlns:p="http://schemas.openxmlformats.org/presentationml/2006/main">
-  <p:tag name="KSO_WM_UNIT_HIGHLIGHT" val="0"/>
-  <p:tag name="KSO_WM_UNIT_COMPATIBLE" val="0"/>
-  <p:tag name="KSO_WM_UNIT_DIAGRAM_ISNUMVISUAL" val="0"/>
-  <p:tag name="KSO_WM_UNIT_DIAGRAM_ISREFERUNIT" val="0"/>
-  <p:tag name="KSO_WM_UNIT_ID" val="_10**"/>
-  <p:tag name="KSO_WM_UNIT_LAYERLEVEL" val="1"/>
-  <p:tag name="KSO_WM_TAG_VERSION" val="1.0"/>
-  <p:tag name="KSO_WM_BEAUTIFY_FLAG" val="#wm#"/>
-</p:tagLst>
-</file>
-
-<file path=ppt/tags/tag67.xml><?xml version="1.0" encoding="utf-8"?>
-<p:tagLst xmlns:a="http://schemas.openxmlformats.org/drawingml/2006/main" xmlns:r="http://schemas.openxmlformats.org/officeDocument/2006/relationships" xmlns:p="http://schemas.openxmlformats.org/presentationml/2006/main">
-  <p:tag name="KSO_WM_UNIT_HIGHLIGHT" val="0"/>
-  <p:tag name="KSO_WM_UNIT_COMPATIBLE" val="0"/>
-  <p:tag name="KSO_WM_UNIT_DIAGRAM_ISNUMVISUAL" val="0"/>
-  <p:tag name="KSO_WM_UNIT_DIAGRAM_ISREFERUNIT" val="0"/>
-  <p:tag name="KSO_WM_UNIT_ID" val="_10**"/>
-  <p:tag name="KSO_WM_UNIT_LAYERLEVEL" val="1"/>
-  <p:tag name="KSO_WM_TAG_VERSION" val="1.0"/>
-  <p:tag name="KSO_WM_BEAUTIFY_FLAG" val="#wm#"/>
-</p:tagLst>
-</file>
-
-<file path=ppt/tags/tag68.xml><?xml version="1.0" encoding="utf-8"?>
-<p:tagLst xmlns:a="http://schemas.openxmlformats.org/drawingml/2006/main" xmlns:r="http://schemas.openxmlformats.org/officeDocument/2006/relationships" xmlns:p="http://schemas.openxmlformats.org/presentationml/2006/main">
-  <p:tag name="KSO_WM_UNIT_HIGHLIGHT" val="0"/>
-  <p:tag name="KSO_WM_UNIT_COMPATIBLE" val="0"/>
-  <p:tag name="KSO_WM_UNIT_DIAGRAM_ISNUMVISUAL" val="0"/>
-  <p:tag name="KSO_WM_UNIT_DIAGRAM_ISREFERUNIT" val="0"/>
-  <p:tag name="KSO_WM_UNIT_ID" val="_10**"/>
-  <p:tag name="KSO_WM_UNIT_LAYERLEVEL" val="1"/>
-  <p:tag name="KSO_WM_TAG_VERSION" val="1.0"/>
-  <p:tag name="KSO_WM_BEAUTIFY_FLAG" val="#wm#"/>
-</p:tagLst>
-</file>
-
 <file path=ppt/tags/tag69.xml><?xml version="1.0" encoding="utf-8"?>
-<p:tagLst xmlns:a="http://schemas.openxmlformats.org/drawingml/2006/main" xmlns:r="http://schemas.openxmlformats.org/officeDocument/2006/relationships" xmlns:p="http://schemas.openxmlformats.org/presentationml/2006/main">
-  <p:tag name="KSO_WM_UNIT_HIGHLIGHT" val="0"/>
-  <p:tag name="KSO_WM_UNIT_COMPATIBLE" val="0"/>
-  <p:tag name="KSO_WM_UNIT_DIAGRAM_ISNUMVISUAL" val="0"/>
-  <p:tag name="KSO_WM_UNIT_DIAGRAM_ISREFERUNIT" val="0"/>
-  <p:tag name="KSO_WM_UNIT_ID" val="_6**"/>
-  <p:tag name="KSO_WM_UNIT_LAYERLEVEL" val="1"/>
-  <p:tag name="KSO_WM_TAG_VERSION" val="1.0"/>
-  <p:tag name="KSO_WM_BEAUTIFY_FLAG" val="#wm#"/>
-</p:tagLst>
-</file>
-
-<file path=ppt/tags/tag7.xml><?xml version="1.0" encoding="utf-8"?>
-<p:tagLst xmlns:a="http://schemas.openxmlformats.org/drawingml/2006/main" xmlns:r="http://schemas.openxmlformats.org/officeDocument/2006/relationships" xmlns:p="http://schemas.openxmlformats.org/presentationml/2006/main">
-  <p:tag name="KSO_WM_UNIT_HIGHLIGHT" val="0"/>
-  <p:tag name="KSO_WM_UNIT_COMPATIBLE" val="0"/>
-  <p:tag name="KSO_WM_UNIT_DIAGRAM_ISNUMVISUAL" val="0"/>
-  <p:tag name="KSO_WM_UNIT_DIAGRAM_ISREFERUNIT" val="0"/>
-  <p:tag name="KSO_WM_UNIT_ID" val="_5**"/>
-  <p:tag name="KSO_WM_UNIT_LAYERLEVEL" val="1"/>
-  <p:tag name="KSO_WM_TAG_VERSION" val="1.0"/>
-  <p:tag name="KSO_WM_BEAUTIFY_FLAG" val="#wm#"/>
-</p:tagLst>
-</file>
-
-<file path=ppt/tags/tag70.xml><?xml version="1.0" encoding="utf-8"?>
-<p:tagLst xmlns:a="http://schemas.openxmlformats.org/drawingml/2006/main" xmlns:r="http://schemas.openxmlformats.org/officeDocument/2006/relationships" xmlns:p="http://schemas.openxmlformats.org/presentationml/2006/main">
+<p:tagLst xmlns:p="http://schemas.openxmlformats.org/presentationml/2006/main">
   <p:tag name="KSO_WM_TEMPLATE_THUMBS_INDEX" val="1、2、3、6、8、10、11、12、15"/>
   <p:tag name="KSO_WM_SLIDE_ID" val="custom20187308_1"/>
   <p:tag name="KSO_WM_TEMPLATE_SUBCATEGORY" val="0"/>
@@ -11279,89 +11496,8 @@
 </p:tagLst>
 </file>
 
-<file path=ppt/tags/tag71.xml><?xml version="1.0" encoding="utf-8"?>
-<p:tagLst xmlns:a="http://schemas.openxmlformats.org/drawingml/2006/main" xmlns:r="http://schemas.openxmlformats.org/officeDocument/2006/relationships" xmlns:p="http://schemas.openxmlformats.org/presentationml/2006/main">
-  <p:tag name="KSO_WM_BEAUTIFY_FLAG" val="#wm#"/>
-  <p:tag name="KSO_WM_TEMPLATE_CATEGORY" val="custom"/>
-  <p:tag name="KSO_WM_TEMPLATE_INDEX" val="20187308"/>
-  <p:tag name="KSO_WM_SPECIAL_SOURCE" val="bdnull"/>
-</p:tagLst>
-</file>
-
-<file path=ppt/tags/tag72.xml><?xml version="1.0" encoding="utf-8"?>
-<p:tagLst xmlns:a="http://schemas.openxmlformats.org/drawingml/2006/main" xmlns:r="http://schemas.openxmlformats.org/officeDocument/2006/relationships" xmlns:p="http://schemas.openxmlformats.org/presentationml/2006/main">
-  <p:tag name="KSO_WM_BEAUTIFY_FLAG" val="#wm#"/>
-  <p:tag name="KSO_WM_TEMPLATE_CATEGORY" val="custom"/>
-  <p:tag name="KSO_WM_TEMPLATE_INDEX" val="20187308"/>
-  <p:tag name="KSO_WM_SPECIAL_SOURCE" val="bdnull"/>
-</p:tagLst>
-</file>
-
-<file path=ppt/tags/tag73.xml><?xml version="1.0" encoding="utf-8"?>
-<p:tagLst xmlns:a="http://schemas.openxmlformats.org/drawingml/2006/main" xmlns:r="http://schemas.openxmlformats.org/officeDocument/2006/relationships" xmlns:p="http://schemas.openxmlformats.org/presentationml/2006/main">
-  <p:tag name="KSO_WM_BEAUTIFY_FLAG" val="#wm#"/>
-  <p:tag name="KSO_WM_TEMPLATE_CATEGORY" val="custom"/>
-  <p:tag name="KSO_WM_TEMPLATE_INDEX" val="20187308"/>
-  <p:tag name="KSO_WM_SPECIAL_SOURCE" val="bdnull"/>
-</p:tagLst>
-</file>
-
-<file path=ppt/tags/tag74.xml><?xml version="1.0" encoding="utf-8"?>
-<p:tagLst xmlns:a="http://schemas.openxmlformats.org/drawingml/2006/main" xmlns:r="http://schemas.openxmlformats.org/officeDocument/2006/relationships" xmlns:p="http://schemas.openxmlformats.org/presentationml/2006/main">
-  <p:tag name="KSO_WM_BEAUTIFY_FLAG" val="#wm#"/>
-  <p:tag name="KSO_WM_TEMPLATE_CATEGORY" val="custom"/>
-  <p:tag name="KSO_WM_TEMPLATE_INDEX" val="20187308"/>
-  <p:tag name="KSO_WM_SPECIAL_SOURCE" val="bdnull"/>
-</p:tagLst>
-</file>
-
-<file path=ppt/tags/tag75.xml><?xml version="1.0" encoding="utf-8"?>
-<p:tagLst xmlns:a="http://schemas.openxmlformats.org/drawingml/2006/main" xmlns:r="http://schemas.openxmlformats.org/officeDocument/2006/relationships" xmlns:p="http://schemas.openxmlformats.org/presentationml/2006/main">
-  <p:tag name="KSO_WM_BEAUTIFY_FLAG" val="#wm#"/>
-  <p:tag name="KSO_WM_TEMPLATE_CATEGORY" val="custom"/>
-  <p:tag name="KSO_WM_TEMPLATE_INDEX" val="20187308"/>
-  <p:tag name="KSO_WM_SPECIAL_SOURCE" val="bdnull"/>
-</p:tagLst>
-</file>
-
-<file path=ppt/tags/tag76.xml><?xml version="1.0" encoding="utf-8"?>
-<p:tagLst xmlns:a="http://schemas.openxmlformats.org/drawingml/2006/main" xmlns:r="http://schemas.openxmlformats.org/officeDocument/2006/relationships" xmlns:p="http://schemas.openxmlformats.org/presentationml/2006/main">
-  <p:tag name="KSO_WM_BEAUTIFY_FLAG" val="#wm#"/>
-  <p:tag name="KSO_WM_TEMPLATE_CATEGORY" val="custom"/>
-  <p:tag name="KSO_WM_TEMPLATE_INDEX" val="20187308"/>
-  <p:tag name="KSO_WM_SPECIAL_SOURCE" val="bdnull"/>
-</p:tagLst>
-</file>
-
-<file path=ppt/tags/tag77.xml><?xml version="1.0" encoding="utf-8"?>
-<p:tagLst xmlns:a="http://schemas.openxmlformats.org/drawingml/2006/main" xmlns:r="http://schemas.openxmlformats.org/officeDocument/2006/relationships" xmlns:p="http://schemas.openxmlformats.org/presentationml/2006/main">
-  <p:tag name="KSO_WM_BEAUTIFY_FLAG" val="#wm#"/>
-  <p:tag name="KSO_WM_TEMPLATE_CATEGORY" val="custom"/>
-  <p:tag name="KSO_WM_TEMPLATE_INDEX" val="20187308"/>
-  <p:tag name="KSO_WM_SPECIAL_SOURCE" val="bdnull"/>
-</p:tagLst>
-</file>
-
-<file path=ppt/tags/tag78.xml><?xml version="1.0" encoding="utf-8"?>
-<p:tagLst xmlns:a="http://schemas.openxmlformats.org/drawingml/2006/main" xmlns:r="http://schemas.openxmlformats.org/officeDocument/2006/relationships" xmlns:p="http://schemas.openxmlformats.org/presentationml/2006/main">
-  <p:tag name="KSO_WM_BEAUTIFY_FLAG" val="#wm#"/>
-  <p:tag name="KSO_WM_TEMPLATE_CATEGORY" val="custom"/>
-  <p:tag name="KSO_WM_TEMPLATE_INDEX" val="20187308"/>
-  <p:tag name="KSO_WM_SPECIAL_SOURCE" val="bdnull"/>
-</p:tagLst>
-</file>
-
-<file path=ppt/tags/tag79.xml><?xml version="1.0" encoding="utf-8"?>
-<p:tagLst xmlns:a="http://schemas.openxmlformats.org/drawingml/2006/main" xmlns:r="http://schemas.openxmlformats.org/officeDocument/2006/relationships" xmlns:p="http://schemas.openxmlformats.org/presentationml/2006/main">
-  <p:tag name="KSO_WM_BEAUTIFY_FLAG" val="#wm#"/>
-  <p:tag name="KSO_WM_TEMPLATE_CATEGORY" val="custom"/>
-  <p:tag name="KSO_WM_TEMPLATE_INDEX" val="20187308"/>
-  <p:tag name="KSO_WM_SPECIAL_SOURCE" val="bdnull"/>
-</p:tagLst>
-</file>
-
-<file path=ppt/tags/tag8.xml><?xml version="1.0" encoding="utf-8"?>
-<p:tagLst xmlns:a="http://schemas.openxmlformats.org/drawingml/2006/main" xmlns:r="http://schemas.openxmlformats.org/officeDocument/2006/relationships" xmlns:p="http://schemas.openxmlformats.org/presentationml/2006/main">
+<file path=ppt/tags/tag7.xml><?xml version="1.0" encoding="utf-8"?>
+<p:tagLst xmlns:p="http://schemas.openxmlformats.org/presentationml/2006/main">
   <p:tag name="KSO_WM_UNIT_HIGHLIGHT" val="0"/>
   <p:tag name="KSO_WM_UNIT_COMPATIBLE" val="0"/>
   <p:tag name="KSO_WM_UNIT_DIAGRAM_ISNUMVISUAL" val="0"/>
@@ -11373,8 +11509,8 @@
 </p:tagLst>
 </file>
 
-<file path=ppt/tags/tag80.xml><?xml version="1.0" encoding="utf-8"?>
-<p:tagLst xmlns:a="http://schemas.openxmlformats.org/drawingml/2006/main" xmlns:r="http://schemas.openxmlformats.org/officeDocument/2006/relationships" xmlns:p="http://schemas.openxmlformats.org/presentationml/2006/main">
+<file path=ppt/tags/tag70.xml><?xml version="1.0" encoding="utf-8"?>
+<p:tagLst xmlns:p="http://schemas.openxmlformats.org/presentationml/2006/main">
   <p:tag name="KSO_WM_BEAUTIFY_FLAG" val="#wm#"/>
   <p:tag name="KSO_WM_TEMPLATE_CATEGORY" val="custom"/>
   <p:tag name="KSO_WM_TEMPLATE_INDEX" val="20187308"/>
@@ -11382,14 +11518,8 @@
 </p:tagLst>
 </file>
 
-<file path=ppt/tags/tag81.xml><?xml version="1.0" encoding="utf-8"?>
-<p:tagLst xmlns:a="http://schemas.openxmlformats.org/drawingml/2006/main" xmlns:r="http://schemas.openxmlformats.org/officeDocument/2006/relationships" xmlns:p="http://schemas.openxmlformats.org/presentationml/2006/main">
-  <p:tag name="KSO_WM_SPECIAL_SOURCE" val="bdnull"/>
-</p:tagLst>
-</file>
-
-<file path=ppt/tags/tag82.xml><?xml version="1.0" encoding="utf-8"?>
-<p:tagLst xmlns:a="http://schemas.openxmlformats.org/drawingml/2006/main" xmlns:r="http://schemas.openxmlformats.org/officeDocument/2006/relationships" xmlns:p="http://schemas.openxmlformats.org/presentationml/2006/main">
+<file path=ppt/tags/tag71.xml><?xml version="1.0" encoding="utf-8"?>
+<p:tagLst xmlns:p="http://schemas.openxmlformats.org/presentationml/2006/main">
   <p:tag name="KSO_WM_BEAUTIFY_FLAG" val="#wm#"/>
   <p:tag name="KSO_WM_TEMPLATE_CATEGORY" val="custom"/>
   <p:tag name="KSO_WM_TEMPLATE_INDEX" val="20187308"/>
@@ -11397,8 +11527,8 @@
 </p:tagLst>
 </file>
 
-<file path=ppt/tags/tag83.xml><?xml version="1.0" encoding="utf-8"?>
-<p:tagLst xmlns:a="http://schemas.openxmlformats.org/drawingml/2006/main" xmlns:r="http://schemas.openxmlformats.org/officeDocument/2006/relationships" xmlns:p="http://schemas.openxmlformats.org/presentationml/2006/main">
+<file path=ppt/tags/tag72.xml><?xml version="1.0" encoding="utf-8"?>
+<p:tagLst xmlns:p="http://schemas.openxmlformats.org/presentationml/2006/main">
   <p:tag name="KSO_WM_BEAUTIFY_FLAG" val="#wm#"/>
   <p:tag name="KSO_WM_TEMPLATE_CATEGORY" val="custom"/>
   <p:tag name="KSO_WM_TEMPLATE_INDEX" val="20187308"/>
@@ -11406,8 +11536,8 @@
 </p:tagLst>
 </file>
 
-<file path=ppt/tags/tag84.xml><?xml version="1.0" encoding="utf-8"?>
-<p:tagLst xmlns:a="http://schemas.openxmlformats.org/drawingml/2006/main" xmlns:r="http://schemas.openxmlformats.org/officeDocument/2006/relationships" xmlns:p="http://schemas.openxmlformats.org/presentationml/2006/main">
+<file path=ppt/tags/tag73.xml><?xml version="1.0" encoding="utf-8"?>
+<p:tagLst xmlns:p="http://schemas.openxmlformats.org/presentationml/2006/main">
   <p:tag name="KSO_WM_BEAUTIFY_FLAG" val="#wm#"/>
   <p:tag name="KSO_WM_TEMPLATE_CATEGORY" val="custom"/>
   <p:tag name="KSO_WM_TEMPLATE_INDEX" val="20187308"/>
@@ -11415,8 +11545,8 @@
 </p:tagLst>
 </file>
 
-<file path=ppt/tags/tag85.xml><?xml version="1.0" encoding="utf-8"?>
-<p:tagLst xmlns:a="http://schemas.openxmlformats.org/drawingml/2006/main" xmlns:r="http://schemas.openxmlformats.org/officeDocument/2006/relationships" xmlns:p="http://schemas.openxmlformats.org/presentationml/2006/main">
+<file path=ppt/tags/tag74.xml><?xml version="1.0" encoding="utf-8"?>
+<p:tagLst xmlns:p="http://schemas.openxmlformats.org/presentationml/2006/main">
   <p:tag name="KSO_WM_BEAUTIFY_FLAG" val="#wm#"/>
   <p:tag name="KSO_WM_TEMPLATE_CATEGORY" val="custom"/>
   <p:tag name="KSO_WM_TEMPLATE_INDEX" val="20187308"/>
@@ -11424,13 +11554,120 @@
 </p:tagLst>
 </file>
 
-<file path=ppt/tags/tag9.xml><?xml version="1.0" encoding="utf-8"?>
-<p:tagLst xmlns:a="http://schemas.openxmlformats.org/drawingml/2006/main" xmlns:r="http://schemas.openxmlformats.org/officeDocument/2006/relationships" xmlns:p="http://schemas.openxmlformats.org/presentationml/2006/main">
+<file path=ppt/tags/tag75.xml><?xml version="1.0" encoding="utf-8"?>
+<p:tagLst xmlns:p="http://schemas.openxmlformats.org/presentationml/2006/main">
+  <p:tag name="KSO_WM_BEAUTIFY_FLAG" val="#wm#"/>
+  <p:tag name="KSO_WM_TEMPLATE_CATEGORY" val="custom"/>
+  <p:tag name="KSO_WM_TEMPLATE_INDEX" val="20187308"/>
+  <p:tag name="KSO_WM_SPECIAL_SOURCE" val="bdnull"/>
+</p:tagLst>
+</file>
+
+<file path=ppt/tags/tag76.xml><?xml version="1.0" encoding="utf-8"?>
+<p:tagLst xmlns:p="http://schemas.openxmlformats.org/presentationml/2006/main">
+  <p:tag name="KSO_WM_BEAUTIFY_FLAG" val="#wm#"/>
+  <p:tag name="KSO_WM_TEMPLATE_CATEGORY" val="custom"/>
+  <p:tag name="KSO_WM_TEMPLATE_INDEX" val="20187308"/>
+  <p:tag name="KSO_WM_SPECIAL_SOURCE" val="bdnull"/>
+</p:tagLst>
+</file>
+
+<file path=ppt/tags/tag77.xml><?xml version="1.0" encoding="utf-8"?>
+<p:tagLst xmlns:p="http://schemas.openxmlformats.org/presentationml/2006/main">
+  <p:tag name="KSO_WM_BEAUTIFY_FLAG" val="#wm#"/>
+  <p:tag name="KSO_WM_TEMPLATE_CATEGORY" val="custom"/>
+  <p:tag name="KSO_WM_TEMPLATE_INDEX" val="20187308"/>
+  <p:tag name="KSO_WM_SPECIAL_SOURCE" val="bdnull"/>
+</p:tagLst>
+</file>
+
+<file path=ppt/tags/tag78.xml><?xml version="1.0" encoding="utf-8"?>
+<p:tagLst xmlns:p="http://schemas.openxmlformats.org/presentationml/2006/main">
+  <p:tag name="KSO_WM_BEAUTIFY_FLAG" val="#wm#"/>
+  <p:tag name="KSO_WM_TEMPLATE_CATEGORY" val="custom"/>
+  <p:tag name="KSO_WM_TEMPLATE_INDEX" val="20187308"/>
+  <p:tag name="KSO_WM_SPECIAL_SOURCE" val="bdnull"/>
+</p:tagLst>
+</file>
+
+<file path=ppt/tags/tag79.xml><?xml version="1.0" encoding="utf-8"?>
+<p:tagLst xmlns:p="http://schemas.openxmlformats.org/presentationml/2006/main">
+  <p:tag name="KSO_WM_BEAUTIFY_FLAG" val="#wm#"/>
+  <p:tag name="KSO_WM_TEMPLATE_CATEGORY" val="custom"/>
+  <p:tag name="KSO_WM_TEMPLATE_INDEX" val="20187308"/>
+  <p:tag name="KSO_WM_SPECIAL_SOURCE" val="bdnull"/>
+</p:tagLst>
+</file>
+
+<file path=ppt/tags/tag8.xml><?xml version="1.0" encoding="utf-8"?>
+<p:tagLst xmlns:p="http://schemas.openxmlformats.org/presentationml/2006/main">
   <p:tag name="KSO_WM_UNIT_HIGHLIGHT" val="0"/>
   <p:tag name="KSO_WM_UNIT_COMPATIBLE" val="0"/>
   <p:tag name="KSO_WM_UNIT_DIAGRAM_ISNUMVISUAL" val="0"/>
   <p:tag name="KSO_WM_UNIT_DIAGRAM_ISREFERUNIT" val="0"/>
   <p:tag name="KSO_WM_UNIT_ID" val="_5**"/>
+  <p:tag name="KSO_WM_UNIT_LAYERLEVEL" val="1"/>
+  <p:tag name="KSO_WM_TAG_VERSION" val="1.0"/>
+  <p:tag name="KSO_WM_BEAUTIFY_FLAG" val="#wm#"/>
+</p:tagLst>
+</file>
+
+<file path=ppt/tags/tag80.xml><?xml version="1.0" encoding="utf-8"?>
+<p:tagLst xmlns:p="http://schemas.openxmlformats.org/presentationml/2006/main">
+  <p:tag name="KSO_WM_SPECIAL_SOURCE" val="bdnull"/>
+</p:tagLst>
+</file>
+
+<file path=ppt/tags/tag81.xml><?xml version="1.0" encoding="utf-8"?>
+<p:tagLst xmlns:p="http://schemas.openxmlformats.org/presentationml/2006/main">
+  <p:tag name="KSO_WM_BEAUTIFY_FLAG" val="#wm#"/>
+  <p:tag name="KSO_WM_TEMPLATE_CATEGORY" val="custom"/>
+  <p:tag name="KSO_WM_TEMPLATE_INDEX" val="20187308"/>
+  <p:tag name="KSO_WM_SPECIAL_SOURCE" val="bdnull"/>
+</p:tagLst>
+</file>
+
+<file path=ppt/tags/tag82.xml><?xml version="1.0" encoding="utf-8"?>
+<p:tagLst xmlns:p="http://schemas.openxmlformats.org/presentationml/2006/main">
+  <p:tag name="KSO_WM_BEAUTIFY_FLAG" val="#wm#"/>
+  <p:tag name="KSO_WM_TEMPLATE_CATEGORY" val="custom"/>
+  <p:tag name="KSO_WM_TEMPLATE_INDEX" val="20187308"/>
+  <p:tag name="KSO_WM_SPECIAL_SOURCE" val="bdnull"/>
+</p:tagLst>
+</file>
+
+<file path=ppt/tags/tag83.xml><?xml version="1.0" encoding="utf-8"?>
+<p:tagLst xmlns:p="http://schemas.openxmlformats.org/presentationml/2006/main">
+  <p:tag name="KSO_WM_BEAUTIFY_FLAG" val="#wm#"/>
+  <p:tag name="KSO_WM_TEMPLATE_CATEGORY" val="custom"/>
+  <p:tag name="KSO_WM_TEMPLATE_INDEX" val="20187308"/>
+  <p:tag name="KSO_WM_SPECIAL_SOURCE" val="bdnull"/>
+</p:tagLst>
+</file>
+
+<file path=ppt/tags/tag84.xml><?xml version="1.0" encoding="utf-8"?>
+<p:tagLst xmlns:p="http://schemas.openxmlformats.org/presentationml/2006/main">
+  <p:tag name="KSO_WM_BEAUTIFY_FLAG" val="#wm#"/>
+  <p:tag name="KSO_WM_TEMPLATE_CATEGORY" val="custom"/>
+  <p:tag name="KSO_WM_TEMPLATE_INDEX" val="20187308"/>
+  <p:tag name="KSO_WM_SPECIAL_SOURCE" val="bdnull"/>
+</p:tagLst>
+</file>
+
+<file path=ppt/tags/tag85.xml><?xml version="1.0" encoding="utf-8"?>
+<p:tagLst xmlns:p="http://schemas.openxmlformats.org/presentationml/2006/main">
+  <p:tag name="KSO_DOCER_TEMPLATE_OPEN_ONCE_MARK" val="1"/>
+  <p:tag name="COMMONDATA" val="eyJoZGlkIjoiMjg3YWU3MzE4Zjc2MGFjY2U2ZGQ0NDQwMWZkNTA3OTgifQ=="/>
+</p:tagLst>
+</file>
+
+<file path=ppt/tags/tag9.xml><?xml version="1.0" encoding="utf-8"?>
+<p:tagLst xmlns:p="http://schemas.openxmlformats.org/presentationml/2006/main">
+  <p:tag name="KSO_WM_UNIT_HIGHLIGHT" val="0"/>
+  <p:tag name="KSO_WM_UNIT_COMPATIBLE" val="0"/>
+  <p:tag name="KSO_WM_UNIT_DIAGRAM_ISNUMVISUAL" val="0"/>
+  <p:tag name="KSO_WM_UNIT_DIAGRAM_ISREFERUNIT" val="0"/>
+  <p:tag name="KSO_WM_UNIT_ID" val="_3**"/>
   <p:tag name="KSO_WM_UNIT_LAYERLEVEL" val="1"/>
   <p:tag name="KSO_WM_TAG_VERSION" val="1.0"/>
   <p:tag name="KSO_WM_BEAUTIFY_FLAG" val="#wm#"/>
@@ -11628,8 +11865,6 @@
       </a:bgFillStyleLst>
     </a:fmtScheme>
   </a:themeElements>
-  <a:objectDefaults/>
-  <a:extraClrSchemeLst/>
   <a:extLst>
     <a:ext uri="{05A4C25C-085E-4340-85A3-A5531E510DB2}">
       <thm15:themeFamily xmlns:thm15="http://schemas.microsoft.com/office/thememl/2012/main" name="Office Theme" id="{62F939B6-93AF-4DB8-9C6B-D6C7DFDC589F}" vid="{4A3C46E8-61CC-4603-A589-7422A47A8E4A}"/>
@@ -11889,8 +12124,6 @@
       </a:bgFillStyleLst>
     </a:fmtScheme>
   </a:themeElements>
-  <a:objectDefaults/>
-  <a:extraClrSchemeLst/>
   <a:extLst>
     <a:ext uri="{05A4C25C-085E-4340-85A3-A5531E510DB2}">
       <thm15:themeFamily xmlns:thm15="http://schemas.microsoft.com/office/thememl/2012/main" name="Office Theme" id="{62F939B6-93AF-4DB8-9C6B-D6C7DFDC589F}" vid="{4A3C46E8-61CC-4603-A589-7422A47A8E4A}"/>
@@ -12150,8 +12383,6 @@
       </a:bgFillStyleLst>
     </a:fmtScheme>
   </a:themeElements>
-  <a:objectDefaults/>
-  <a:extraClrSchemeLst/>
   <a:extLst>
     <a:ext uri="{05A4C25C-085E-4340-85A3-A5531E510DB2}">
       <thm15:themeFamily xmlns:thm15="http://schemas.microsoft.com/office/thememl/2012/main" name="Office Theme" id="{62F939B6-93AF-4DB8-9C6B-D6C7DFDC589F}" vid="{4A3C46E8-61CC-4603-A589-7422A47A8E4A}"/>

</xml_diff>